<commit_message>
added base text for methods
</commit_message>
<xml_diff>
--- a/229poster.pptx
+++ b/229poster.pptx
@@ -226,7 +226,7 @@
           <a:p>
             <a:fld id="{FF66CDD7-09B6-4BB3-9069-2B95837CCCB2}" type="datetimeFigureOut">
               <a:rPr lang="en-US" smtClean="0"/>
-              <a:t>12/9/2017</a:t>
+              <a:t>12/10/2017</a:t>
             </a:fld>
             <a:endParaRPr lang="en-US"/>
           </a:p>
@@ -1902,7 +1902,7 @@
           <a:p>
             <a:fld id="{985D6BDF-9D0E-4E2B-85B8-D8F4790360C9}" type="datetimeFigureOut">
               <a:rPr lang="en-US" smtClean="0"/>
-              <a:t>12/9/2017</a:t>
+              <a:t>12/10/2017</a:t>
             </a:fld>
             <a:endParaRPr lang="en-US" dirty="0"/>
           </a:p>
@@ -2113,7 +2113,7 @@
           <a:p>
             <a:fld id="{985D6BDF-9D0E-4E2B-85B8-D8F4790360C9}" type="datetimeFigureOut">
               <a:rPr lang="en-US" smtClean="0"/>
-              <a:t>12/9/2017</a:t>
+              <a:t>12/10/2017</a:t>
             </a:fld>
             <a:endParaRPr lang="en-US" dirty="0"/>
           </a:p>
@@ -3053,7 +3053,7 @@
         <p:spPr bwMode="auto">
           <a:xfrm>
             <a:off x="1097280" y="3657600"/>
-            <a:ext cx="9875520" cy="2967786"/>
+            <a:ext cx="9875520" cy="813350"/>
           </a:xfrm>
           <a:prstGeom prst="rect">
             <a:avLst/>
@@ -3178,107 +3178,14 @@
               <a:buChar char="•"/>
             </a:pPr>
             <a:r>
-              <a:rPr lang="en-US" sz="2000" dirty="0">
+              <a:rPr lang="en-US" sz="2000" dirty="0" smtClean="0">
                 <a:latin typeface="Calibri" pitchFamily="34" charset="0"/>
               </a:rPr>
-              <a:t>We develop </a:t>
-            </a:r>
-            <a:r>
-              <a:rPr lang="en-US" sz="2000" b="1" dirty="0">
-                <a:latin typeface="Calibri" pitchFamily="34" charset="0"/>
-              </a:rPr>
-              <a:t>clustering algorithms </a:t>
-            </a:r>
-            <a:r>
-              <a:rPr lang="en-US" sz="2000" dirty="0">
-                <a:latin typeface="Calibri" pitchFamily="34" charset="0"/>
-              </a:rPr>
-              <a:t>and </a:t>
-            </a:r>
-            <a:r>
-              <a:rPr lang="en-US" sz="2000" b="1" dirty="0">
-                <a:latin typeface="Calibri" pitchFamily="34" charset="0"/>
-              </a:rPr>
-              <a:t>Bayesian graphical models </a:t>
-            </a:r>
-            <a:r>
-              <a:rPr lang="en-US" sz="2000" dirty="0">
-                <a:latin typeface="Calibri" pitchFamily="34" charset="0"/>
-              </a:rPr>
-              <a:t>to spoof human biometric patterns in mobile inputs. </a:t>
-            </a:r>
-          </a:p>
-          <a:p>
-            <a:pPr marL="342900" indent="-342900" eaLnBrk="1" hangingPunct="1">
-              <a:buFont typeface="Arial" panose="020B0604020202020204" pitchFamily="34" charset="0"/>
-              <a:buChar char="•"/>
-            </a:pPr>
-            <a:r>
-              <a:rPr lang="en-US" sz="2000" dirty="0">
-                <a:latin typeface="Calibri" pitchFamily="34" charset="0"/>
-              </a:rPr>
-              <a:t>We frame this as a </a:t>
-            </a:r>
-            <a:r>
-              <a:rPr lang="en-US" sz="2000" b="1" dirty="0">
-                <a:latin typeface="Calibri" pitchFamily="34" charset="0"/>
-              </a:rPr>
-              <a:t>targeted adversarial attack </a:t>
-            </a:r>
-            <a:r>
-              <a:rPr lang="en-US" sz="2000" dirty="0">
-                <a:latin typeface="Calibri" pitchFamily="34" charset="0"/>
-              </a:rPr>
-              <a:t>problem, and the applications are twofold.</a:t>
-            </a:r>
-          </a:p>
-          <a:p>
-            <a:pPr marL="1303020" lvl="1" indent="-411480" eaLnBrk="1" hangingPunct="1">
-              <a:buFont typeface="+mj-lt"/>
-              <a:buAutoNum type="arabicPeriod"/>
-            </a:pPr>
-            <a:r>
-              <a:rPr lang="en-US" sz="2000" dirty="0">
-                <a:latin typeface="Calibri" pitchFamily="34" charset="0"/>
-              </a:rPr>
-              <a:t>By developing methods to generate a mass of adversarial examples, we can develop more </a:t>
-            </a:r>
-            <a:r>
-              <a:rPr lang="en-US" sz="2000" b="1" dirty="0">
-                <a:latin typeface="Calibri" pitchFamily="34" charset="0"/>
-              </a:rPr>
-              <a:t>robust discriminatory classifiers </a:t>
-            </a:r>
-            <a:r>
-              <a:rPr lang="en-US" sz="2000" dirty="0">
-                <a:latin typeface="Calibri" pitchFamily="34" charset="0"/>
-              </a:rPr>
-              <a:t>for enhanced security in sensitive environments such as biometric identification on smartphones. </a:t>
-            </a:r>
-          </a:p>
-          <a:p>
-            <a:pPr marL="1303020" lvl="1" indent="-411480" eaLnBrk="1" hangingPunct="1">
-              <a:buFont typeface="+mj-lt"/>
-              <a:buAutoNum type="arabicPeriod"/>
-            </a:pPr>
-            <a:r>
-              <a:rPr lang="en-US" sz="2000" dirty="0">
-                <a:latin typeface="Calibri" pitchFamily="34" charset="0"/>
-              </a:rPr>
-              <a:t>Our </a:t>
-            </a:r>
-            <a:r>
-              <a:rPr lang="en-US" sz="2000" b="1" dirty="0">
-                <a:latin typeface="Calibri" pitchFamily="34" charset="0"/>
-              </a:rPr>
-              <a:t>Bayesian network heuristics </a:t>
-            </a:r>
-            <a:r>
-              <a:rPr lang="en-US" sz="2000" dirty="0">
-                <a:latin typeface="Calibri" pitchFamily="34" charset="0"/>
-              </a:rPr>
-              <a:t>can parse out salient features on a case-by-case basis, and can be employed to augment sparse datasets and develop emulators of fine-grained human behavior. </a:t>
-            </a:r>
+              <a:t>We develop logistic regression and deep neural network classifiers to verify users based on typing pattern.</a:t>
+            </a:r>
+            <a:endParaRPr lang="en-US" sz="2000" dirty="0">
+              <a:latin typeface="Calibri" pitchFamily="34" charset="0"/>
+            </a:endParaRPr>
           </a:p>
         </p:txBody>
       </p:sp>
@@ -3394,1424 +3301,465 @@
           </a:p>
         </p:txBody>
       </p:sp>
-      <mc:AlternateContent xmlns:mc="http://schemas.openxmlformats.org/markup-compatibility/2006" xmlns:a14="http://schemas.microsoft.com/office/drawing/2010/main">
-        <mc:Choice Requires="a14">
-          <p:sp>
-            <p:nvSpPr>
-              <p:cNvPr id="13" name="Text Box 192"/>
-              <p:cNvSpPr txBox="1">
-                <a:spLocks noChangeArrowheads="1"/>
-              </p:cNvSpPr>
-              <p:nvPr/>
-            </p:nvSpPr>
-            <p:spPr bwMode="auto">
-              <a:xfrm>
-                <a:off x="11521440" y="3657601"/>
-                <a:ext cx="9875520" cy="15157918"/>
-              </a:xfrm>
-              <a:prstGeom prst="rect">
-                <a:avLst/>
-              </a:prstGeom>
-              <a:solidFill>
-                <a:schemeClr val="bg1"/>
-              </a:solidFill>
-              <a:ln w="12700">
-                <a:solidFill>
-                  <a:schemeClr val="accent1">
-                    <a:lumMod val="75000"/>
-                  </a:schemeClr>
-                </a:solidFill>
-              </a:ln>
-              <a:effectLst/>
-            </p:spPr>
-            <p:txBody>
-              <a:bodyPr lIns="97942" tIns="97942" rIns="97942" bIns="97942">
-                <a:spAutoFit/>
-              </a:bodyPr>
-              <a:lstStyle>
-                <a:lvl1pPr eaLnBrk="0" hangingPunct="0">
-                  <a:defRPr sz="2200">
-                    <a:solidFill>
-                      <a:schemeClr val="tx1"/>
-                    </a:solidFill>
-                    <a:latin typeface="Arial" charset="0"/>
-                  </a:defRPr>
-                </a:lvl1pPr>
-                <a:lvl2pPr marL="742950" indent="-285750" eaLnBrk="0" hangingPunct="0">
-                  <a:defRPr sz="2200">
-                    <a:solidFill>
-                      <a:schemeClr val="tx1"/>
-                    </a:solidFill>
-                    <a:latin typeface="Arial" charset="0"/>
-                  </a:defRPr>
-                </a:lvl2pPr>
-                <a:lvl3pPr marL="1143000" indent="-228600" eaLnBrk="0" hangingPunct="0">
-                  <a:defRPr sz="2200">
-                    <a:solidFill>
-                      <a:schemeClr val="tx1"/>
-                    </a:solidFill>
-                    <a:latin typeface="Arial" charset="0"/>
-                  </a:defRPr>
-                </a:lvl3pPr>
-                <a:lvl4pPr marL="1600200" indent="-228600" eaLnBrk="0" hangingPunct="0">
-                  <a:defRPr sz="2200">
-                    <a:solidFill>
-                      <a:schemeClr val="tx1"/>
-                    </a:solidFill>
-                    <a:latin typeface="Arial" charset="0"/>
-                  </a:defRPr>
-                </a:lvl4pPr>
-                <a:lvl5pPr marL="2057400" indent="-228600" eaLnBrk="0" hangingPunct="0">
-                  <a:defRPr sz="2200">
-                    <a:solidFill>
-                      <a:schemeClr val="tx1"/>
-                    </a:solidFill>
-                    <a:latin typeface="Arial" charset="0"/>
-                  </a:defRPr>
-                </a:lvl5pPr>
-                <a:lvl6pPr marL="2514600" indent="-228600" eaLnBrk="0" fontAlgn="base" hangingPunct="0">
-                  <a:spcBef>
-                    <a:spcPct val="0"/>
-                  </a:spcBef>
-                  <a:spcAft>
-                    <a:spcPct val="0"/>
-                  </a:spcAft>
-                  <a:defRPr sz="2200">
-                    <a:solidFill>
-                      <a:schemeClr val="tx1"/>
-                    </a:solidFill>
-                    <a:latin typeface="Arial" charset="0"/>
-                  </a:defRPr>
-                </a:lvl6pPr>
-                <a:lvl7pPr marL="2971800" indent="-228600" eaLnBrk="0" fontAlgn="base" hangingPunct="0">
-                  <a:spcBef>
-                    <a:spcPct val="0"/>
-                  </a:spcBef>
-                  <a:spcAft>
-                    <a:spcPct val="0"/>
-                  </a:spcAft>
-                  <a:defRPr sz="2200">
-                    <a:solidFill>
-                      <a:schemeClr val="tx1"/>
-                    </a:solidFill>
-                    <a:latin typeface="Arial" charset="0"/>
-                  </a:defRPr>
-                </a:lvl7pPr>
-                <a:lvl8pPr marL="3429000" indent="-228600" eaLnBrk="0" fontAlgn="base" hangingPunct="0">
-                  <a:spcBef>
-                    <a:spcPct val="0"/>
-                  </a:spcBef>
-                  <a:spcAft>
-                    <a:spcPct val="0"/>
-                  </a:spcAft>
-                  <a:defRPr sz="2200">
-                    <a:solidFill>
-                      <a:schemeClr val="tx1"/>
-                    </a:solidFill>
-                    <a:latin typeface="Arial" charset="0"/>
-                  </a:defRPr>
-                </a:lvl8pPr>
-                <a:lvl9pPr marL="3886200" indent="-228600" eaLnBrk="0" fontAlgn="base" hangingPunct="0">
-                  <a:spcBef>
-                    <a:spcPct val="0"/>
-                  </a:spcBef>
-                  <a:spcAft>
-                    <a:spcPct val="0"/>
-                  </a:spcAft>
-                  <a:defRPr sz="2200">
-                    <a:solidFill>
-                      <a:schemeClr val="tx1"/>
-                    </a:solidFill>
-                    <a:latin typeface="Arial" charset="0"/>
-                  </a:defRPr>
-                </a:lvl9pPr>
-              </a:lstStyle>
-              <a:p>
-                <a:pPr marL="342900" indent="-342900" eaLnBrk="1" hangingPunct="1">
-                  <a:buFont typeface="Arial" panose="020B0604020202020204" pitchFamily="34" charset="0"/>
-                  <a:buChar char="•"/>
-                </a:pPr>
-                <a:r>
-                  <a:rPr lang="en-US" sz="2000" b="1" i="1" dirty="0">
-                    <a:latin typeface="Calibri" pitchFamily="34" charset="0"/>
-                  </a:rPr>
-                  <a:t>k</a:t>
-                </a:r>
-                <a:r>
-                  <a:rPr lang="en-US" sz="2000" b="1" dirty="0">
-                    <a:latin typeface="Calibri" pitchFamily="34" charset="0"/>
-                  </a:rPr>
-                  <a:t>-means. </a:t>
-                </a:r>
-                <a:r>
-                  <a:rPr lang="en-US" sz="2000" dirty="0">
-                    <a:latin typeface="Calibri" pitchFamily="34" charset="0"/>
-                  </a:rPr>
-                  <a:t>We implemented a </a:t>
-                </a:r>
-                <a:r>
-                  <a:rPr lang="en-US" sz="2000" dirty="0" err="1">
-                    <a:latin typeface="Calibri" pitchFamily="34" charset="0"/>
-                  </a:rPr>
-                  <a:t>variational</a:t>
-                </a:r>
-                <a:r>
-                  <a:rPr lang="en-US" sz="2000" dirty="0">
-                    <a:latin typeface="Calibri" pitchFamily="34" charset="0"/>
-                  </a:rPr>
-                  <a:t> </a:t>
-                </a:r>
-                <a:r>
-                  <a:rPr lang="en-US" sz="2000" i="1" dirty="0">
-                    <a:latin typeface="Calibri" pitchFamily="34" charset="0"/>
-                  </a:rPr>
-                  <a:t>k</a:t>
-                </a:r>
-                <a:r>
-                  <a:rPr lang="en-US" sz="2000" dirty="0">
-                    <a:latin typeface="Calibri" pitchFamily="34" charset="0"/>
-                  </a:rPr>
-                  <a:t>-means clustering framework initialized with random seed, varying on </a:t>
-                </a:r>
-                <a:r>
-                  <a:rPr lang="en-US" sz="2000" i="1" dirty="0">
-                    <a:latin typeface="Calibri" pitchFamily="34" charset="0"/>
-                  </a:rPr>
-                  <a:t>k</a:t>
-                </a:r>
-                <a:r>
-                  <a:rPr lang="en-US" sz="2000" dirty="0">
-                    <a:latin typeface="Calibri" pitchFamily="34" charset="0"/>
-                  </a:rPr>
-                  <a:t>. The </a:t>
-                </a:r>
-                <a:r>
-                  <a:rPr lang="en-US" sz="2000" i="1" dirty="0">
-                    <a:latin typeface="Calibri" pitchFamily="34" charset="0"/>
-                  </a:rPr>
-                  <a:t>k </a:t>
-                </a:r>
-                <a:r>
-                  <a:rPr lang="en-US" sz="2000" dirty="0">
-                    <a:latin typeface="Calibri" pitchFamily="34" charset="0"/>
-                  </a:rPr>
-                  <a:t>centroids determined upon convergence become the basis for our adversarial example generation. Small (&lt;5) clusters are considered outliers.</a:t>
-                </a:r>
-              </a:p>
-              <a:p>
-                <a:pPr marL="342900" indent="-342900" eaLnBrk="1" hangingPunct="1">
-                  <a:buFont typeface="Arial" panose="020B0604020202020204" pitchFamily="34" charset="0"/>
-                  <a:buChar char="•"/>
-                </a:pPr>
-                <a:r>
-                  <a:rPr lang="en-US" sz="2000" b="1" dirty="0">
-                    <a:latin typeface="Calibri" pitchFamily="34" charset="0"/>
-                  </a:rPr>
-                  <a:t>Multivariate Gaussian distribution models.</a:t>
-                </a:r>
-                <a:r>
-                  <a:rPr lang="en-US" sz="2000" dirty="0">
-                    <a:latin typeface="Calibri" pitchFamily="34" charset="0"/>
-                  </a:rPr>
-                  <a:t> Motivated by the high-dimensional (71-element featurization) of our dataset, we modeled the clusters generated by </a:t>
-                </a:r>
-                <a:r>
-                  <a:rPr lang="en-US" sz="2000" i="1" dirty="0">
-                    <a:latin typeface="Calibri" pitchFamily="34" charset="0"/>
-                  </a:rPr>
-                  <a:t>k</a:t>
-                </a:r>
-                <a:r>
-                  <a:rPr lang="en-US" sz="2000" dirty="0">
-                    <a:latin typeface="Calibri" pitchFamily="34" charset="0"/>
-                  </a:rPr>
-                  <a:t>-means as multivariate Gaussian distributions over the random variable set </a:t>
-                </a:r>
-                <a14:m>
-                  <m:oMath xmlns:m="http://schemas.openxmlformats.org/officeDocument/2006/math">
-                    <m:r>
-                      <a:rPr lang="en-US" sz="2000" i="1">
-                        <a:latin typeface="Cambria Math" panose="02040503050406030204" pitchFamily="18" charset="0"/>
-                      </a:rPr>
-                      <m:t>𝑥</m:t>
-                    </m:r>
-                    <m:r>
-                      <a:rPr lang="en-US" sz="2000" i="1">
-                        <a:latin typeface="Cambria Math" panose="02040503050406030204" pitchFamily="18" charset="0"/>
-                      </a:rPr>
-                      <m:t>=[</m:t>
-                    </m:r>
-                    <m:sSub>
-                      <m:sSubPr>
-                        <m:ctrlPr>
-                          <a:rPr lang="en-US" sz="2000" i="1">
-                            <a:latin typeface="Cambria Math" panose="02040503050406030204" pitchFamily="18" charset="0"/>
-                          </a:rPr>
-                        </m:ctrlPr>
-                      </m:sSubPr>
-                      <m:e>
-                        <m:r>
-                          <a:rPr lang="en-US" sz="2000" i="1">
-                            <a:latin typeface="Cambria Math" panose="02040503050406030204" pitchFamily="18" charset="0"/>
-                          </a:rPr>
-                          <m:t>𝑋</m:t>
-                        </m:r>
-                      </m:e>
-                      <m:sub>
-                        <m:r>
-                          <a:rPr lang="en-US" sz="2000" i="1">
-                            <a:latin typeface="Cambria Math" panose="02040503050406030204" pitchFamily="18" charset="0"/>
-                          </a:rPr>
-                          <m:t>1</m:t>
-                        </m:r>
-                      </m:sub>
-                    </m:sSub>
-                    <m:r>
-                      <a:rPr lang="en-US" sz="2000" i="1">
-                        <a:latin typeface="Cambria Math" panose="02040503050406030204" pitchFamily="18" charset="0"/>
-                      </a:rPr>
-                      <m:t>,…,</m:t>
-                    </m:r>
-                    <m:sSub>
-                      <m:sSubPr>
-                        <m:ctrlPr>
-                          <a:rPr lang="en-US" sz="2000" i="1">
-                            <a:latin typeface="Cambria Math" panose="02040503050406030204" pitchFamily="18" charset="0"/>
-                          </a:rPr>
-                        </m:ctrlPr>
-                      </m:sSubPr>
-                      <m:e>
-                        <m:r>
-                          <a:rPr lang="en-US" sz="2000" i="1">
-                            <a:latin typeface="Cambria Math" panose="02040503050406030204" pitchFamily="18" charset="0"/>
-                          </a:rPr>
-                          <m:t>𝑋</m:t>
-                        </m:r>
-                      </m:e>
-                      <m:sub>
-                        <m:r>
-                          <a:rPr lang="en-US" sz="2000" i="1">
-                            <a:latin typeface="Cambria Math" panose="02040503050406030204" pitchFamily="18" charset="0"/>
-                          </a:rPr>
-                          <m:t>𝑑</m:t>
-                        </m:r>
-                      </m:sub>
-                    </m:sSub>
-                    <m:r>
-                      <a:rPr lang="en-US" sz="2000" i="1">
-                        <a:latin typeface="Cambria Math" panose="02040503050406030204" pitchFamily="18" charset="0"/>
-                      </a:rPr>
-                      <m:t>]</m:t>
-                    </m:r>
-                  </m:oMath>
-                </a14:m>
-                <a:r>
-                  <a:rPr lang="en-US" sz="2000" dirty="0">
-                    <a:latin typeface="Calibri" pitchFamily="34" charset="0"/>
-                  </a:rPr>
-                  <a:t>,  with the density function:</a:t>
-                </a:r>
-              </a:p>
-              <a:p>
-                <a:pPr eaLnBrk="1" hangingPunct="1"/>
-                <a14:m>
-                  <m:oMathPara xmlns:m="http://schemas.openxmlformats.org/officeDocument/2006/math">
-                    <m:oMathParaPr>
-                      <m:jc m:val="centerGroup"/>
-                    </m:oMathParaPr>
-                    <m:oMath xmlns:m="http://schemas.openxmlformats.org/officeDocument/2006/math">
-                      <m:r>
-                        <a:rPr lang="en-US" sz="2000" i="1">
-                          <a:latin typeface="Cambria Math" panose="02040503050406030204" pitchFamily="18" charset="0"/>
-                        </a:rPr>
-                        <m:t>𝑓</m:t>
-                      </m:r>
-                      <m:d>
-                        <m:dPr>
-                          <m:ctrlPr>
-                            <a:rPr lang="en-US" sz="2000" i="1">
-                              <a:latin typeface="Cambria Math" panose="02040503050406030204" pitchFamily="18" charset="0"/>
-                            </a:rPr>
-                          </m:ctrlPr>
-                        </m:dPr>
-                        <m:e>
-                          <m:r>
-                            <a:rPr lang="en-US" sz="2000" i="1">
-                              <a:latin typeface="Cambria Math" panose="02040503050406030204" pitchFamily="18" charset="0"/>
-                            </a:rPr>
-                            <m:t>𝑥</m:t>
-                          </m:r>
-                          <m:r>
-                            <a:rPr lang="en-US" sz="2000" i="1">
-                              <a:latin typeface="Cambria Math" panose="02040503050406030204" pitchFamily="18" charset="0"/>
-                            </a:rPr>
-                            <m:t>,</m:t>
-                          </m:r>
-                          <m:r>
-                            <a:rPr lang="en-US" sz="2000" i="1">
-                              <a:latin typeface="Cambria Math" panose="02040503050406030204" pitchFamily="18" charset="0"/>
-                            </a:rPr>
-                            <m:t>𝜇</m:t>
-                          </m:r>
-                          <m:r>
-                            <a:rPr lang="en-US" sz="2000" i="1">
-                              <a:latin typeface="Cambria Math" panose="02040503050406030204" pitchFamily="18" charset="0"/>
-                            </a:rPr>
-                            <m:t>,</m:t>
-                          </m:r>
-                          <m:r>
-                            <m:rPr>
-                              <m:sty m:val="p"/>
-                            </m:rPr>
-                            <a:rPr lang="en-US" sz="2000">
-                              <a:latin typeface="Cambria Math" panose="02040503050406030204" pitchFamily="18" charset="0"/>
-                            </a:rPr>
-                            <m:t>Σ</m:t>
-                          </m:r>
-                        </m:e>
-                      </m:d>
-                      <m:r>
-                        <a:rPr lang="en-US" sz="2000" i="1">
-                          <a:latin typeface="Cambria Math" panose="02040503050406030204" pitchFamily="18" charset="0"/>
-                        </a:rPr>
-                        <m:t>=</m:t>
-                      </m:r>
-                      <m:f>
-                        <m:fPr>
-                          <m:ctrlPr>
-                            <a:rPr lang="en-US" sz="2000" i="1">
-                              <a:latin typeface="Cambria Math" panose="02040503050406030204" pitchFamily="18" charset="0"/>
-                            </a:rPr>
-                          </m:ctrlPr>
-                        </m:fPr>
-                        <m:num>
-                          <m:r>
-                            <a:rPr lang="en-US" sz="2000" i="1">
-                              <a:latin typeface="Cambria Math" panose="02040503050406030204" pitchFamily="18" charset="0"/>
-                            </a:rPr>
-                            <m:t>1</m:t>
-                          </m:r>
-                        </m:num>
-                        <m:den>
-                          <m:d>
-                            <m:dPr>
-                              <m:begChr m:val="|"/>
-                              <m:endChr m:val="|"/>
-                              <m:ctrlPr>
-                                <a:rPr lang="en-US" sz="2000" i="1">
-                                  <a:latin typeface="Cambria Math" panose="02040503050406030204" pitchFamily="18" charset="0"/>
-                                </a:rPr>
-                              </m:ctrlPr>
-                            </m:dPr>
-                            <m:e>
-                              <m:r>
-                                <m:rPr>
-                                  <m:sty m:val="p"/>
-                                </m:rPr>
-                                <a:rPr lang="en-US" sz="2000">
-                                  <a:latin typeface="Cambria Math" panose="02040503050406030204" pitchFamily="18" charset="0"/>
-                                </a:rPr>
-                                <m:t>Σ</m:t>
-                              </m:r>
-                            </m:e>
-                          </m:d>
-                          <m:sSup>
-                            <m:sSupPr>
-                              <m:ctrlPr>
-                                <a:rPr lang="en-US" sz="2000" i="1">
-                                  <a:latin typeface="Cambria Math" panose="02040503050406030204" pitchFamily="18" charset="0"/>
-                                </a:rPr>
-                              </m:ctrlPr>
-                            </m:sSupPr>
-                            <m:e>
-                              <m:d>
-                                <m:dPr>
-                                  <m:ctrlPr>
-                                    <a:rPr lang="en-US" sz="2000" i="1">
-                                      <a:latin typeface="Cambria Math" panose="02040503050406030204" pitchFamily="18" charset="0"/>
-                                    </a:rPr>
-                                  </m:ctrlPr>
-                                </m:dPr>
-                                <m:e>
-                                  <m:r>
-                                    <a:rPr lang="en-US" sz="2000" i="1">
-                                      <a:latin typeface="Cambria Math" panose="02040503050406030204" pitchFamily="18" charset="0"/>
-                                    </a:rPr>
-                                    <m:t>2</m:t>
-                                  </m:r>
-                                  <m:r>
-                                    <a:rPr lang="en-US" sz="2000" i="1">
-                                      <a:latin typeface="Cambria Math" panose="02040503050406030204" pitchFamily="18" charset="0"/>
-                                    </a:rPr>
-                                    <m:t>𝜋</m:t>
-                                  </m:r>
-                                </m:e>
-                              </m:d>
-                            </m:e>
-                            <m:sup>
-                              <m:r>
-                                <a:rPr lang="en-US" sz="2000" i="1">
-                                  <a:latin typeface="Cambria Math" panose="02040503050406030204" pitchFamily="18" charset="0"/>
-                                </a:rPr>
-                                <m:t>𝑑</m:t>
-                              </m:r>
-                            </m:sup>
-                          </m:sSup>
-                        </m:den>
-                      </m:f>
-                      <m:func>
-                        <m:funcPr>
-                          <m:ctrlPr>
-                            <a:rPr lang="en-US" sz="2000" i="1">
-                              <a:latin typeface="Cambria Math" panose="02040503050406030204" pitchFamily="18" charset="0"/>
-                            </a:rPr>
-                          </m:ctrlPr>
-                        </m:funcPr>
-                        <m:fName>
-                          <m:r>
-                            <m:rPr>
-                              <m:sty m:val="p"/>
-                            </m:rPr>
-                            <a:rPr lang="en-US" sz="2000">
-                              <a:latin typeface="Cambria Math" panose="02040503050406030204" pitchFamily="18" charset="0"/>
-                            </a:rPr>
-                            <m:t>exp</m:t>
-                          </m:r>
-                        </m:fName>
-                        <m:e>
-                          <m:d>
-                            <m:dPr>
-                              <m:ctrlPr>
-                                <a:rPr lang="en-US" sz="2000" i="1">
-                                  <a:latin typeface="Cambria Math" panose="02040503050406030204" pitchFamily="18" charset="0"/>
-                                </a:rPr>
-                              </m:ctrlPr>
-                            </m:dPr>
-                            <m:e>
-                              <m:r>
-                                <a:rPr lang="en-US" sz="2000" i="1">
-                                  <a:latin typeface="Cambria Math" panose="02040503050406030204" pitchFamily="18" charset="0"/>
-                                </a:rPr>
-                                <m:t>−</m:t>
-                              </m:r>
-                              <m:f>
-                                <m:fPr>
-                                  <m:ctrlPr>
-                                    <a:rPr lang="en-US" sz="2000" i="1">
-                                      <a:latin typeface="Cambria Math" panose="02040503050406030204" pitchFamily="18" charset="0"/>
-                                    </a:rPr>
-                                  </m:ctrlPr>
-                                </m:fPr>
-                                <m:num>
-                                  <m:r>
-                                    <a:rPr lang="en-US" sz="2000" i="1">
-                                      <a:latin typeface="Cambria Math" panose="02040503050406030204" pitchFamily="18" charset="0"/>
-                                    </a:rPr>
-                                    <m:t>1</m:t>
-                                  </m:r>
-                                </m:num>
-                                <m:den>
-                                  <m:r>
-                                    <a:rPr lang="en-US" sz="2000" i="1">
-                                      <a:latin typeface="Cambria Math" panose="02040503050406030204" pitchFamily="18" charset="0"/>
-                                    </a:rPr>
-                                    <m:t>2</m:t>
-                                  </m:r>
-                                </m:den>
-                              </m:f>
-                              <m:sSup>
-                                <m:sSupPr>
-                                  <m:ctrlPr>
-                                    <a:rPr lang="en-US" sz="2000" i="1">
-                                      <a:latin typeface="Cambria Math" panose="02040503050406030204" pitchFamily="18" charset="0"/>
-                                    </a:rPr>
-                                  </m:ctrlPr>
-                                </m:sSupPr>
-                                <m:e>
-                                  <m:d>
-                                    <m:dPr>
-                                      <m:ctrlPr>
-                                        <a:rPr lang="en-US" sz="2000" i="1">
-                                          <a:latin typeface="Cambria Math" panose="02040503050406030204" pitchFamily="18" charset="0"/>
-                                        </a:rPr>
-                                      </m:ctrlPr>
-                                    </m:dPr>
-                                    <m:e>
-                                      <m:r>
-                                        <a:rPr lang="en-US" sz="2000" i="1">
-                                          <a:latin typeface="Cambria Math" panose="02040503050406030204" pitchFamily="18" charset="0"/>
-                                        </a:rPr>
-                                        <m:t>𝑥</m:t>
-                                      </m:r>
-                                      <m:r>
-                                        <a:rPr lang="en-US" sz="2000" i="1">
-                                          <a:latin typeface="Cambria Math" panose="02040503050406030204" pitchFamily="18" charset="0"/>
-                                        </a:rPr>
-                                        <m:t>−</m:t>
-                                      </m:r>
-                                      <m:r>
-                                        <a:rPr lang="en-US" sz="2000" i="1">
-                                          <a:latin typeface="Cambria Math" panose="02040503050406030204" pitchFamily="18" charset="0"/>
-                                        </a:rPr>
-                                        <m:t>𝜇</m:t>
-                                      </m:r>
-                                    </m:e>
-                                  </m:d>
-                                </m:e>
-                                <m:sup>
-                                  <m:r>
-                                    <a:rPr lang="en-US" sz="2000" i="1">
-                                      <a:latin typeface="Cambria Math" panose="02040503050406030204" pitchFamily="18" charset="0"/>
-                                    </a:rPr>
-                                    <m:t>𝑇</m:t>
-                                  </m:r>
-                                </m:sup>
-                              </m:sSup>
-                              <m:sSup>
-                                <m:sSupPr>
-                                  <m:ctrlPr>
-                                    <a:rPr lang="en-US" sz="2000" i="1">
-                                      <a:latin typeface="Cambria Math" panose="02040503050406030204" pitchFamily="18" charset="0"/>
-                                    </a:rPr>
-                                  </m:ctrlPr>
-                                </m:sSupPr>
-                                <m:e>
-                                  <m:r>
-                                    <m:rPr>
-                                      <m:sty m:val="p"/>
-                                    </m:rPr>
-                                    <a:rPr lang="en-US" sz="2000">
-                                      <a:latin typeface="Cambria Math" panose="02040503050406030204" pitchFamily="18" charset="0"/>
-                                    </a:rPr>
-                                    <m:t>Σ</m:t>
-                                  </m:r>
-                                </m:e>
-                                <m:sup>
-                                  <m:r>
-                                    <a:rPr lang="en-US" sz="2000" i="1">
-                                      <a:latin typeface="Cambria Math" panose="02040503050406030204" pitchFamily="18" charset="0"/>
-                                    </a:rPr>
-                                    <m:t>−1</m:t>
-                                  </m:r>
-                                </m:sup>
-                              </m:sSup>
-                              <m:d>
-                                <m:dPr>
-                                  <m:ctrlPr>
-                                    <a:rPr lang="en-US" sz="2000" i="1">
-                                      <a:latin typeface="Cambria Math" panose="02040503050406030204" pitchFamily="18" charset="0"/>
-                                    </a:rPr>
-                                  </m:ctrlPr>
-                                </m:dPr>
-                                <m:e>
-                                  <m:r>
-                                    <a:rPr lang="en-US" sz="2000" i="1">
-                                      <a:latin typeface="Cambria Math" panose="02040503050406030204" pitchFamily="18" charset="0"/>
-                                    </a:rPr>
-                                    <m:t>𝑥</m:t>
-                                  </m:r>
-                                  <m:r>
-                                    <a:rPr lang="en-US" sz="2000" i="1">
-                                      <a:latin typeface="Cambria Math" panose="02040503050406030204" pitchFamily="18" charset="0"/>
-                                    </a:rPr>
-                                    <m:t>−</m:t>
-                                  </m:r>
-                                  <m:r>
-                                    <a:rPr lang="en-US" sz="2000" i="1">
-                                      <a:latin typeface="Cambria Math" panose="02040503050406030204" pitchFamily="18" charset="0"/>
-                                    </a:rPr>
-                                    <m:t>𝜇</m:t>
-                                  </m:r>
-                                </m:e>
-                              </m:d>
-                            </m:e>
-                          </m:d>
-                        </m:e>
-                      </m:func>
-                    </m:oMath>
-                  </m:oMathPara>
-                </a14:m>
-                <a:endParaRPr lang="en-US" sz="2000" dirty="0">
-                  <a:latin typeface="Calibri" pitchFamily="34" charset="0"/>
-                </a:endParaRPr>
-              </a:p>
-              <a:p>
-                <a:pPr marL="342900" eaLnBrk="1" hangingPunct="1"/>
-                <a:r>
-                  <a:rPr lang="en-US" sz="2000" dirty="0">
-                    <a:latin typeface="Calibri" pitchFamily="34" charset="0"/>
-                  </a:rPr>
-                  <a:t>We characterized each cluster distribution with its mean and covariance. We then generated adversarial attacks by sampling from each centroid's characteristic multivariate Gaussian distribution, with thresholds in place to de-weight outliers. Each of these attacks was then concatenated with a </a:t>
-                </a:r>
-                <a:r>
-                  <a:rPr lang="en-US" sz="2000" dirty="0" err="1">
-                    <a:latin typeface="Calibri" pitchFamily="34" charset="0"/>
-                  </a:rPr>
-                  <a:t>datapoint</a:t>
-                </a:r>
-                <a:r>
-                  <a:rPr lang="en-US" sz="2000" dirty="0">
-                    <a:latin typeface="Calibri" pitchFamily="34" charset="0"/>
-                  </a:rPr>
-                  <a:t> from its generating cluster. The feature data we generated was thus similar to the original feature data at frequencies proportionate to the density function probabilities.</a:t>
-                </a:r>
-              </a:p>
-              <a:p>
-                <a:pPr marL="342900" eaLnBrk="1" hangingPunct="1"/>
-                <a:endParaRPr lang="en-US" sz="2000" dirty="0">
-                  <a:latin typeface="Calibri" pitchFamily="34" charset="0"/>
-                </a:endParaRPr>
-              </a:p>
-              <a:p>
-                <a:pPr marL="342900" eaLnBrk="1" hangingPunct="1"/>
-                <a:endParaRPr lang="en-US" sz="2000" dirty="0">
-                  <a:latin typeface="Calibri" pitchFamily="34" charset="0"/>
-                </a:endParaRPr>
-              </a:p>
-              <a:p>
-                <a:pPr marL="342900" eaLnBrk="1" hangingPunct="1"/>
-                <a:endParaRPr lang="en-US" sz="2000" dirty="0">
-                  <a:latin typeface="Calibri" pitchFamily="34" charset="0"/>
-                </a:endParaRPr>
-              </a:p>
-              <a:p>
-                <a:pPr marL="342900" eaLnBrk="1" hangingPunct="1"/>
-                <a:endParaRPr lang="en-US" sz="2000" dirty="0">
-                  <a:latin typeface="Calibri" pitchFamily="34" charset="0"/>
-                </a:endParaRPr>
-              </a:p>
-              <a:p>
-                <a:pPr marL="342900" eaLnBrk="1" hangingPunct="1"/>
-                <a:endParaRPr lang="en-US" sz="2000" dirty="0">
-                  <a:latin typeface="Calibri" pitchFamily="34" charset="0"/>
-                </a:endParaRPr>
-              </a:p>
-              <a:p>
-                <a:pPr marL="342900" eaLnBrk="1" hangingPunct="1"/>
-                <a:endParaRPr lang="en-US" sz="2000" dirty="0">
-                  <a:latin typeface="Calibri" pitchFamily="34" charset="0"/>
-                </a:endParaRPr>
-              </a:p>
-              <a:p>
-                <a:pPr marL="342900" eaLnBrk="1" hangingPunct="1"/>
-                <a:endParaRPr lang="en-US" sz="2000" dirty="0">
-                  <a:latin typeface="Calibri" pitchFamily="34" charset="0"/>
-                </a:endParaRPr>
-              </a:p>
-              <a:p>
-                <a:pPr marL="342900" eaLnBrk="1" hangingPunct="1"/>
-                <a:endParaRPr lang="en-US" sz="2000" dirty="0">
-                  <a:latin typeface="Calibri" pitchFamily="34" charset="0"/>
-                </a:endParaRPr>
-              </a:p>
-              <a:p>
-                <a:pPr marL="342900" eaLnBrk="1" hangingPunct="1"/>
-                <a:endParaRPr lang="en-US" sz="1260" dirty="0">
-                  <a:latin typeface="Calibri" pitchFamily="34" charset="0"/>
-                </a:endParaRPr>
-              </a:p>
-              <a:p>
-                <a:pPr marL="342900" eaLnBrk="1" hangingPunct="1"/>
-                <a:endParaRPr lang="en-US" sz="2000" dirty="0">
-                  <a:latin typeface="Calibri" pitchFamily="34" charset="0"/>
-                </a:endParaRPr>
-              </a:p>
-              <a:p>
-                <a:pPr marL="342900" eaLnBrk="1" hangingPunct="1"/>
-                <a:endParaRPr lang="en-US" sz="2000" dirty="0">
-                  <a:latin typeface="Calibri" pitchFamily="34" charset="0"/>
-                </a:endParaRPr>
-              </a:p>
-              <a:p>
-                <a:pPr marL="342900" indent="-342900" eaLnBrk="1" hangingPunct="1">
-                  <a:buFont typeface="Arial" panose="020B0604020202020204" pitchFamily="34" charset="0"/>
-                  <a:buChar char="•"/>
-                </a:pPr>
-                <a:r>
-                  <a:rPr lang="en-US" sz="2000" b="1" dirty="0">
-                    <a:latin typeface="Calibri" pitchFamily="34" charset="0"/>
-                  </a:rPr>
-                  <a:t>Bayesian network models.</a:t>
-                </a:r>
-                <a:r>
-                  <a:rPr lang="en-US" sz="2000" dirty="0">
-                    <a:latin typeface="Calibri" pitchFamily="34" charset="0"/>
-                  </a:rPr>
-                  <a:t> Our insight was that by examining correlation between features, we could form numerical saliency maps that could inform as well as speed up the process of generating successful adversarial attacks. Bae </a:t>
-                </a:r>
-                <a:r>
-                  <a:rPr lang="en-US" sz="2000" i="1" dirty="0">
-                    <a:latin typeface="Calibri" pitchFamily="34" charset="0"/>
-                  </a:rPr>
-                  <a:t>et al.</a:t>
-                </a:r>
-                <a:r>
-                  <a:rPr lang="en-US" sz="2000" dirty="0">
-                    <a:latin typeface="Calibri" pitchFamily="34" charset="0"/>
-                  </a:rPr>
-                  <a:t> (2016) describe a method to learn Bayesian networks from correlations with </a:t>
-                </a:r>
-                <a:r>
-                  <a:rPr lang="en-US" sz="2000" b="1" dirty="0">
-                    <a:latin typeface="Calibri" pitchFamily="34" charset="0"/>
-                  </a:rPr>
-                  <a:t>global max likelihood:</a:t>
-                </a:r>
-                <a:endParaRPr lang="en-US" sz="2000" dirty="0">
-                  <a:latin typeface="Calibri" pitchFamily="34" charset="0"/>
-                </a:endParaRPr>
-              </a:p>
-              <a:p>
-                <a:pPr eaLnBrk="1" hangingPunct="1"/>
-                <a14:m>
-                  <m:oMathPara xmlns:m="http://schemas.openxmlformats.org/officeDocument/2006/math">
-                    <m:oMathParaPr>
-                      <m:jc m:val="centerGroup"/>
-                    </m:oMathParaPr>
-                    <m:oMath xmlns:m="http://schemas.openxmlformats.org/officeDocument/2006/math">
-                      <m:r>
-                        <a:rPr lang="en-US" sz="2000" i="1">
-                          <a:latin typeface="Cambria Math" panose="02040503050406030204" pitchFamily="18" charset="0"/>
-                        </a:rPr>
-                        <m:t>𝑝</m:t>
-                      </m:r>
-                      <m:d>
-                        <m:dPr>
-                          <m:ctrlPr>
-                            <a:rPr lang="en-US" sz="2000" i="1">
-                              <a:latin typeface="Cambria Math" panose="02040503050406030204" pitchFamily="18" charset="0"/>
-                            </a:rPr>
-                          </m:ctrlPr>
-                        </m:dPr>
-                        <m:e>
-                          <m:r>
-                            <a:rPr lang="en-US" sz="2000" i="1">
-                              <a:latin typeface="Cambria Math" panose="02040503050406030204" pitchFamily="18" charset="0"/>
-                            </a:rPr>
-                            <m:t>𝐷</m:t>
-                          </m:r>
-                        </m:e>
-                        <m:e>
-                          <m:r>
-                            <a:rPr lang="en-US" sz="2000" i="1">
-                              <a:latin typeface="Cambria Math" panose="02040503050406030204" pitchFamily="18" charset="0"/>
-                            </a:rPr>
-                            <m:t>𝜃</m:t>
-                          </m:r>
-                          <m:r>
-                            <a:rPr lang="en-US" sz="2000" i="1">
-                              <a:latin typeface="Cambria Math" panose="02040503050406030204" pitchFamily="18" charset="0"/>
-                            </a:rPr>
-                            <m:t>,</m:t>
-                          </m:r>
-                          <m:r>
-                            <a:rPr lang="en-US" sz="2000" i="1">
-                              <a:latin typeface="Cambria Math" panose="02040503050406030204" pitchFamily="18" charset="0"/>
-                            </a:rPr>
-                            <m:t>𝛾</m:t>
-                          </m:r>
-                          <m:r>
-                            <a:rPr lang="en-US" sz="2000" i="1">
-                              <a:latin typeface="Cambria Math" panose="02040503050406030204" pitchFamily="18" charset="0"/>
-                            </a:rPr>
-                            <m:t>,</m:t>
-                          </m:r>
-                          <m:r>
-                            <a:rPr lang="en-US" sz="2000" i="1">
-                              <a:latin typeface="Cambria Math" panose="02040503050406030204" pitchFamily="18" charset="0"/>
-                            </a:rPr>
-                            <m:t>𝑀</m:t>
-                          </m:r>
-                        </m:e>
-                      </m:d>
-                      <m:r>
-                        <a:rPr lang="en-US" sz="2000" i="1">
-                          <a:latin typeface="Cambria Math" panose="02040503050406030204" pitchFamily="18" charset="0"/>
-                        </a:rPr>
-                        <m:t>=</m:t>
-                      </m:r>
-                      <m:nary>
-                        <m:naryPr>
-                          <m:chr m:val="∏"/>
-                          <m:ctrlPr>
-                            <a:rPr lang="en-US" sz="2000" i="1">
-                              <a:latin typeface="Cambria Math" panose="02040503050406030204" pitchFamily="18" charset="0"/>
-                            </a:rPr>
-                          </m:ctrlPr>
-                        </m:naryPr>
-                        <m:sub>
-                          <m:r>
-                            <a:rPr lang="en-US" sz="2000" i="1">
-                              <a:latin typeface="Cambria Math" panose="02040503050406030204" pitchFamily="18" charset="0"/>
-                            </a:rPr>
-                            <m:t>𝑖</m:t>
-                          </m:r>
-                          <m:r>
-                            <a:rPr lang="en-US" sz="2000" i="1">
-                              <a:latin typeface="Cambria Math" panose="02040503050406030204" pitchFamily="18" charset="0"/>
-                            </a:rPr>
-                            <m:t>=1</m:t>
-                          </m:r>
-                        </m:sub>
-                        <m:sup>
-                          <m:r>
-                            <a:rPr lang="en-US" sz="2000" i="1">
-                              <a:latin typeface="Cambria Math" panose="02040503050406030204" pitchFamily="18" charset="0"/>
-                            </a:rPr>
-                            <m:t>𝑣</m:t>
-                          </m:r>
-                        </m:sup>
-                        <m:e>
-                          <m:r>
-                            <a:rPr lang="en-US" sz="2000" i="1">
-                              <a:latin typeface="Cambria Math" panose="02040503050406030204" pitchFamily="18" charset="0"/>
-                            </a:rPr>
-                            <m:t>∫</m:t>
-                          </m:r>
-                          <m:r>
-                            <a:rPr lang="en-US" sz="2000" i="1">
-                              <a:latin typeface="Cambria Math" panose="02040503050406030204" pitchFamily="18" charset="0"/>
-                            </a:rPr>
-                            <m:t>𝑝</m:t>
-                          </m:r>
-                          <m:d>
-                            <m:dPr>
-                              <m:ctrlPr>
-                                <a:rPr lang="en-US" sz="2000" i="1">
-                                  <a:latin typeface="Cambria Math" panose="02040503050406030204" pitchFamily="18" charset="0"/>
-                                </a:rPr>
-                              </m:ctrlPr>
-                            </m:dPr>
-                            <m:e>
-                              <m:sSub>
-                                <m:sSubPr>
-                                  <m:ctrlPr>
-                                    <a:rPr lang="en-US" sz="2000" i="1">
-                                      <a:latin typeface="Cambria Math" panose="02040503050406030204" pitchFamily="18" charset="0"/>
-                                    </a:rPr>
-                                  </m:ctrlPr>
-                                </m:sSubPr>
-                                <m:e>
-                                  <m:r>
-                                    <a:rPr lang="en-US" sz="2000" i="1">
-                                      <a:latin typeface="Cambria Math" panose="02040503050406030204" pitchFamily="18" charset="0"/>
-                                    </a:rPr>
-                                    <m:t>𝑥</m:t>
-                                  </m:r>
-                                </m:e>
-                                <m:sub>
-                                  <m:r>
-                                    <a:rPr lang="en-US" sz="2000" i="1">
-                                      <a:latin typeface="Cambria Math" panose="02040503050406030204" pitchFamily="18" charset="0"/>
-                                    </a:rPr>
-                                    <m:t>𝑖</m:t>
-                                  </m:r>
-                                </m:sub>
-                              </m:sSub>
-                            </m:e>
-                            <m:e>
-                              <m:sSub>
-                                <m:sSubPr>
-                                  <m:ctrlPr>
-                                    <a:rPr lang="en-US" sz="2000" i="1">
-                                      <a:latin typeface="Cambria Math" panose="02040503050406030204" pitchFamily="18" charset="0"/>
-                                    </a:rPr>
-                                  </m:ctrlPr>
-                                </m:sSubPr>
-                                <m:e>
-                                  <m:r>
-                                    <a:rPr lang="en-US" sz="2000" i="1">
-                                      <a:latin typeface="Cambria Math" panose="02040503050406030204" pitchFamily="18" charset="0"/>
-                                    </a:rPr>
-                                    <m:t>𝛾</m:t>
-                                  </m:r>
-                                </m:e>
-                                <m:sub>
-                                  <m:r>
-                                    <a:rPr lang="en-US" sz="2000" i="1">
-                                      <a:latin typeface="Cambria Math" panose="02040503050406030204" pitchFamily="18" charset="0"/>
-                                    </a:rPr>
-                                    <m:t>𝑖</m:t>
-                                  </m:r>
-                                </m:sub>
-                              </m:sSub>
-                              <m:r>
-                                <a:rPr lang="en-US" sz="2000" i="1">
-                                  <a:latin typeface="Cambria Math" panose="02040503050406030204" pitchFamily="18" charset="0"/>
-                                </a:rPr>
-                                <m:t>,</m:t>
-                              </m:r>
-                              <m:sSub>
-                                <m:sSubPr>
-                                  <m:ctrlPr>
-                                    <a:rPr lang="en-US" sz="2000" i="1">
-                                      <a:latin typeface="Cambria Math" panose="02040503050406030204" pitchFamily="18" charset="0"/>
-                                    </a:rPr>
-                                  </m:ctrlPr>
-                                </m:sSubPr>
-                                <m:e>
-                                  <m:r>
-                                    <a:rPr lang="en-US" sz="2000" i="1">
-                                      <a:latin typeface="Cambria Math" panose="02040503050406030204" pitchFamily="18" charset="0"/>
-                                    </a:rPr>
-                                    <m:t>𝑀</m:t>
-                                  </m:r>
-                                </m:e>
-                                <m:sub>
-                                  <m:r>
-                                    <a:rPr lang="en-US" sz="2000" i="1">
-                                      <a:latin typeface="Cambria Math" panose="02040503050406030204" pitchFamily="18" charset="0"/>
-                                    </a:rPr>
-                                    <m:t>𝑖</m:t>
-                                  </m:r>
-                                </m:sub>
-                              </m:sSub>
-                            </m:e>
-                          </m:d>
-                          <m:r>
-                            <a:rPr lang="en-US" sz="2000" i="1">
-                              <a:latin typeface="Cambria Math" panose="02040503050406030204" pitchFamily="18" charset="0"/>
-                            </a:rPr>
-                            <m:t>𝑝</m:t>
-                          </m:r>
-                          <m:d>
-                            <m:dPr>
-                              <m:ctrlPr>
-                                <a:rPr lang="en-US" sz="2000" i="1">
-                                  <a:latin typeface="Cambria Math" panose="02040503050406030204" pitchFamily="18" charset="0"/>
-                                </a:rPr>
-                              </m:ctrlPr>
-                            </m:dPr>
-                            <m:e>
-                              <m:sSub>
-                                <m:sSubPr>
-                                  <m:ctrlPr>
-                                    <a:rPr lang="en-US" sz="2000" i="1">
-                                      <a:latin typeface="Cambria Math" panose="02040503050406030204" pitchFamily="18" charset="0"/>
-                                    </a:rPr>
-                                  </m:ctrlPr>
-                                </m:sSubPr>
-                                <m:e>
-                                  <m:r>
-                                    <a:rPr lang="en-US" sz="2000" i="1">
-                                      <a:latin typeface="Cambria Math" panose="02040503050406030204" pitchFamily="18" charset="0"/>
-                                    </a:rPr>
-                                    <m:t>𝛾</m:t>
-                                  </m:r>
-                                </m:e>
-                                <m:sub>
-                                  <m:r>
-                                    <a:rPr lang="en-US" sz="2000" i="1">
-                                      <a:latin typeface="Cambria Math" panose="02040503050406030204" pitchFamily="18" charset="0"/>
-                                    </a:rPr>
-                                    <m:t>𝑖</m:t>
-                                  </m:r>
-                                </m:sub>
-                              </m:sSub>
-                            </m:e>
-                            <m:e>
-                              <m:r>
-                                <a:rPr lang="en-US" sz="2000" i="1">
-                                  <a:latin typeface="Cambria Math" panose="02040503050406030204" pitchFamily="18" charset="0"/>
-                                </a:rPr>
-                                <m:t>𝑝𝑎𝑟𝑒𝑛𝑡</m:t>
-                              </m:r>
-                              <m:d>
-                                <m:dPr>
-                                  <m:ctrlPr>
-                                    <a:rPr lang="en-US" sz="2000" i="1">
-                                      <a:latin typeface="Cambria Math" panose="02040503050406030204" pitchFamily="18" charset="0"/>
-                                    </a:rPr>
-                                  </m:ctrlPr>
-                                </m:dPr>
-                                <m:e>
-                                  <m:sSub>
-                                    <m:sSubPr>
-                                      <m:ctrlPr>
-                                        <a:rPr lang="en-US" sz="2000" i="1">
-                                          <a:latin typeface="Cambria Math" panose="02040503050406030204" pitchFamily="18" charset="0"/>
-                                        </a:rPr>
-                                      </m:ctrlPr>
-                                    </m:sSubPr>
-                                    <m:e>
-                                      <m:r>
-                                        <a:rPr lang="en-US" sz="2000" i="1">
-                                          <a:latin typeface="Cambria Math" panose="02040503050406030204" pitchFamily="18" charset="0"/>
-                                        </a:rPr>
-                                        <m:t>𝛾</m:t>
-                                      </m:r>
-                                    </m:e>
-                                    <m:sub>
-                                      <m:r>
-                                        <a:rPr lang="en-US" sz="2000" i="1">
-                                          <a:latin typeface="Cambria Math" panose="02040503050406030204" pitchFamily="18" charset="0"/>
-                                        </a:rPr>
-                                        <m:t>𝑖</m:t>
-                                      </m:r>
-                                    </m:sub>
-                                  </m:sSub>
-                                </m:e>
-                              </m:d>
-                              <m:r>
-                                <a:rPr lang="en-US" sz="2000" i="1">
-                                  <a:latin typeface="Cambria Math" panose="02040503050406030204" pitchFamily="18" charset="0"/>
-                                </a:rPr>
-                                <m:t>,</m:t>
-                              </m:r>
-                              <m:sSub>
-                                <m:sSubPr>
-                                  <m:ctrlPr>
-                                    <a:rPr lang="en-US" sz="2000" i="1">
-                                      <a:latin typeface="Cambria Math" panose="02040503050406030204" pitchFamily="18" charset="0"/>
-                                    </a:rPr>
-                                  </m:ctrlPr>
-                                </m:sSubPr>
-                                <m:e>
-                                  <m:r>
-                                    <a:rPr lang="en-US" sz="2000" i="1">
-                                      <a:latin typeface="Cambria Math" panose="02040503050406030204" pitchFamily="18" charset="0"/>
-                                    </a:rPr>
-                                    <m:t>𝜃</m:t>
-                                  </m:r>
-                                </m:e>
-                                <m:sub>
-                                  <m:r>
-                                    <a:rPr lang="en-US" sz="2000" i="1">
-                                      <a:latin typeface="Cambria Math" panose="02040503050406030204" pitchFamily="18" charset="0"/>
-                                    </a:rPr>
-                                    <m:t>𝑖</m:t>
-                                  </m:r>
-                                </m:sub>
-                              </m:sSub>
-                              <m:r>
-                                <a:rPr lang="en-US" sz="2000" i="1">
-                                  <a:latin typeface="Cambria Math" panose="02040503050406030204" pitchFamily="18" charset="0"/>
-                                </a:rPr>
-                                <m:t>,</m:t>
-                              </m:r>
-                              <m:sSub>
-                                <m:sSubPr>
-                                  <m:ctrlPr>
-                                    <a:rPr lang="en-US" sz="2000" i="1">
-                                      <a:latin typeface="Cambria Math" panose="02040503050406030204" pitchFamily="18" charset="0"/>
-                                    </a:rPr>
-                                  </m:ctrlPr>
-                                </m:sSubPr>
-                                <m:e>
-                                  <m:r>
-                                    <a:rPr lang="en-US" sz="2000" i="1">
-                                      <a:latin typeface="Cambria Math" panose="02040503050406030204" pitchFamily="18" charset="0"/>
-                                    </a:rPr>
-                                    <m:t>𝛾</m:t>
-                                  </m:r>
-                                </m:e>
-                                <m:sub>
-                                  <m:r>
-                                    <a:rPr lang="en-US" sz="2000" i="1">
-                                      <a:latin typeface="Cambria Math" panose="02040503050406030204" pitchFamily="18" charset="0"/>
-                                    </a:rPr>
-                                    <m:t>𝑖</m:t>
-                                  </m:r>
-                                </m:sub>
-                              </m:sSub>
-                              <m:r>
-                                <a:rPr lang="en-US" sz="2000" i="1">
-                                  <a:latin typeface="Cambria Math" panose="02040503050406030204" pitchFamily="18" charset="0"/>
-                                </a:rPr>
-                                <m:t>,</m:t>
-                              </m:r>
-                              <m:sSub>
-                                <m:sSubPr>
-                                  <m:ctrlPr>
-                                    <a:rPr lang="en-US" sz="2000" i="1">
-                                      <a:latin typeface="Cambria Math" panose="02040503050406030204" pitchFamily="18" charset="0"/>
-                                    </a:rPr>
-                                  </m:ctrlPr>
-                                </m:sSubPr>
-                                <m:e>
-                                  <m:r>
-                                    <a:rPr lang="en-US" sz="2000" i="1">
-                                      <a:latin typeface="Cambria Math" panose="02040503050406030204" pitchFamily="18" charset="0"/>
-                                    </a:rPr>
-                                    <m:t>𝑥</m:t>
-                                  </m:r>
-                                </m:e>
-                                <m:sub>
-                                  <m:r>
-                                    <a:rPr lang="en-US" sz="2000" i="1">
-                                      <a:latin typeface="Cambria Math" panose="02040503050406030204" pitchFamily="18" charset="0"/>
-                                    </a:rPr>
-                                    <m:t>𝑖</m:t>
-                                  </m:r>
-                                </m:sub>
-                              </m:sSub>
-                              <m:r>
-                                <a:rPr lang="en-US" sz="2000" i="1">
-                                  <a:latin typeface="Cambria Math" panose="02040503050406030204" pitchFamily="18" charset="0"/>
-                                </a:rPr>
-                                <m:t>,</m:t>
-                              </m:r>
-                              <m:sSub>
-                                <m:sSubPr>
-                                  <m:ctrlPr>
-                                    <a:rPr lang="en-US" sz="2000" i="1">
-                                      <a:latin typeface="Cambria Math" panose="02040503050406030204" pitchFamily="18" charset="0"/>
-                                    </a:rPr>
-                                  </m:ctrlPr>
-                                </m:sSubPr>
-                                <m:e>
-                                  <m:r>
-                                    <a:rPr lang="en-US" sz="2000" i="1">
-                                      <a:latin typeface="Cambria Math" panose="02040503050406030204" pitchFamily="18" charset="0"/>
-                                    </a:rPr>
-                                    <m:t>𝑀</m:t>
-                                  </m:r>
-                                </m:e>
-                                <m:sub>
-                                  <m:r>
-                                    <a:rPr lang="en-US" sz="2000" i="1">
-                                      <a:latin typeface="Cambria Math" panose="02040503050406030204" pitchFamily="18" charset="0"/>
-                                    </a:rPr>
-                                    <m:t>𝑖</m:t>
-                                  </m:r>
-                                </m:sub>
-                              </m:sSub>
-                            </m:e>
-                          </m:d>
-                          <m:r>
-                            <a:rPr lang="en-US" sz="2000" i="1">
-                              <a:latin typeface="Cambria Math" panose="02040503050406030204" pitchFamily="18" charset="0"/>
-                            </a:rPr>
-                            <m:t>𝑑</m:t>
-                          </m:r>
-                          <m:sSub>
-                            <m:sSubPr>
-                              <m:ctrlPr>
-                                <a:rPr lang="en-US" sz="2000" i="1">
-                                  <a:latin typeface="Cambria Math" panose="02040503050406030204" pitchFamily="18" charset="0"/>
-                                </a:rPr>
-                              </m:ctrlPr>
-                            </m:sSubPr>
-                            <m:e>
-                              <m:r>
-                                <a:rPr lang="en-US" sz="2000" i="1">
-                                  <a:latin typeface="Cambria Math" panose="02040503050406030204" pitchFamily="18" charset="0"/>
-                                </a:rPr>
-                                <m:t>𝑥</m:t>
-                              </m:r>
-                            </m:e>
-                            <m:sub>
-                              <m:r>
-                                <a:rPr lang="en-US" sz="2000" i="1">
-                                  <a:latin typeface="Cambria Math" panose="02040503050406030204" pitchFamily="18" charset="0"/>
-                                </a:rPr>
-                                <m:t>𝑖</m:t>
-                              </m:r>
-                            </m:sub>
-                          </m:sSub>
-                        </m:e>
-                      </m:nary>
-                    </m:oMath>
-                  </m:oMathPara>
-                </a14:m>
-                <a:endParaRPr lang="en-US" sz="2000" dirty="0">
-                  <a:latin typeface="Calibri" pitchFamily="34" charset="0"/>
-                </a:endParaRPr>
-              </a:p>
-              <a:p>
-                <a:pPr marL="342900" eaLnBrk="1" hangingPunct="1"/>
-                <a:r>
-                  <a:rPr lang="en-US" sz="2000" dirty="0">
-                    <a:latin typeface="Calibri" pitchFamily="34" charset="0"/>
-                  </a:rPr>
-                  <a:t>Our Bayesian networks learned this way may not be empirical, but are an effective </a:t>
-                </a:r>
-                <a:r>
-                  <a:rPr lang="en-US" sz="2000" b="1" dirty="0">
-                    <a:latin typeface="Calibri" pitchFamily="34" charset="0"/>
-                  </a:rPr>
-                  <a:t>vector mapping heuristic</a:t>
-                </a:r>
-                <a:r>
-                  <a:rPr lang="en-US" sz="2000" dirty="0">
-                    <a:latin typeface="Calibri" pitchFamily="34" charset="0"/>
-                  </a:rPr>
-                  <a:t> to transform highly-dimensional </a:t>
-                </a:r>
-                <a:r>
-                  <a:rPr lang="en-US" sz="2000" dirty="0" err="1">
-                    <a:latin typeface="Calibri" pitchFamily="34" charset="0"/>
-                  </a:rPr>
-                  <a:t>featurized</a:t>
-                </a:r>
-                <a:r>
-                  <a:rPr lang="en-US" sz="2000" dirty="0">
-                    <a:latin typeface="Calibri" pitchFamily="34" charset="0"/>
-                  </a:rPr>
-                  <a:t> data back into realistic value 		         vectors for humanistic biometric imitation. </a:t>
-                </a:r>
-              </a:p>
-              <a:p>
-                <a:pPr marL="342900" indent="-342900" eaLnBrk="1" hangingPunct="1">
-                  <a:buFont typeface="Arial" panose="020B0604020202020204" pitchFamily="34" charset="0"/>
-                  <a:buChar char="•"/>
-                </a:pPr>
-                <a:endParaRPr lang="en-US" sz="2000" dirty="0">
-                  <a:latin typeface="Calibri" pitchFamily="34" charset="0"/>
-                </a:endParaRPr>
-              </a:p>
-              <a:p>
-                <a:pPr marL="342900" indent="-342900" eaLnBrk="1" hangingPunct="1">
-                  <a:buFont typeface="Arial" panose="020B0604020202020204" pitchFamily="34" charset="0"/>
-                  <a:buChar char="•"/>
-                </a:pPr>
-                <a:endParaRPr lang="en-US" sz="2000" dirty="0">
-                  <a:latin typeface="Calibri" pitchFamily="34" charset="0"/>
-                </a:endParaRPr>
-              </a:p>
-              <a:p>
-                <a:pPr marL="342900" indent="-342900" eaLnBrk="1" hangingPunct="1">
-                  <a:buFont typeface="Arial" panose="020B0604020202020204" pitchFamily="34" charset="0"/>
-                  <a:buChar char="•"/>
-                </a:pPr>
-                <a:endParaRPr lang="en-US" sz="2000" dirty="0">
-                  <a:latin typeface="Calibri" pitchFamily="34" charset="0"/>
-                </a:endParaRPr>
-              </a:p>
-              <a:p>
-                <a:pPr marL="342900" indent="-342900" eaLnBrk="1" hangingPunct="1">
-                  <a:buFont typeface="Arial" panose="020B0604020202020204" pitchFamily="34" charset="0"/>
-                  <a:buChar char="•"/>
-                </a:pPr>
-                <a:endParaRPr lang="en-US" sz="2000" dirty="0">
-                  <a:latin typeface="Calibri" pitchFamily="34" charset="0"/>
-                </a:endParaRPr>
-              </a:p>
-              <a:p>
-                <a:pPr marL="342900" indent="-342900" eaLnBrk="1" hangingPunct="1">
-                  <a:buFont typeface="Arial" panose="020B0604020202020204" pitchFamily="34" charset="0"/>
-                  <a:buChar char="•"/>
-                </a:pPr>
-                <a:endParaRPr lang="en-US" sz="2000" dirty="0">
-                  <a:latin typeface="Calibri" pitchFamily="34" charset="0"/>
-                </a:endParaRPr>
-              </a:p>
-              <a:p>
-                <a:pPr marL="342900" indent="-342900" eaLnBrk="1" hangingPunct="1">
-                  <a:buFont typeface="Arial" panose="020B0604020202020204" pitchFamily="34" charset="0"/>
-                  <a:buChar char="•"/>
-                </a:pPr>
-                <a:endParaRPr lang="en-US" sz="2000" dirty="0">
-                  <a:latin typeface="Calibri" pitchFamily="34" charset="0"/>
-                </a:endParaRPr>
-              </a:p>
-              <a:p>
-                <a:pPr marL="342900" indent="-342900" eaLnBrk="1" hangingPunct="1">
-                  <a:buFont typeface="Arial" panose="020B0604020202020204" pitchFamily="34" charset="0"/>
-                  <a:buChar char="•"/>
-                </a:pPr>
-                <a:endParaRPr lang="en-US" sz="2000" dirty="0">
-                  <a:latin typeface="Calibri" pitchFamily="34" charset="0"/>
-                </a:endParaRPr>
-              </a:p>
-              <a:p>
-                <a:pPr marL="342900" indent="-342900" eaLnBrk="1" hangingPunct="1">
-                  <a:buFont typeface="Arial" panose="020B0604020202020204" pitchFamily="34" charset="0"/>
-                  <a:buChar char="•"/>
-                </a:pPr>
-                <a:endParaRPr lang="en-US" sz="2000" dirty="0">
-                  <a:latin typeface="Calibri" pitchFamily="34" charset="0"/>
-                </a:endParaRPr>
-              </a:p>
-              <a:p>
-                <a:pPr eaLnBrk="1" hangingPunct="1"/>
-                <a:endParaRPr lang="en-US" sz="2000" dirty="0">
-                  <a:latin typeface="Calibri" pitchFamily="34" charset="0"/>
-                </a:endParaRPr>
-              </a:p>
-              <a:p>
-                <a:pPr marL="342900" indent="-342900" eaLnBrk="1" hangingPunct="1">
-                  <a:buFont typeface="Arial" panose="020B0604020202020204" pitchFamily="34" charset="0"/>
-                  <a:buChar char="•"/>
-                </a:pPr>
-                <a:endParaRPr lang="en-US" sz="2000" dirty="0">
-                  <a:latin typeface="Calibri" pitchFamily="34" charset="0"/>
-                </a:endParaRPr>
-              </a:p>
-              <a:p>
-                <a:pPr eaLnBrk="1" hangingPunct="1"/>
-                <a:endParaRPr lang="en-US" sz="2000" dirty="0">
-                  <a:latin typeface="Calibri" pitchFamily="34" charset="0"/>
-                </a:endParaRPr>
-              </a:p>
-              <a:p>
-                <a:pPr marL="342900" indent="-342900" eaLnBrk="1" hangingPunct="1">
-                  <a:buFont typeface="Arial" panose="020B0604020202020204" pitchFamily="34" charset="0"/>
-                  <a:buChar char="•"/>
-                </a:pPr>
-                <a:endParaRPr lang="en-US" sz="2000" dirty="0">
-                  <a:latin typeface="Calibri" pitchFamily="34" charset="0"/>
-                </a:endParaRPr>
-              </a:p>
-              <a:p>
-                <a:pPr marL="342900" indent="-342900" eaLnBrk="1" hangingPunct="1">
-                  <a:buFont typeface="Arial" panose="020B0604020202020204" pitchFamily="34" charset="0"/>
-                  <a:buChar char="•"/>
-                </a:pPr>
-                <a:endParaRPr lang="en-US" sz="2000" dirty="0">
-                  <a:latin typeface="Calibri" pitchFamily="34" charset="0"/>
-                </a:endParaRPr>
-              </a:p>
-            </p:txBody>
-          </p:sp>
-        </mc:Choice>
-        <mc:Fallback xmlns="">
-          <p:sp>
-            <p:nvSpPr>
-              <p:cNvPr id="13" name="Text Box 192"/>
-              <p:cNvSpPr txBox="1">
-                <a:spLocks noRot="1" noChangeAspect="1" noMove="1" noResize="1" noEditPoints="1" noAdjustHandles="1" noChangeArrowheads="1" noChangeShapeType="1" noTextEdit="1"/>
-              </p:cNvSpPr>
-              <p:nvPr/>
-            </p:nvSpPr>
-            <p:spPr bwMode="auto">
-              <a:xfrm>
-                <a:off x="9601200" y="3048000"/>
-                <a:ext cx="8229600" cy="12634206"/>
-              </a:xfrm>
-              <a:prstGeom prst="rect">
-                <a:avLst/>
-              </a:prstGeom>
-              <a:blipFill rotWithShape="0">
-                <a:blip r:embed="rId2"/>
-                <a:stretch>
-                  <a:fillRect l="-444" r="-1109"/>
-                </a:stretch>
-              </a:blipFill>
-              <a:ln w="12700">
-                <a:solidFill>
-                  <a:schemeClr val="accent1">
-                    <a:lumMod val="75000"/>
-                  </a:schemeClr>
-                </a:solidFill>
-              </a:ln>
-              <a:effectLst/>
-            </p:spPr>
-            <p:txBody>
-              <a:bodyPr/>
-              <a:lstStyle/>
-              <a:p>
-                <a:r>
-                  <a:rPr lang="en-US">
-                    <a:noFill/>
-                  </a:rPr>
-                  <a:t> </a:t>
-                </a:r>
-              </a:p>
-            </p:txBody>
-          </p:sp>
-        </mc:Fallback>
-      </mc:AlternateContent>
+      <p:sp>
+        <p:nvSpPr>
+          <p:cNvPr id="13" name="Text Box 192"/>
+          <p:cNvSpPr txBox="1">
+            <a:spLocks noChangeArrowheads="1"/>
+          </p:cNvSpPr>
+          <p:nvPr/>
+        </p:nvSpPr>
+        <p:spPr bwMode="auto">
+          <a:xfrm>
+            <a:off x="11521440" y="3657601"/>
+            <a:ext cx="9875520" cy="12816636"/>
+          </a:xfrm>
+          <a:prstGeom prst="rect">
+            <a:avLst/>
+          </a:prstGeom>
+          <a:solidFill>
+            <a:schemeClr val="bg1"/>
+          </a:solidFill>
+          <a:ln w="12700">
+            <a:solidFill>
+              <a:schemeClr val="accent1">
+                <a:lumMod val="75000"/>
+              </a:schemeClr>
+            </a:solidFill>
+          </a:ln>
+          <a:effectLst/>
+        </p:spPr>
+        <p:txBody>
+          <a:bodyPr lIns="97942" tIns="97942" rIns="97942" bIns="97942">
+            <a:spAutoFit/>
+          </a:bodyPr>
+          <a:lstStyle>
+            <a:lvl1pPr eaLnBrk="0" hangingPunct="0">
+              <a:defRPr sz="2200">
+                <a:solidFill>
+                  <a:schemeClr val="tx1"/>
+                </a:solidFill>
+                <a:latin typeface="Arial" charset="0"/>
+              </a:defRPr>
+            </a:lvl1pPr>
+            <a:lvl2pPr marL="742950" indent="-285750" eaLnBrk="0" hangingPunct="0">
+              <a:defRPr sz="2200">
+                <a:solidFill>
+                  <a:schemeClr val="tx1"/>
+                </a:solidFill>
+                <a:latin typeface="Arial" charset="0"/>
+              </a:defRPr>
+            </a:lvl2pPr>
+            <a:lvl3pPr marL="1143000" indent="-228600" eaLnBrk="0" hangingPunct="0">
+              <a:defRPr sz="2200">
+                <a:solidFill>
+                  <a:schemeClr val="tx1"/>
+                </a:solidFill>
+                <a:latin typeface="Arial" charset="0"/>
+              </a:defRPr>
+            </a:lvl3pPr>
+            <a:lvl4pPr marL="1600200" indent="-228600" eaLnBrk="0" hangingPunct="0">
+              <a:defRPr sz="2200">
+                <a:solidFill>
+                  <a:schemeClr val="tx1"/>
+                </a:solidFill>
+                <a:latin typeface="Arial" charset="0"/>
+              </a:defRPr>
+            </a:lvl4pPr>
+            <a:lvl5pPr marL="2057400" indent="-228600" eaLnBrk="0" hangingPunct="0">
+              <a:defRPr sz="2200">
+                <a:solidFill>
+                  <a:schemeClr val="tx1"/>
+                </a:solidFill>
+                <a:latin typeface="Arial" charset="0"/>
+              </a:defRPr>
+            </a:lvl5pPr>
+            <a:lvl6pPr marL="2514600" indent="-228600" eaLnBrk="0" fontAlgn="base" hangingPunct="0">
+              <a:spcBef>
+                <a:spcPct val="0"/>
+              </a:spcBef>
+              <a:spcAft>
+                <a:spcPct val="0"/>
+              </a:spcAft>
+              <a:defRPr sz="2200">
+                <a:solidFill>
+                  <a:schemeClr val="tx1"/>
+                </a:solidFill>
+                <a:latin typeface="Arial" charset="0"/>
+              </a:defRPr>
+            </a:lvl6pPr>
+            <a:lvl7pPr marL="2971800" indent="-228600" eaLnBrk="0" fontAlgn="base" hangingPunct="0">
+              <a:spcBef>
+                <a:spcPct val="0"/>
+              </a:spcBef>
+              <a:spcAft>
+                <a:spcPct val="0"/>
+              </a:spcAft>
+              <a:defRPr sz="2200">
+                <a:solidFill>
+                  <a:schemeClr val="tx1"/>
+                </a:solidFill>
+                <a:latin typeface="Arial" charset="0"/>
+              </a:defRPr>
+            </a:lvl7pPr>
+            <a:lvl8pPr marL="3429000" indent="-228600" eaLnBrk="0" fontAlgn="base" hangingPunct="0">
+              <a:spcBef>
+                <a:spcPct val="0"/>
+              </a:spcBef>
+              <a:spcAft>
+                <a:spcPct val="0"/>
+              </a:spcAft>
+              <a:defRPr sz="2200">
+                <a:solidFill>
+                  <a:schemeClr val="tx1"/>
+                </a:solidFill>
+                <a:latin typeface="Arial" charset="0"/>
+              </a:defRPr>
+            </a:lvl8pPr>
+            <a:lvl9pPr marL="3886200" indent="-228600" eaLnBrk="0" fontAlgn="base" hangingPunct="0">
+              <a:spcBef>
+                <a:spcPct val="0"/>
+              </a:spcBef>
+              <a:spcAft>
+                <a:spcPct val="0"/>
+              </a:spcAft>
+              <a:defRPr sz="2200">
+                <a:solidFill>
+                  <a:schemeClr val="tx1"/>
+                </a:solidFill>
+                <a:latin typeface="Arial" charset="0"/>
+              </a:defRPr>
+            </a:lvl9pPr>
+          </a:lstStyle>
+          <a:p>
+            <a:pPr marL="342900" indent="-342900" eaLnBrk="1" hangingPunct="1">
+              <a:buFont typeface="Arial" panose="020B0604020202020204" pitchFamily="34" charset="0"/>
+              <a:buChar char="•"/>
+            </a:pPr>
+            <a:r>
+              <a:rPr lang="en-US" sz="2000" b="1" dirty="0"/>
+              <a:t>Logistic regression with cross entropy loss and no </a:t>
+            </a:r>
+            <a:r>
+              <a:rPr lang="en-US" sz="2000" b="1" dirty="0" smtClean="0"/>
+              <a:t>resampling</a:t>
+            </a:r>
+          </a:p>
+          <a:p>
+            <a:r>
+              <a:rPr lang="en-US" sz="2000" dirty="0"/>
+              <a:t>We trained a logistic regression model optimized using cross entropy loss. For this preliminary </a:t>
+            </a:r>
+            <a:r>
+              <a:rPr lang="en-US" sz="2000" dirty="0" smtClean="0"/>
+              <a:t>stage, we </a:t>
+            </a:r>
+            <a:r>
+              <a:rPr lang="en-US" sz="2000" dirty="0"/>
+              <a:t>pulled from a subset of the dataset. We generated </a:t>
+            </a:r>
+            <a:r>
+              <a:rPr lang="en-US" sz="2000" dirty="0" smtClean="0"/>
+              <a:t>concatenated </a:t>
+            </a:r>
+            <a:r>
+              <a:rPr lang="en-US" sz="2000" dirty="0"/>
+              <a:t>vectors for the first 10 </a:t>
+            </a:r>
+            <a:r>
+              <a:rPr lang="en-US" sz="2000" dirty="0" smtClean="0"/>
+              <a:t>examples each </a:t>
+            </a:r>
+            <a:r>
+              <a:rPr lang="en-US" sz="2000" dirty="0"/>
+              <a:t>of the first 10 users </a:t>
+            </a:r>
+            <a:r>
+              <a:rPr lang="en-US" sz="2000" dirty="0" smtClean="0"/>
+              <a:t>and performed </a:t>
+            </a:r>
+            <a:r>
+              <a:rPr lang="en-US" sz="2000" dirty="0"/>
+              <a:t>our data preprocessing method on the data subset with </a:t>
+            </a:r>
+            <a:r>
+              <a:rPr lang="en-US" sz="2000" dirty="0" smtClean="0"/>
+              <a:t>no under- </a:t>
+            </a:r>
+            <a:r>
+              <a:rPr lang="en-US" sz="2000" dirty="0"/>
+              <a:t>or over-sampling. With 70%-30% train-validation split, we achieved 89.6% accuracy with 0%</a:t>
+            </a:r>
+          </a:p>
+          <a:p>
+            <a:r>
+              <a:rPr lang="en-US" sz="2000" dirty="0"/>
+              <a:t>precision, 0% recall, and 100% specificity. Upon inspection, the model consistently predicted the </a:t>
+            </a:r>
+            <a:r>
+              <a:rPr lang="en-US" sz="2000" dirty="0" smtClean="0"/>
+              <a:t>0 label </a:t>
+            </a:r>
+            <a:r>
+              <a:rPr lang="en-US" sz="2000" dirty="0"/>
+              <a:t>for every single validation example. We hypothesized that the disproportionate prediction </a:t>
+            </a:r>
+            <a:r>
+              <a:rPr lang="en-US" sz="2000" dirty="0" smtClean="0"/>
+              <a:t>of label </a:t>
+            </a:r>
+            <a:r>
+              <a:rPr lang="en-US" sz="2000" dirty="0"/>
+              <a:t>0 was due to heavily unbalanced data, with a significant majority class 0.</a:t>
+            </a:r>
+            <a:endParaRPr lang="en-US" sz="2000" dirty="0" smtClean="0"/>
+          </a:p>
+          <a:p>
+            <a:pPr marL="342900" indent="-342900" eaLnBrk="1" hangingPunct="1">
+              <a:buFont typeface="Arial" panose="020B0604020202020204" pitchFamily="34" charset="0"/>
+              <a:buChar char="•"/>
+            </a:pPr>
+            <a:r>
+              <a:rPr lang="en-US" sz="2000" b="1" dirty="0"/>
+              <a:t>Logistic regression with cross entropy loss and 50-50 </a:t>
+            </a:r>
+            <a:r>
+              <a:rPr lang="en-US" sz="2000" b="1" dirty="0" err="1" smtClean="0"/>
+              <a:t>undersampling</a:t>
+            </a:r>
+            <a:endParaRPr lang="en-US" sz="2000" b="1" dirty="0" smtClean="0"/>
+          </a:p>
+          <a:p>
+            <a:r>
+              <a:rPr lang="en-US" sz="2000" dirty="0"/>
+              <a:t>In our next attempt, we used resampling techniques to balance the majority and minority class </a:t>
+            </a:r>
+            <a:r>
+              <a:rPr lang="en-US" sz="2000" dirty="0" smtClean="0"/>
+              <a:t>to parity</a:t>
+            </a:r>
+            <a:r>
+              <a:rPr lang="en-US" sz="2000" dirty="0"/>
+              <a:t>. With 50-50 </a:t>
+            </a:r>
+            <a:r>
+              <a:rPr lang="en-US" sz="2000" dirty="0" err="1"/>
+              <a:t>undersampling</a:t>
+            </a:r>
+            <a:r>
+              <a:rPr lang="en-US" sz="2000" dirty="0"/>
+              <a:t> using random </a:t>
+            </a:r>
+            <a:r>
+              <a:rPr lang="en-US" sz="2000" dirty="0" err="1"/>
+              <a:t>undersampling</a:t>
+            </a:r>
+            <a:r>
+              <a:rPr lang="en-US" sz="2000" dirty="0"/>
+              <a:t> of the majority class, and </a:t>
+            </a:r>
+            <a:r>
+              <a:rPr lang="en-US" sz="2000" dirty="0" smtClean="0"/>
+              <a:t>using our </a:t>
+            </a:r>
+            <a:r>
+              <a:rPr lang="en-US" sz="2000" dirty="0"/>
+              <a:t>entire post-processed dataset of 8 million comparative examples, we achieved 50.0% </a:t>
+            </a:r>
+            <a:r>
+              <a:rPr lang="en-US" sz="2000" dirty="0" smtClean="0"/>
+              <a:t>accuracy, 50.0</a:t>
+            </a:r>
+            <a:r>
+              <a:rPr lang="en-US" sz="2000" dirty="0"/>
+              <a:t>% precision, 100% recall, and 00.02% specificity. This means 50% likelihood of </a:t>
+            </a:r>
+            <a:r>
+              <a:rPr lang="en-US" sz="2000" dirty="0" smtClean="0"/>
+              <a:t>predicting same </a:t>
+            </a:r>
+            <a:r>
+              <a:rPr lang="en-US" sz="2000" dirty="0"/>
+              <a:t>user when the user was in fact different. This is not more effective than a random guess, </a:t>
+            </a:r>
+            <a:r>
+              <a:rPr lang="en-US" sz="2000" dirty="0" smtClean="0"/>
+              <a:t>so the </a:t>
+            </a:r>
+            <a:r>
+              <a:rPr lang="en-US" sz="2000" dirty="0"/>
+              <a:t>challenge will be lowering the false positive count, as it is more important, from a security </a:t>
+            </a:r>
+            <a:r>
+              <a:rPr lang="en-US" sz="2000" dirty="0" smtClean="0"/>
+              <a:t>point of </a:t>
+            </a:r>
+            <a:r>
+              <a:rPr lang="en-US" sz="2000" dirty="0"/>
+              <a:t>view, to minimize false positives (predict same user, but actually different) than false </a:t>
+            </a:r>
+            <a:r>
+              <a:rPr lang="en-US" sz="2000" dirty="0" smtClean="0"/>
+              <a:t>negatives (predict </a:t>
+            </a:r>
+            <a:r>
+              <a:rPr lang="en-US" sz="2000" dirty="0"/>
+              <a:t>different user, but actually same).</a:t>
+            </a:r>
+            <a:endParaRPr lang="en-US" sz="2000" dirty="0" smtClean="0"/>
+          </a:p>
+          <a:p>
+            <a:pPr marL="342900" indent="-342900" eaLnBrk="1" hangingPunct="1">
+              <a:buFont typeface="Arial" panose="020B0604020202020204" pitchFamily="34" charset="0"/>
+              <a:buChar char="•"/>
+            </a:pPr>
+            <a:r>
+              <a:rPr lang="en-US" sz="2000" b="1" dirty="0"/>
+              <a:t>Fully Connected Deep Neural Nets with cross entropy loss and 50-50 </a:t>
+            </a:r>
+            <a:r>
+              <a:rPr lang="en-US" sz="2000" b="1" dirty="0" err="1" smtClean="0"/>
+              <a:t>undersampling</a:t>
+            </a:r>
+            <a:endParaRPr lang="en-US" sz="2000" b="1" dirty="0" smtClean="0"/>
+          </a:p>
+          <a:p>
+            <a:r>
+              <a:rPr lang="en-US" sz="2000" dirty="0"/>
+              <a:t>From the results in the section above, we hypothesized a single logistic unit could not </a:t>
+            </a:r>
+            <a:r>
+              <a:rPr lang="en-US" sz="2000" dirty="0" smtClean="0"/>
+              <a:t>represent enough </a:t>
+            </a:r>
+            <a:r>
+              <a:rPr lang="en-US" sz="2000" dirty="0"/>
+              <a:t>complexity to capture the relationship between the 142 features of our input. Hence, </a:t>
+            </a:r>
+            <a:r>
+              <a:rPr lang="en-US" sz="2000" dirty="0" smtClean="0"/>
+              <a:t>we trained </a:t>
+            </a:r>
+            <a:r>
+              <a:rPr lang="en-US" sz="2000" dirty="0"/>
+              <a:t>a variety of fully connect deep neural networks and compared their validation </a:t>
+            </a:r>
+            <a:r>
+              <a:rPr lang="en-US" sz="2000" dirty="0" smtClean="0"/>
+              <a:t>accuracy. Deep </a:t>
+            </a:r>
+            <a:r>
+              <a:rPr lang="en-US" sz="2000" dirty="0"/>
+              <a:t>neural nets ranging from 1 hidden layer to 5 hidden layers, with 10 neurons per hidden </a:t>
+            </a:r>
+            <a:r>
+              <a:rPr lang="en-US" sz="2000" dirty="0" smtClean="0"/>
+              <a:t>layer, with </a:t>
+            </a:r>
+            <a:r>
+              <a:rPr lang="en-US" sz="2000" dirty="0" err="1"/>
+              <a:t>relu</a:t>
+            </a:r>
+            <a:r>
+              <a:rPr lang="en-US" sz="2000" dirty="0"/>
+              <a:t> activation, and sigmoid activation on the output layer. The loss function remained </a:t>
+            </a:r>
+            <a:r>
+              <a:rPr lang="en-US" sz="2000" dirty="0" err="1" smtClean="0"/>
+              <a:t>crossentropy</a:t>
+            </a:r>
+            <a:r>
+              <a:rPr lang="en-US" sz="2000" dirty="0" smtClean="0"/>
+              <a:t>. We </a:t>
+            </a:r>
+            <a:r>
+              <a:rPr lang="en-US" sz="2000" dirty="0"/>
+              <a:t>trained each DNN model for 25 epochs from randomly initialized weights and </a:t>
+            </a:r>
+            <a:r>
+              <a:rPr lang="en-US" sz="2000" dirty="0" smtClean="0"/>
+              <a:t>measured their </a:t>
+            </a:r>
+            <a:r>
+              <a:rPr lang="en-US" sz="2000" dirty="0"/>
+              <a:t>validation accuracy. This was repeated 10 times for each DNN model, and the </a:t>
+            </a:r>
+            <a:r>
+              <a:rPr lang="en-US" sz="2000" dirty="0" smtClean="0"/>
+              <a:t> average of validation </a:t>
+            </a:r>
+            <a:r>
+              <a:rPr lang="en-US" sz="2000" dirty="0"/>
+              <a:t>accuracy of 10 trials was recorded as a benchmark of how each additional layer </a:t>
+            </a:r>
+            <a:r>
+              <a:rPr lang="en-US" sz="2000" dirty="0" smtClean="0"/>
+              <a:t>improve the </a:t>
+            </a:r>
+            <a:r>
+              <a:rPr lang="en-US" sz="2000" dirty="0"/>
+              <a:t>performance of the model.</a:t>
+            </a:r>
+          </a:p>
+          <a:p>
+            <a:endParaRPr lang="en-US" sz="2000" dirty="0" smtClean="0"/>
+          </a:p>
+          <a:p>
+            <a:endParaRPr lang="en-US" sz="2000" dirty="0"/>
+          </a:p>
+          <a:p>
+            <a:endParaRPr lang="en-US" sz="2000" dirty="0" smtClean="0"/>
+          </a:p>
+          <a:p>
+            <a:endParaRPr lang="en-US" sz="2000" dirty="0"/>
+          </a:p>
+          <a:p>
+            <a:r>
+              <a:rPr lang="en-US" sz="2000" dirty="0" smtClean="0"/>
+              <a:t>From </a:t>
+            </a:r>
+            <a:r>
+              <a:rPr lang="en-US" sz="2000" dirty="0"/>
+              <a:t>this investigation, we conclude with 10 </a:t>
+            </a:r>
+            <a:r>
+              <a:rPr lang="en-US" sz="2000" dirty="0" err="1"/>
+              <a:t>ReLU</a:t>
+            </a:r>
+            <a:r>
+              <a:rPr lang="en-US" sz="2000" dirty="0"/>
+              <a:t> activated neurons per hidden layer, the 3 </a:t>
+            </a:r>
+            <a:r>
+              <a:rPr lang="en-US" sz="2000" dirty="0" smtClean="0"/>
+              <a:t>hidden layer </a:t>
+            </a:r>
+            <a:r>
+              <a:rPr lang="en-US" sz="2000" dirty="0"/>
+              <a:t>model achieves the best accuracy vs. training speed trade-off. Hence, we retrained that </a:t>
+            </a:r>
+            <a:r>
+              <a:rPr lang="en-US" sz="2000" dirty="0" smtClean="0"/>
+              <a:t>model for </a:t>
+            </a:r>
+            <a:r>
+              <a:rPr lang="en-US" sz="2000" dirty="0"/>
+              <a:t>100 epochs, and produced the following validation results: 79.8% accuracy, 81.7% </a:t>
+            </a:r>
+            <a:r>
+              <a:rPr lang="en-US" sz="2000" dirty="0" smtClean="0"/>
+              <a:t>precision, 76.8</a:t>
+            </a:r>
+            <a:r>
+              <a:rPr lang="en-US" sz="2000" dirty="0"/>
+              <a:t>% recall, and 95.1% specificity.</a:t>
+            </a:r>
+            <a:endParaRPr lang="en-US" sz="2000" dirty="0">
+              <a:latin typeface="Calibri" pitchFamily="34" charset="0"/>
+            </a:endParaRPr>
+          </a:p>
+        </p:txBody>
+      </p:sp>
       <p:sp>
         <p:nvSpPr>
           <p:cNvPr id="34" name="Rectangle 33"/>
@@ -4935,7 +3883,7 @@
         <p:spPr bwMode="auto">
           <a:xfrm>
             <a:off x="21945600" y="14415471"/>
-            <a:ext cx="9875520" cy="4506669"/>
+            <a:ext cx="9875520" cy="505573"/>
           </a:xfrm>
           <a:prstGeom prst="rect">
             <a:avLst/>
@@ -5059,120 +4007,6 @@
               <a:buFont typeface="Arial" panose="020B0604020202020204" pitchFamily="34" charset="0"/>
               <a:buChar char="•"/>
             </a:pPr>
-            <a:r>
-              <a:rPr lang="en-US" sz="2000" dirty="0">
-                <a:latin typeface="Calibri" pitchFamily="34" charset="0"/>
-              </a:rPr>
-              <a:t>Our multivariate Gaussian cluster characterization and sampling algorithm, coupled with our Bayesian network heuristics, achieved </a:t>
-            </a:r>
-            <a:r>
-              <a:rPr lang="en-US" sz="2000" b="1" dirty="0">
-                <a:latin typeface="Calibri" pitchFamily="34" charset="0"/>
-              </a:rPr>
-              <a:t>77% successful spoof rate</a:t>
-            </a:r>
-            <a:r>
-              <a:rPr lang="en-US" sz="2000" dirty="0">
-                <a:latin typeface="Calibri" pitchFamily="34" charset="0"/>
-              </a:rPr>
-              <a:t> against state-of-the-art mobile biometric fraud classifiers (neural nets, as described by </a:t>
-            </a:r>
-            <a:r>
-              <a:rPr lang="en-US" sz="2000" dirty="0" err="1">
-                <a:latin typeface="Calibri" pitchFamily="34" charset="0"/>
-              </a:rPr>
-              <a:t>Teh</a:t>
-            </a:r>
-            <a:r>
-              <a:rPr lang="en-US" sz="2000" dirty="0">
-                <a:latin typeface="Calibri" pitchFamily="34" charset="0"/>
-              </a:rPr>
-              <a:t> </a:t>
-            </a:r>
-            <a:r>
-              <a:rPr lang="en-US" sz="2000" i="1" dirty="0">
-                <a:latin typeface="Calibri" pitchFamily="34" charset="0"/>
-              </a:rPr>
-              <a:t>et al.</a:t>
-            </a:r>
-            <a:r>
-              <a:rPr lang="en-US" sz="2000" dirty="0">
-                <a:latin typeface="Calibri" pitchFamily="34" charset="0"/>
-              </a:rPr>
-              <a:t>). This means that 77% of the time, our </a:t>
-            </a:r>
-            <a:r>
-              <a:rPr lang="en-US" sz="2000" b="1" dirty="0">
-                <a:latin typeface="Calibri" pitchFamily="34" charset="0"/>
-              </a:rPr>
-              <a:t>adversarial biometric examples </a:t>
-            </a:r>
-            <a:r>
-              <a:rPr lang="en-US" sz="2000" dirty="0">
-                <a:latin typeface="Calibri" pitchFamily="34" charset="0"/>
-              </a:rPr>
-              <a:t>successfully trick the best discriminatory classifiers that they are from the genuine user. </a:t>
-            </a:r>
-          </a:p>
-          <a:p>
-            <a:pPr marL="342900" indent="-342900" eaLnBrk="1" hangingPunct="1">
-              <a:buFont typeface="Arial" panose="020B0604020202020204" pitchFamily="34" charset="0"/>
-              <a:buChar char="•"/>
-            </a:pPr>
-            <a:r>
-              <a:rPr lang="en-US" sz="2000" dirty="0">
-                <a:latin typeface="Calibri" pitchFamily="34" charset="0"/>
-              </a:rPr>
-              <a:t>We described a framework that allows for </a:t>
-            </a:r>
-            <a:r>
-              <a:rPr lang="en-US" sz="2000" b="1" dirty="0">
-                <a:latin typeface="Calibri" pitchFamily="34" charset="0"/>
-              </a:rPr>
-              <a:t>infinite generation of adversarial examples</a:t>
-            </a:r>
-            <a:r>
-              <a:rPr lang="en-US" sz="2000" dirty="0">
-                <a:latin typeface="Calibri" pitchFamily="34" charset="0"/>
-              </a:rPr>
-              <a:t> according to a probability distribution generated from our multivariate Gaussian models and Bayesian networks. The </a:t>
-            </a:r>
-            <a:r>
-              <a:rPr lang="en-US" sz="2000" b="1" dirty="0">
-                <a:latin typeface="Calibri" pitchFamily="34" charset="0"/>
-              </a:rPr>
-              <a:t>flexibility</a:t>
-            </a:r>
-            <a:r>
-              <a:rPr lang="en-US" sz="2000" dirty="0">
-                <a:latin typeface="Calibri" pitchFamily="34" charset="0"/>
-              </a:rPr>
-              <a:t> of the framework is perhaps the most simultaneously promising and disturbing result; we explored </a:t>
-            </a:r>
-            <a:r>
-              <a:rPr lang="en-US" sz="2000" b="1" dirty="0">
-                <a:latin typeface="Calibri" pitchFamily="34" charset="0"/>
-              </a:rPr>
-              <a:t>targeted adversarial attacks</a:t>
-            </a:r>
-            <a:r>
-              <a:rPr lang="en-US" sz="2000" dirty="0">
-                <a:latin typeface="Calibri" pitchFamily="34" charset="0"/>
-              </a:rPr>
-              <a:t> on individual users, but demonstrated that our Bayesian network heuristics can be learned on any set of users. It is not difficult to plant a keylogger and use our methods to compromise modern biometric security systems; we have exposed a </a:t>
-            </a:r>
-            <a:r>
-              <a:rPr lang="en-US" sz="2000" b="1" dirty="0">
-                <a:latin typeface="Calibri" pitchFamily="34" charset="0"/>
-              </a:rPr>
-              <a:t>major security vulnerability </a:t>
-            </a:r>
-            <a:r>
-              <a:rPr lang="en-US" sz="2000" dirty="0">
-                <a:latin typeface="Calibri" pitchFamily="34" charset="0"/>
-              </a:rPr>
-              <a:t>that motivates further research in developing more resilient discriminatory classification algorithms for mobile biometric authentication. </a:t>
-            </a:r>
             <a:endParaRPr lang="en-US" sz="2000" b="1" dirty="0">
               <a:latin typeface="Calibri" pitchFamily="34" charset="0"/>
             </a:endParaRPr>
@@ -5246,7 +4080,7 @@
         <p:spPr bwMode="auto">
           <a:xfrm>
             <a:off x="1097280" y="7355083"/>
-            <a:ext cx="9875520" cy="3275563"/>
+            <a:ext cx="9875520" cy="1736680"/>
           </a:xfrm>
           <a:prstGeom prst="rect">
             <a:avLst/>
@@ -5366,52 +4200,33 @@
             </a:lvl9pPr>
           </a:lstStyle>
           <a:p>
-            <a:pPr marL="342900" indent="-342900" eaLnBrk="1" hangingPunct="1">
+            <a:pPr marL="285750" indent="-285750" eaLnBrk="1" hangingPunct="1">
               <a:buFont typeface="Arial" panose="020B0604020202020204" pitchFamily="34" charset="0"/>
               <a:buChar char="•"/>
             </a:pPr>
             <a:r>
-              <a:rPr lang="en-US" sz="2000" dirty="0">
-                <a:latin typeface="+mn-lt"/>
-              </a:rPr>
+              <a:rPr lang="en-US" sz="2000" dirty="0"/>
               <a:t>Keystroke pattern and dynamics classification is an important application of machine learning to computer security and authentication. The massive increase in popularity and computing power of mobile devices in the last ten years has spurred significant interest in biometric-focused authentication models for </a:t>
             </a:r>
             <a:r>
-              <a:rPr lang="en-US" sz="2000" b="1" dirty="0">
-                <a:latin typeface="+mn-lt"/>
-              </a:rPr>
+              <a:rPr lang="en-US" sz="2000" b="1" dirty="0"/>
               <a:t>mobile devices</a:t>
             </a:r>
             <a:r>
-              <a:rPr lang="en-US" sz="2000" dirty="0">
-                <a:latin typeface="+mn-lt"/>
-              </a:rPr>
+              <a:rPr lang="en-US" sz="2000" dirty="0" smtClean="0"/>
               <a:t>.</a:t>
             </a:r>
           </a:p>
           <a:p>
-            <a:pPr marL="342900" indent="-342900" eaLnBrk="1" hangingPunct="1">
+            <a:pPr marL="285750" indent="-285750" eaLnBrk="1" hangingPunct="1">
               <a:buFont typeface="Arial" panose="020B0604020202020204" pitchFamily="34" charset="0"/>
               <a:buChar char="•"/>
             </a:pPr>
             <a:r>
-              <a:rPr lang="en-US" sz="2000" dirty="0">
-                <a:latin typeface="+mn-lt"/>
-              </a:rPr>
-              <a:t>As mobile devices store increasingly valuable and confidential information, learning classifiers to detect fraud is becoming ever more applicable and important. However, it still remains to be seen how robust these user verification classifiers are against general attacks by malicious agents. To this end, we generate attacks against user verification classifiers using mobile biometrics data, performing </a:t>
-            </a:r>
-            <a:r>
-              <a:rPr lang="en-US" sz="2000" b="1" dirty="0">
-                <a:latin typeface="+mn-lt"/>
-              </a:rPr>
-              <a:t>white hat </a:t>
-            </a:r>
-            <a:r>
-              <a:rPr lang="en-US" sz="2000" dirty="0">
-                <a:latin typeface="+mn-lt"/>
-              </a:rPr>
-              <a:t>evaluation of biometric data verification schemes.</a:t>
-            </a:r>
+              <a:rPr lang="en-US" sz="2000" dirty="0"/>
+              <a:t>W</a:t>
+            </a:r>
+            <a:endParaRPr lang="en-US" sz="2000" dirty="0"/>
           </a:p>
         </p:txBody>
       </p:sp>
@@ -5607,32 +4422,32 @@
               <a:buChar char="•"/>
             </a:pPr>
             <a:r>
-              <a:rPr lang="en-US" sz="2000" dirty="0">
+              <a:rPr lang="en-US" sz="2000" dirty="0" smtClean="0">
                 <a:latin typeface="+mn-lt"/>
               </a:rPr>
               <a:t>The MEU-Mobile KSD (Keystroke Dynamics) Data Set from the UCI Machine Learning Repository contains 51 records for each of 56 subjects - 2856 records total - of haptic, momentum, and timing features measured of a common sequence (</a:t>
             </a:r>
             <a:r>
-              <a:rPr lang="en-US" sz="2000" dirty="0">
+              <a:rPr lang="en-US" sz="2000" dirty="0" smtClean="0">
                 <a:latin typeface="Courier New" panose="02070309020205020404" pitchFamily="49" charset="0"/>
                 <a:cs typeface="Courier New" panose="02070309020205020404" pitchFamily="49" charset="0"/>
               </a:rPr>
               <a:t>.tie5Roanl</a:t>
             </a:r>
             <a:r>
-              <a:rPr lang="en-US" sz="2000" dirty="0">
+              <a:rPr lang="en-US" sz="2000" dirty="0" smtClean="0">
                 <a:latin typeface="+mn-lt"/>
               </a:rPr>
               <a:t>) typed on a Nexus 7 mobile device. There are 71 features monitored, characterized by the attributes </a:t>
             </a:r>
             <a:r>
-              <a:rPr lang="en-US" sz="2000" dirty="0">
+              <a:rPr lang="en-US" sz="2000" dirty="0" smtClean="0">
                 <a:latin typeface="Courier New" panose="02070309020205020404" pitchFamily="49" charset="0"/>
                 <a:cs typeface="Courier New" panose="02070309020205020404" pitchFamily="49" charset="0"/>
               </a:rPr>
               <a:t>Hold, Up-Down, Down-Down, Pressure, Finger-Area, Average Hold, Average Pressure, Average Area.</a:t>
             </a:r>
-            <a:endParaRPr lang="en-US" sz="2000" dirty="0">
+            <a:endParaRPr lang="en-US" sz="2000" dirty="0" smtClean="0">
               <a:latin typeface="+mj-lt"/>
             </a:endParaRPr>
           </a:p>
@@ -5642,7 +4457,7 @@
               <a:buChar char="•"/>
             </a:pPr>
             <a:r>
-              <a:rPr lang="en-US" sz="2000" dirty="0">
+              <a:rPr lang="en-US" sz="2000" dirty="0" smtClean="0">
                 <a:latin typeface="+mj-lt"/>
               </a:rPr>
               <a:t>We trained a variety of binary classifiers  to detect if the concatenation the feature vectors of two data-points, forming a vector 142 features, was typed by the same user or not. This allowed us to train one model and have it generalize user verification to any new users not from the training dataset, as long as we one at least one keystroke record for any new users.</a:t>
@@ -5654,47 +4469,119 @@
               <a:buChar char="•"/>
             </a:pPr>
             <a:r>
-              <a:rPr lang="en-US" sz="2000" dirty="0">
+              <a:rPr lang="en-US" sz="2000" dirty="0" smtClean="0">
                 <a:latin typeface="+mj-lt"/>
               </a:rPr>
               <a:t>As part of data processing we implemented a flexible </a:t>
             </a:r>
             <a:r>
-              <a:rPr lang="en-US" sz="2000" b="1" dirty="0">
+              <a:rPr lang="en-US" sz="2000" b="1" dirty="0" smtClean="0">
                 <a:latin typeface="+mj-lt"/>
               </a:rPr>
               <a:t>resampling framework </a:t>
             </a:r>
             <a:r>
-              <a:rPr lang="en-US" sz="2000" dirty="0">
+              <a:rPr lang="en-US" sz="2000" dirty="0" smtClean="0">
                 <a:latin typeface="+mj-lt"/>
               </a:rPr>
               <a:t>that can utilize a variety of </a:t>
             </a:r>
             <a:r>
-              <a:rPr lang="en-US" sz="2000" dirty="0" err="1">
+              <a:rPr lang="en-US" sz="2000" dirty="0" err="1" smtClean="0">
                 <a:latin typeface="+mj-lt"/>
               </a:rPr>
               <a:t>undersampling</a:t>
             </a:r>
             <a:r>
-              <a:rPr lang="en-US" sz="2000" dirty="0">
+              <a:rPr lang="en-US" sz="2000" dirty="0" smtClean="0">
                 <a:latin typeface="+mj-lt"/>
               </a:rPr>
               <a:t> and oversampling methods to </a:t>
             </a:r>
             <a:r>
-              <a:rPr lang="en-US" sz="2000" dirty="0" err="1">
+              <a:rPr lang="en-US" sz="2000" dirty="0" err="1" smtClean="0">
                 <a:latin typeface="+mj-lt"/>
               </a:rPr>
               <a:t>undersample</a:t>
             </a:r>
             <a:r>
-              <a:rPr lang="en-US" sz="2000" dirty="0">
+              <a:rPr lang="en-US" sz="2000" dirty="0" smtClean="0">
                 <a:latin typeface="+mj-lt"/>
               </a:rPr>
               <a:t> the majority class and oversample the minority class as necessary. This ensures parity between labels of different user and same user in the training data.</a:t>
             </a:r>
+          </a:p>
+          <a:p>
+            <a:pPr marL="342900" indent="-342900" eaLnBrk="1" hangingPunct="1">
+              <a:buFont typeface="Arial" panose="020B0604020202020204" pitchFamily="34" charset="0"/>
+              <a:buChar char="•"/>
+            </a:pPr>
+            <a:endParaRPr lang="en-US" sz="2000" dirty="0" smtClean="0">
+              <a:latin typeface="+mj-lt"/>
+            </a:endParaRPr>
+          </a:p>
+          <a:p>
+            <a:pPr marL="342900" indent="-342900" eaLnBrk="1" hangingPunct="1">
+              <a:buFont typeface="Arial" panose="020B0604020202020204" pitchFamily="34" charset="0"/>
+              <a:buChar char="•"/>
+            </a:pPr>
+            <a:endParaRPr lang="en-US" sz="2000" dirty="0" smtClean="0">
+              <a:latin typeface="+mj-lt"/>
+            </a:endParaRPr>
+          </a:p>
+          <a:p>
+            <a:pPr marL="342900" indent="-342900" eaLnBrk="1" hangingPunct="1">
+              <a:buFont typeface="Arial" panose="020B0604020202020204" pitchFamily="34" charset="0"/>
+              <a:buChar char="•"/>
+            </a:pPr>
+            <a:endParaRPr lang="en-US" sz="2000" dirty="0" smtClean="0">
+              <a:latin typeface="+mj-lt"/>
+            </a:endParaRPr>
+          </a:p>
+          <a:p>
+            <a:pPr marL="342900" indent="-342900" eaLnBrk="1" hangingPunct="1">
+              <a:buFont typeface="Arial" panose="020B0604020202020204" pitchFamily="34" charset="0"/>
+              <a:buChar char="•"/>
+            </a:pPr>
+            <a:endParaRPr lang="en-US" sz="2000" dirty="0" smtClean="0">
+              <a:latin typeface="+mj-lt"/>
+            </a:endParaRPr>
+          </a:p>
+          <a:p>
+            <a:pPr marL="342900" indent="-342900" eaLnBrk="1" hangingPunct="1">
+              <a:buFont typeface="Arial" panose="020B0604020202020204" pitchFamily="34" charset="0"/>
+              <a:buChar char="•"/>
+            </a:pPr>
+            <a:endParaRPr lang="en-US" sz="2000" dirty="0" smtClean="0">
+              <a:latin typeface="+mj-lt"/>
+            </a:endParaRPr>
+          </a:p>
+          <a:p>
+            <a:pPr marL="342900" indent="-342900" eaLnBrk="1" hangingPunct="1">
+              <a:buFont typeface="Arial" panose="020B0604020202020204" pitchFamily="34" charset="0"/>
+              <a:buChar char="•"/>
+            </a:pPr>
+            <a:endParaRPr lang="en-US" sz="2000" dirty="0" smtClean="0">
+              <a:latin typeface="+mj-lt"/>
+            </a:endParaRPr>
+          </a:p>
+          <a:p>
+            <a:pPr marL="342900" indent="-342900" eaLnBrk="1" hangingPunct="1">
+              <a:buFont typeface="Arial" panose="020B0604020202020204" pitchFamily="34" charset="0"/>
+              <a:buChar char="•"/>
+            </a:pPr>
+            <a:endParaRPr lang="en-US" sz="2000" dirty="0" smtClean="0">
+              <a:latin typeface="+mj-lt"/>
+            </a:endParaRPr>
+          </a:p>
+          <a:p>
+            <a:pPr marL="342900" indent="-342900" eaLnBrk="1" hangingPunct="1">
+              <a:buFont typeface="Arial" panose="020B0604020202020204" pitchFamily="34" charset="0"/>
+              <a:buChar char="•"/>
+            </a:pPr>
+            <a:endParaRPr lang="en-US" sz="2000" dirty="0" smtClean="0">
+              <a:latin typeface="+mj-lt"/>
+            </a:endParaRPr>
           </a:p>
           <a:p>
             <a:pPr marL="342900" indent="-342900" eaLnBrk="1" hangingPunct="1">
@@ -5703,653 +4590,6 @@
             </a:pPr>
             <a:endParaRPr lang="en-US" sz="2000" dirty="0">
               <a:latin typeface="+mj-lt"/>
-            </a:endParaRPr>
-          </a:p>
-          <a:p>
-            <a:pPr marL="342900" indent="-342900" eaLnBrk="1" hangingPunct="1">
-              <a:buFont typeface="Arial" panose="020B0604020202020204" pitchFamily="34" charset="0"/>
-              <a:buChar char="•"/>
-            </a:pPr>
-            <a:endParaRPr lang="en-US" sz="2000" dirty="0">
-              <a:latin typeface="+mj-lt"/>
-            </a:endParaRPr>
-          </a:p>
-          <a:p>
-            <a:pPr marL="342900" indent="-342900" eaLnBrk="1" hangingPunct="1">
-              <a:buFont typeface="Arial" panose="020B0604020202020204" pitchFamily="34" charset="0"/>
-              <a:buChar char="•"/>
-            </a:pPr>
-            <a:endParaRPr lang="en-US" sz="2000" dirty="0">
-              <a:latin typeface="+mj-lt"/>
-            </a:endParaRPr>
-          </a:p>
-          <a:p>
-            <a:pPr marL="342900" indent="-342900" eaLnBrk="1" hangingPunct="1">
-              <a:buFont typeface="Arial" panose="020B0604020202020204" pitchFamily="34" charset="0"/>
-              <a:buChar char="•"/>
-            </a:pPr>
-            <a:endParaRPr lang="en-US" sz="2000" dirty="0">
-              <a:latin typeface="+mj-lt"/>
-            </a:endParaRPr>
-          </a:p>
-          <a:p>
-            <a:pPr marL="342900" indent="-342900" eaLnBrk="1" hangingPunct="1">
-              <a:buFont typeface="Arial" panose="020B0604020202020204" pitchFamily="34" charset="0"/>
-              <a:buChar char="•"/>
-            </a:pPr>
-            <a:endParaRPr lang="en-US" sz="2000" dirty="0">
-              <a:latin typeface="+mj-lt"/>
-            </a:endParaRPr>
-          </a:p>
-          <a:p>
-            <a:pPr marL="342900" indent="-342900" eaLnBrk="1" hangingPunct="1">
-              <a:buFont typeface="Arial" panose="020B0604020202020204" pitchFamily="34" charset="0"/>
-              <a:buChar char="•"/>
-            </a:pPr>
-            <a:endParaRPr lang="en-US" sz="2000" dirty="0">
-              <a:latin typeface="+mj-lt"/>
-            </a:endParaRPr>
-          </a:p>
-          <a:p>
-            <a:pPr marL="342900" indent="-342900" eaLnBrk="1" hangingPunct="1">
-              <a:buFont typeface="Arial" panose="020B0604020202020204" pitchFamily="34" charset="0"/>
-              <a:buChar char="•"/>
-            </a:pPr>
-            <a:endParaRPr lang="en-US" sz="2000" dirty="0">
-              <a:latin typeface="+mj-lt"/>
-            </a:endParaRPr>
-          </a:p>
-          <a:p>
-            <a:pPr marL="342900" indent="-342900" eaLnBrk="1" hangingPunct="1">
-              <a:buFont typeface="Arial" panose="020B0604020202020204" pitchFamily="34" charset="0"/>
-              <a:buChar char="•"/>
-            </a:pPr>
-            <a:endParaRPr lang="en-US" sz="2000" dirty="0">
-              <a:latin typeface="+mj-lt"/>
-            </a:endParaRPr>
-          </a:p>
-          <a:p>
-            <a:pPr marL="342900" indent="-342900" eaLnBrk="1" hangingPunct="1">
-              <a:buFont typeface="Arial" panose="020B0604020202020204" pitchFamily="34" charset="0"/>
-              <a:buChar char="•"/>
-            </a:pPr>
-            <a:endParaRPr lang="en-US" sz="2000" dirty="0">
-              <a:latin typeface="+mj-lt"/>
-            </a:endParaRPr>
-          </a:p>
-        </p:txBody>
-      </p:sp>
-      <p:pic>
-        <p:nvPicPr>
-          <p:cNvPr id="1026" name="Picture 2" descr="K-mean center attack success rate.png">
-            <a:extLst>
-              <a:ext uri="{FF2B5EF4-FFF2-40B4-BE49-F238E27FC236}">
-                <a16:creationId xmlns="" xmlns:a16="http://schemas.microsoft.com/office/drawing/2014/main" id="{255D51AD-28C3-4E52-B2FD-0A20AD600D10}"/>
-              </a:ext>
-            </a:extLst>
-          </p:cNvPr>
-          <p:cNvPicPr>
-            <a:picLocks noChangeAspect="1" noChangeArrowheads="1"/>
-          </p:cNvPicPr>
-          <p:nvPr/>
-        </p:nvPicPr>
-        <p:blipFill>
-          <a:blip r:embed="rId3">
-            <a:extLst>
-              <a:ext uri="{28A0092B-C50C-407E-A947-70E740481C1C}">
-                <a14:useLocalDpi xmlns:a14="http://schemas.microsoft.com/office/drawing/2010/main" val="0"/>
-              </a:ext>
-            </a:extLst>
-          </a:blip>
-          <a:srcRect/>
-          <a:stretch>
-            <a:fillRect/>
-          </a:stretch>
-        </p:blipFill>
-        <p:spPr bwMode="auto">
-          <a:xfrm>
-            <a:off x="21800242" y="6182064"/>
-            <a:ext cx="5303520" cy="3977640"/>
-          </a:xfrm>
-          <a:prstGeom prst="rect">
-            <a:avLst/>
-          </a:prstGeom>
-          <a:noFill/>
-          <a:extLst>
-            <a:ext uri="{909E8E84-426E-40DD-AFC4-6F175D3DCCD1}">
-              <a14:hiddenFill xmlns:a14="http://schemas.microsoft.com/office/drawing/2010/main">
-                <a:solidFill>
-                  <a:srgbClr val="FFFFFF"/>
-                </a:solidFill>
-              </a14:hiddenFill>
-            </a:ext>
-          </a:extLst>
-        </p:spPr>
-      </p:pic>
-      <p:pic>
-        <p:nvPicPr>
-          <p:cNvPr id="1028" name="Picture 4" descr="K cluster Gaussian attack success rate.png">
-            <a:extLst>
-              <a:ext uri="{FF2B5EF4-FFF2-40B4-BE49-F238E27FC236}">
-                <a16:creationId xmlns="" xmlns:a16="http://schemas.microsoft.com/office/drawing/2014/main" id="{DF6C01D2-3451-4044-A5E5-DBF262E84660}"/>
-              </a:ext>
-            </a:extLst>
-          </p:cNvPr>
-          <p:cNvPicPr>
-            <a:picLocks noChangeAspect="1" noChangeArrowheads="1"/>
-          </p:cNvPicPr>
-          <p:nvPr/>
-        </p:nvPicPr>
-        <p:blipFill>
-          <a:blip r:embed="rId4">
-            <a:extLst>
-              <a:ext uri="{28A0092B-C50C-407E-A947-70E740481C1C}">
-                <a14:useLocalDpi xmlns:a14="http://schemas.microsoft.com/office/drawing/2010/main" val="0"/>
-              </a:ext>
-            </a:extLst>
-          </a:blip>
-          <a:srcRect/>
-          <a:stretch>
-            <a:fillRect/>
-          </a:stretch>
-        </p:blipFill>
-        <p:spPr bwMode="auto">
-          <a:xfrm>
-            <a:off x="26662958" y="6182063"/>
-            <a:ext cx="5303520" cy="3977640"/>
-          </a:xfrm>
-          <a:prstGeom prst="rect">
-            <a:avLst/>
-          </a:prstGeom>
-          <a:noFill/>
-          <a:extLst>
-            <a:ext uri="{909E8E84-426E-40DD-AFC4-6F175D3DCCD1}">
-              <a14:hiddenFill xmlns:a14="http://schemas.microsoft.com/office/drawing/2010/main">
-                <a:solidFill>
-                  <a:srgbClr val="FFFFFF"/>
-                </a:solidFill>
-              </a14:hiddenFill>
-            </a:ext>
-          </a:extLst>
-        </p:spPr>
-      </p:pic>
-      <p:pic>
-        <p:nvPicPr>
-          <p:cNvPr id="7" name="Picture 6"/>
-          <p:cNvPicPr>
-            <a:picLocks noChangeAspect="1"/>
-          </p:cNvPicPr>
-          <p:nvPr/>
-        </p:nvPicPr>
-        <p:blipFill>
-          <a:blip r:embed="rId5">
-            <a:extLst>
-              <a:ext uri="{28A0092B-C50C-407E-A947-70E740481C1C}">
-                <a14:useLocalDpi xmlns:a14="http://schemas.microsoft.com/office/drawing/2010/main" val="0"/>
-              </a:ext>
-            </a:extLst>
-          </a:blip>
-          <a:stretch>
-            <a:fillRect/>
-          </a:stretch>
-        </p:blipFill>
-        <p:spPr>
-          <a:xfrm>
-            <a:off x="11841035" y="14490777"/>
-            <a:ext cx="4674504" cy="4164463"/>
-          </a:xfrm>
-          <a:prstGeom prst="rect">
-            <a:avLst/>
-          </a:prstGeom>
-        </p:spPr>
-      </p:pic>
-      <p:sp>
-        <p:nvSpPr>
-          <p:cNvPr id="8" name="TextBox 7"/>
-          <p:cNvSpPr txBox="1"/>
-          <p:nvPr/>
-        </p:nvSpPr>
-        <p:spPr>
-          <a:xfrm>
-            <a:off x="16720764" y="14996160"/>
-            <a:ext cx="4218996" cy="3342453"/>
-          </a:xfrm>
-          <a:prstGeom prst="rect">
-            <a:avLst/>
-          </a:prstGeom>
-          <a:noFill/>
-        </p:spPr>
-        <p:txBody>
-          <a:bodyPr wrap="square" rtlCol="0">
-            <a:spAutoFit/>
-          </a:bodyPr>
-          <a:lstStyle/>
-          <a:p>
-            <a:r>
-              <a:rPr lang="en-US" sz="1920" b="1" dirty="0"/>
-              <a:t>Figure 3. </a:t>
-            </a:r>
-            <a:r>
-              <a:rPr lang="en-US" sz="1920" dirty="0"/>
-              <a:t>Pragmatically, we construct Bayesian models that are not naïve, hence do not make an independence assumption between feature variables. This is a 71x71 Pearson correlation matrix (using all user data). </a:t>
-            </a:r>
-          </a:p>
-          <a:p>
-            <a:endParaRPr lang="en-US" sz="1920" dirty="0"/>
-          </a:p>
-          <a:p>
-            <a:r>
-              <a:rPr lang="en-US" sz="1920" dirty="0">
-                <a:solidFill>
-                  <a:srgbClr val="00B050"/>
-                </a:solidFill>
-              </a:rPr>
-              <a:t>Green tint </a:t>
-            </a:r>
-            <a:r>
-              <a:rPr lang="en-US" sz="1920" dirty="0"/>
-              <a:t>is higher correlation, and </a:t>
-            </a:r>
-            <a:r>
-              <a:rPr lang="en-US" sz="1920" dirty="0">
-                <a:solidFill>
-                  <a:srgbClr val="FF0000"/>
-                </a:solidFill>
-              </a:rPr>
-              <a:t>red tint </a:t>
-            </a:r>
-            <a:r>
-              <a:rPr lang="en-US" sz="1920" dirty="0"/>
-              <a:t>is lower correlation. Even visually, we begin to parse correlated and uncorrelated features. </a:t>
-            </a:r>
-          </a:p>
-        </p:txBody>
-      </p:sp>
-      <p:sp>
-        <p:nvSpPr>
-          <p:cNvPr id="45" name="Text Box 180">
-            <a:extLst>
-              <a:ext uri="{FF2B5EF4-FFF2-40B4-BE49-F238E27FC236}">
-                <a16:creationId xmlns="" xmlns:a16="http://schemas.microsoft.com/office/drawing/2014/main" id="{B5035870-ADA2-4595-8A86-153C0D15B18F}"/>
-              </a:ext>
-            </a:extLst>
-          </p:cNvPr>
-          <p:cNvSpPr txBox="1">
-            <a:spLocks noChangeArrowheads="1"/>
-          </p:cNvSpPr>
-          <p:nvPr/>
-        </p:nvSpPr>
-        <p:spPr bwMode="auto">
-          <a:xfrm>
-            <a:off x="22530533" y="10277536"/>
-            <a:ext cx="8705654" cy="935847"/>
-          </a:xfrm>
-          <a:prstGeom prst="rect">
-            <a:avLst/>
-          </a:prstGeom>
-          <a:noFill/>
-          <a:ln>
-            <a:noFill/>
-          </a:ln>
-          <a:effectLst/>
-          <a:extLst>
-            <a:ext uri="{909E8E84-426E-40DD-AFC4-6F175D3DCCD1}">
-              <a14:hiddenFill xmlns:a14="http://schemas.microsoft.com/office/drawing/2010/main">
-                <a:solidFill>
-                  <a:schemeClr val="accent1"/>
-                </a:solidFill>
-              </a14:hiddenFill>
-            </a:ext>
-            <a:ext uri="{91240B29-F687-4F45-9708-019B960494DF}">
-              <a14:hiddenLine xmlns:a14="http://schemas.microsoft.com/office/drawing/2010/main" w="9525">
-                <a:solidFill>
-                  <a:schemeClr val="tx1"/>
-                </a:solidFill>
-                <a:miter lim="800000"/>
-                <a:headEnd/>
-                <a:tailEnd/>
-              </a14:hiddenLine>
-            </a:ext>
-            <a:ext uri="{AF507438-7753-43E0-B8FC-AC1667EBCBE1}">
-              <a14:hiddenEffects xmlns:a14="http://schemas.microsoft.com/office/drawing/2010/main">
-                <a:effectLst>
-                  <a:outerShdw dist="35921" dir="2700000" algn="ctr" rotWithShape="0">
-                    <a:schemeClr val="bg2"/>
-                  </a:outerShdw>
-                </a:effectLst>
-              </a14:hiddenEffects>
-            </a:ext>
-          </a:extLst>
-        </p:spPr>
-        <p:txBody>
-          <a:bodyPr wrap="square" lIns="48971" tIns="24486" rIns="48971" bIns="24486">
-            <a:spAutoFit/>
-          </a:bodyPr>
-          <a:lstStyle>
-            <a:lvl1pPr defTabSz="4389438" eaLnBrk="0" hangingPunct="0">
-              <a:defRPr sz="2200">
-                <a:solidFill>
-                  <a:schemeClr val="tx1"/>
-                </a:solidFill>
-                <a:latin typeface="Arial" charset="0"/>
-              </a:defRPr>
-            </a:lvl1pPr>
-            <a:lvl2pPr marL="742950" indent="-285750" defTabSz="4389438" eaLnBrk="0" hangingPunct="0">
-              <a:defRPr sz="2200">
-                <a:solidFill>
-                  <a:schemeClr val="tx1"/>
-                </a:solidFill>
-                <a:latin typeface="Arial" charset="0"/>
-              </a:defRPr>
-            </a:lvl2pPr>
-            <a:lvl3pPr marL="1143000" indent="-228600" defTabSz="4389438" eaLnBrk="0" hangingPunct="0">
-              <a:defRPr sz="2200">
-                <a:solidFill>
-                  <a:schemeClr val="tx1"/>
-                </a:solidFill>
-                <a:latin typeface="Arial" charset="0"/>
-              </a:defRPr>
-            </a:lvl3pPr>
-            <a:lvl4pPr marL="1600200" indent="-228600" defTabSz="4389438" eaLnBrk="0" hangingPunct="0">
-              <a:defRPr sz="2200">
-                <a:solidFill>
-                  <a:schemeClr val="tx1"/>
-                </a:solidFill>
-                <a:latin typeface="Arial" charset="0"/>
-              </a:defRPr>
-            </a:lvl4pPr>
-            <a:lvl5pPr marL="2057400" indent="-228600" defTabSz="4389438" eaLnBrk="0" hangingPunct="0">
-              <a:defRPr sz="2200">
-                <a:solidFill>
-                  <a:schemeClr val="tx1"/>
-                </a:solidFill>
-                <a:latin typeface="Arial" charset="0"/>
-              </a:defRPr>
-            </a:lvl5pPr>
-            <a:lvl6pPr marL="2514600" indent="-228600" defTabSz="4389438" eaLnBrk="0" fontAlgn="base" hangingPunct="0">
-              <a:spcBef>
-                <a:spcPct val="0"/>
-              </a:spcBef>
-              <a:spcAft>
-                <a:spcPct val="0"/>
-              </a:spcAft>
-              <a:defRPr sz="2200">
-                <a:solidFill>
-                  <a:schemeClr val="tx1"/>
-                </a:solidFill>
-                <a:latin typeface="Arial" charset="0"/>
-              </a:defRPr>
-            </a:lvl6pPr>
-            <a:lvl7pPr marL="2971800" indent="-228600" defTabSz="4389438" eaLnBrk="0" fontAlgn="base" hangingPunct="0">
-              <a:spcBef>
-                <a:spcPct val="0"/>
-              </a:spcBef>
-              <a:spcAft>
-                <a:spcPct val="0"/>
-              </a:spcAft>
-              <a:defRPr sz="2200">
-                <a:solidFill>
-                  <a:schemeClr val="tx1"/>
-                </a:solidFill>
-                <a:latin typeface="Arial" charset="0"/>
-              </a:defRPr>
-            </a:lvl7pPr>
-            <a:lvl8pPr marL="3429000" indent="-228600" defTabSz="4389438" eaLnBrk="0" fontAlgn="base" hangingPunct="0">
-              <a:spcBef>
-                <a:spcPct val="0"/>
-              </a:spcBef>
-              <a:spcAft>
-                <a:spcPct val="0"/>
-              </a:spcAft>
-              <a:defRPr sz="2200">
-                <a:solidFill>
-                  <a:schemeClr val="tx1"/>
-                </a:solidFill>
-                <a:latin typeface="Arial" charset="0"/>
-              </a:defRPr>
-            </a:lvl8pPr>
-            <a:lvl9pPr marL="3886200" indent="-228600" defTabSz="4389438" eaLnBrk="0" fontAlgn="base" hangingPunct="0">
-              <a:spcBef>
-                <a:spcPct val="0"/>
-              </a:spcBef>
-              <a:spcAft>
-                <a:spcPct val="0"/>
-              </a:spcAft>
-              <a:defRPr sz="2200">
-                <a:solidFill>
-                  <a:schemeClr val="tx1"/>
-                </a:solidFill>
-                <a:latin typeface="Arial" charset="0"/>
-              </a:defRPr>
-            </a:lvl9pPr>
-          </a:lstStyle>
-          <a:p>
-            <a:pPr algn="ctr" eaLnBrk="1" hangingPunct="1"/>
-            <a:r>
-              <a:rPr lang="en-US" sz="1920" b="1" dirty="0">
-                <a:latin typeface="Calibri" pitchFamily="34" charset="0"/>
-              </a:rPr>
-              <a:t>Figures 4-5.</a:t>
-            </a:r>
-            <a:r>
-              <a:rPr lang="en-US" sz="1920" dirty="0">
-                <a:latin typeface="Calibri" pitchFamily="34" charset="0"/>
-              </a:rPr>
-              <a:t> Adversarial success rate charts for different </a:t>
-            </a:r>
-            <a:r>
-              <a:rPr lang="en-US" sz="1920" i="1" dirty="0">
-                <a:latin typeface="Calibri" pitchFamily="34" charset="0"/>
-              </a:rPr>
-              <a:t>k</a:t>
-            </a:r>
-            <a:r>
-              <a:rPr lang="en-US" sz="1920" dirty="0">
-                <a:latin typeface="Calibri" pitchFamily="34" charset="0"/>
-              </a:rPr>
-              <a:t> and across five discriminatory classifier models (logistic regression, 1-layer ANN, 3-layer DNN, 5-layer DNN, and 10-layer DNN). </a:t>
-            </a:r>
-            <a:r>
-              <a:rPr lang="en-US" sz="1920" b="1" dirty="0">
-                <a:latin typeface="Calibri" pitchFamily="34" charset="0"/>
-              </a:rPr>
-              <a:t>Future work: </a:t>
-            </a:r>
-            <a:r>
-              <a:rPr lang="en-US" sz="1920" dirty="0">
-                <a:latin typeface="Calibri" pitchFamily="34" charset="0"/>
-              </a:rPr>
-              <a:t>Other evaluation metrics for “spoof success”</a:t>
-            </a:r>
-          </a:p>
-        </p:txBody>
-      </p:sp>
-      <p:sp>
-        <p:nvSpPr>
-          <p:cNvPr id="47" name="Text Box 180">
-            <a:extLst>
-              <a:ext uri="{FF2B5EF4-FFF2-40B4-BE49-F238E27FC236}">
-                <a16:creationId xmlns="" xmlns:a16="http://schemas.microsoft.com/office/drawing/2014/main" id="{B68CCE3C-71F5-47D9-BF5F-CCAFD9C77C0F}"/>
-              </a:ext>
-            </a:extLst>
-          </p:cNvPr>
-          <p:cNvSpPr txBox="1">
-            <a:spLocks noChangeArrowheads="1"/>
-          </p:cNvSpPr>
-          <p:nvPr/>
-        </p:nvSpPr>
-        <p:spPr bwMode="auto">
-          <a:xfrm>
-            <a:off x="22711746" y="13398898"/>
-            <a:ext cx="8705654" cy="344916"/>
-          </a:xfrm>
-          <a:prstGeom prst="rect">
-            <a:avLst/>
-          </a:prstGeom>
-          <a:noFill/>
-          <a:ln>
-            <a:noFill/>
-          </a:ln>
-          <a:effectLst/>
-          <a:extLst>
-            <a:ext uri="{909E8E84-426E-40DD-AFC4-6F175D3DCCD1}">
-              <a14:hiddenFill xmlns:a14="http://schemas.microsoft.com/office/drawing/2010/main">
-                <a:solidFill>
-                  <a:schemeClr val="accent1"/>
-                </a:solidFill>
-              </a14:hiddenFill>
-            </a:ext>
-            <a:ext uri="{91240B29-F687-4F45-9708-019B960494DF}">
-              <a14:hiddenLine xmlns:a14="http://schemas.microsoft.com/office/drawing/2010/main" w="9525">
-                <a:solidFill>
-                  <a:schemeClr val="tx1"/>
-                </a:solidFill>
-                <a:miter lim="800000"/>
-                <a:headEnd/>
-                <a:tailEnd/>
-              </a14:hiddenLine>
-            </a:ext>
-            <a:ext uri="{AF507438-7753-43E0-B8FC-AC1667EBCBE1}">
-              <a14:hiddenEffects xmlns:a14="http://schemas.microsoft.com/office/drawing/2010/main">
-                <a:effectLst>
-                  <a:outerShdw dist="35921" dir="2700000" algn="ctr" rotWithShape="0">
-                    <a:schemeClr val="bg2"/>
-                  </a:outerShdw>
-                </a:effectLst>
-              </a14:hiddenEffects>
-            </a:ext>
-          </a:extLst>
-        </p:spPr>
-        <p:txBody>
-          <a:bodyPr wrap="square" lIns="48971" tIns="24486" rIns="48971" bIns="24486">
-            <a:spAutoFit/>
-          </a:bodyPr>
-          <a:lstStyle>
-            <a:lvl1pPr defTabSz="4389438" eaLnBrk="0" hangingPunct="0">
-              <a:defRPr sz="2200">
-                <a:solidFill>
-                  <a:schemeClr val="tx1"/>
-                </a:solidFill>
-                <a:latin typeface="Arial" charset="0"/>
-              </a:defRPr>
-            </a:lvl1pPr>
-            <a:lvl2pPr marL="742950" indent="-285750" defTabSz="4389438" eaLnBrk="0" hangingPunct="0">
-              <a:defRPr sz="2200">
-                <a:solidFill>
-                  <a:schemeClr val="tx1"/>
-                </a:solidFill>
-                <a:latin typeface="Arial" charset="0"/>
-              </a:defRPr>
-            </a:lvl2pPr>
-            <a:lvl3pPr marL="1143000" indent="-228600" defTabSz="4389438" eaLnBrk="0" hangingPunct="0">
-              <a:defRPr sz="2200">
-                <a:solidFill>
-                  <a:schemeClr val="tx1"/>
-                </a:solidFill>
-                <a:latin typeface="Arial" charset="0"/>
-              </a:defRPr>
-            </a:lvl3pPr>
-            <a:lvl4pPr marL="1600200" indent="-228600" defTabSz="4389438" eaLnBrk="0" hangingPunct="0">
-              <a:defRPr sz="2200">
-                <a:solidFill>
-                  <a:schemeClr val="tx1"/>
-                </a:solidFill>
-                <a:latin typeface="Arial" charset="0"/>
-              </a:defRPr>
-            </a:lvl4pPr>
-            <a:lvl5pPr marL="2057400" indent="-228600" defTabSz="4389438" eaLnBrk="0" hangingPunct="0">
-              <a:defRPr sz="2200">
-                <a:solidFill>
-                  <a:schemeClr val="tx1"/>
-                </a:solidFill>
-                <a:latin typeface="Arial" charset="0"/>
-              </a:defRPr>
-            </a:lvl5pPr>
-            <a:lvl6pPr marL="2514600" indent="-228600" defTabSz="4389438" eaLnBrk="0" fontAlgn="base" hangingPunct="0">
-              <a:spcBef>
-                <a:spcPct val="0"/>
-              </a:spcBef>
-              <a:spcAft>
-                <a:spcPct val="0"/>
-              </a:spcAft>
-              <a:defRPr sz="2200">
-                <a:solidFill>
-                  <a:schemeClr val="tx1"/>
-                </a:solidFill>
-                <a:latin typeface="Arial" charset="0"/>
-              </a:defRPr>
-            </a:lvl6pPr>
-            <a:lvl7pPr marL="2971800" indent="-228600" defTabSz="4389438" eaLnBrk="0" fontAlgn="base" hangingPunct="0">
-              <a:spcBef>
-                <a:spcPct val="0"/>
-              </a:spcBef>
-              <a:spcAft>
-                <a:spcPct val="0"/>
-              </a:spcAft>
-              <a:defRPr sz="2200">
-                <a:solidFill>
-                  <a:schemeClr val="tx1"/>
-                </a:solidFill>
-                <a:latin typeface="Arial" charset="0"/>
-              </a:defRPr>
-            </a:lvl7pPr>
-            <a:lvl8pPr marL="3429000" indent="-228600" defTabSz="4389438" eaLnBrk="0" fontAlgn="base" hangingPunct="0">
-              <a:spcBef>
-                <a:spcPct val="0"/>
-              </a:spcBef>
-              <a:spcAft>
-                <a:spcPct val="0"/>
-              </a:spcAft>
-              <a:defRPr sz="2200">
-                <a:solidFill>
-                  <a:schemeClr val="tx1"/>
-                </a:solidFill>
-                <a:latin typeface="Arial" charset="0"/>
-              </a:defRPr>
-            </a:lvl8pPr>
-            <a:lvl9pPr marL="3886200" indent="-228600" defTabSz="4389438" eaLnBrk="0" fontAlgn="base" hangingPunct="0">
-              <a:spcBef>
-                <a:spcPct val="0"/>
-              </a:spcBef>
-              <a:spcAft>
-                <a:spcPct val="0"/>
-              </a:spcAft>
-              <a:defRPr sz="2200">
-                <a:solidFill>
-                  <a:schemeClr val="tx1"/>
-                </a:solidFill>
-                <a:latin typeface="Arial" charset="0"/>
-              </a:defRPr>
-            </a:lvl9pPr>
-          </a:lstStyle>
-          <a:p>
-            <a:pPr algn="ctr" eaLnBrk="1" hangingPunct="1"/>
-            <a:r>
-              <a:rPr lang="en-US" sz="1920" b="1" dirty="0">
-                <a:latin typeface="Calibri" pitchFamily="34" charset="0"/>
-              </a:rPr>
-              <a:t>Table 2.</a:t>
-            </a:r>
-            <a:r>
-              <a:rPr lang="en-US" sz="1920" dirty="0">
-                <a:latin typeface="Calibri" pitchFamily="34" charset="0"/>
-              </a:rPr>
-              <a:t> Table of maximum success rates, across all attack methods and </a:t>
-            </a:r>
-            <a:r>
-              <a:rPr lang="en-US" sz="1920" i="1" dirty="0">
-                <a:latin typeface="Calibri" pitchFamily="34" charset="0"/>
-              </a:rPr>
-              <a:t>k </a:t>
-            </a:r>
-            <a:r>
-              <a:rPr lang="en-US" sz="1920" dirty="0">
-                <a:latin typeface="Calibri" pitchFamily="34" charset="0"/>
-              </a:rPr>
-              <a:t>values.</a:t>
-            </a:r>
-            <a:endParaRPr lang="en-US" sz="1920" b="1" dirty="0">
-              <a:latin typeface="Calibri" pitchFamily="34" charset="0"/>
             </a:endParaRPr>
           </a:p>
         </p:txBody>
@@ -6634,963 +4874,6 @@
           </a:p>
         </p:txBody>
       </p:sp>
-      <p:graphicFrame>
-        <p:nvGraphicFramePr>
-          <p:cNvPr id="46" name="Content Placeholder 114" descr="Sample table with 4 columns, 7 rows." title="Sample Table">
-            <a:extLst>
-              <a:ext uri="{FF2B5EF4-FFF2-40B4-BE49-F238E27FC236}">
-                <a16:creationId xmlns="" xmlns:a16="http://schemas.microsoft.com/office/drawing/2014/main" id="{60CBE95C-D1AC-4C3F-BFC0-D21F55A094E3}"/>
-              </a:ext>
-            </a:extLst>
-          </p:cNvPr>
-          <p:cNvGraphicFramePr>
-            <a:graphicFrameLocks/>
-          </p:cNvGraphicFramePr>
-          <p:nvPr>
-            <p:extLst>
-              <p:ext uri="{D42A27DB-BD31-4B8C-83A1-F6EECF244321}">
-                <p14:modId xmlns:p14="http://schemas.microsoft.com/office/powerpoint/2010/main" val="412037718"/>
-              </p:ext>
-            </p:extLst>
-          </p:nvPr>
-        </p:nvGraphicFramePr>
-        <p:xfrm>
-          <a:off x="22128483" y="11391422"/>
-          <a:ext cx="9509759" cy="1987659"/>
-        </p:xfrm>
-        <a:graphic>
-          <a:graphicData uri="http://schemas.openxmlformats.org/drawingml/2006/table">
-            <a:tbl>
-              <a:tblPr firstRow="1" bandRow="1">
-                <a:tableStyleId>{F5AB1C69-6EDB-4FF4-983F-18BD219EF322}</a:tableStyleId>
-              </a:tblPr>
-              <a:tblGrid>
-                <a:gridCol w="2673749">
-                  <a:extLst>
-                    <a:ext uri="{9D8B030D-6E8A-4147-A177-3AD203B41FA5}">
-                      <a16:colId xmlns="" xmlns:a16="http://schemas.microsoft.com/office/drawing/2014/main" val="20000"/>
-                    </a:ext>
-                  </a:extLst>
-                </a:gridCol>
-                <a:gridCol w="1367202">
-                  <a:extLst>
-                    <a:ext uri="{9D8B030D-6E8A-4147-A177-3AD203B41FA5}">
-                      <a16:colId xmlns="" xmlns:a16="http://schemas.microsoft.com/office/drawing/2014/main" val="20001"/>
-                    </a:ext>
-                  </a:extLst>
-                </a:gridCol>
-                <a:gridCol w="1367202">
-                  <a:extLst>
-                    <a:ext uri="{9D8B030D-6E8A-4147-A177-3AD203B41FA5}">
-                      <a16:colId xmlns="" xmlns:a16="http://schemas.microsoft.com/office/drawing/2014/main" val="20002"/>
-                    </a:ext>
-                  </a:extLst>
-                </a:gridCol>
-                <a:gridCol w="1367202">
-                  <a:extLst>
-                    <a:ext uri="{9D8B030D-6E8A-4147-A177-3AD203B41FA5}">
-                      <a16:colId xmlns="" xmlns:a16="http://schemas.microsoft.com/office/drawing/2014/main" val="20003"/>
-                    </a:ext>
-                  </a:extLst>
-                </a:gridCol>
-                <a:gridCol w="1367202">
-                  <a:extLst>
-                    <a:ext uri="{9D8B030D-6E8A-4147-A177-3AD203B41FA5}">
-                      <a16:colId xmlns="" xmlns:a16="http://schemas.microsoft.com/office/drawing/2014/main" val="886844001"/>
-                    </a:ext>
-                  </a:extLst>
-                </a:gridCol>
-                <a:gridCol w="1367202">
-                  <a:extLst>
-                    <a:ext uri="{9D8B030D-6E8A-4147-A177-3AD203B41FA5}">
-                      <a16:colId xmlns="" xmlns:a16="http://schemas.microsoft.com/office/drawing/2014/main" val="1355434412"/>
-                    </a:ext>
-                  </a:extLst>
-                </a:gridCol>
-              </a:tblGrid>
-              <a:tr h="777242">
-                <a:tc>
-                  <a:txBody>
-                    <a:bodyPr/>
-                    <a:lstStyle/>
-                    <a:p>
-                      <a:pPr algn="ctr"/>
-                      <a:r>
-                        <a:rPr lang="en-US" sz="2400" dirty="0"/>
-                        <a:t>Attack</a:t>
-                      </a:r>
-                    </a:p>
-                  </a:txBody>
-                  <a:tcPr marT="22861" marB="22861" anchor="ctr">
-                    <a:lnB w="12700" cap="flat" cmpd="sng" algn="ctr">
-                      <a:solidFill>
-                        <a:schemeClr val="tx1"/>
-                      </a:solidFill>
-                      <a:prstDash val="solid"/>
-                      <a:round/>
-                      <a:headEnd type="none" w="med" len="med"/>
-                      <a:tailEnd type="none" w="med" len="med"/>
-                    </a:lnB>
-                    <a:solidFill>
-                      <a:srgbClr val="FF0000"/>
-                    </a:solidFill>
-                  </a:tcPr>
-                </a:tc>
-                <a:tc>
-                  <a:txBody>
-                    <a:bodyPr/>
-                    <a:lstStyle/>
-                    <a:p>
-                      <a:pPr algn="ctr"/>
-                      <a:r>
-                        <a:rPr lang="en-US" sz="2400" dirty="0"/>
-                        <a:t>v. Logistic</a:t>
-                      </a:r>
-                    </a:p>
-                  </a:txBody>
-                  <a:tcPr marT="22861" marB="22861" anchor="ctr">
-                    <a:lnB w="12700" cap="flat" cmpd="sng" algn="ctr">
-                      <a:solidFill>
-                        <a:schemeClr val="tx1"/>
-                      </a:solidFill>
-                      <a:prstDash val="solid"/>
-                      <a:round/>
-                      <a:headEnd type="none" w="med" len="med"/>
-                      <a:tailEnd type="none" w="med" len="med"/>
-                    </a:lnB>
-                    <a:solidFill>
-                      <a:schemeClr val="tx1"/>
-                    </a:solidFill>
-                  </a:tcPr>
-                </a:tc>
-                <a:tc>
-                  <a:txBody>
-                    <a:bodyPr/>
-                    <a:lstStyle/>
-                    <a:p>
-                      <a:pPr algn="ctr"/>
-                      <a:r>
-                        <a:rPr lang="en-US" sz="2400" dirty="0"/>
-                        <a:t>v. 1-ANN</a:t>
-                      </a:r>
-                    </a:p>
-                  </a:txBody>
-                  <a:tcPr marT="22861" marB="22861" anchor="ctr">
-                    <a:lnB w="12700" cap="flat" cmpd="sng" algn="ctr">
-                      <a:solidFill>
-                        <a:schemeClr val="tx1"/>
-                      </a:solidFill>
-                      <a:prstDash val="solid"/>
-                      <a:round/>
-                      <a:headEnd type="none" w="med" len="med"/>
-                      <a:tailEnd type="none" w="med" len="med"/>
-                    </a:lnB>
-                    <a:solidFill>
-                      <a:schemeClr val="tx1"/>
-                    </a:solidFill>
-                  </a:tcPr>
-                </a:tc>
-                <a:tc>
-                  <a:txBody>
-                    <a:bodyPr/>
-                    <a:lstStyle/>
-                    <a:p>
-                      <a:pPr algn="ctr"/>
-                      <a:r>
-                        <a:rPr lang="en-US" sz="2400" dirty="0"/>
-                        <a:t>v. 3-DNN</a:t>
-                      </a:r>
-                    </a:p>
-                  </a:txBody>
-                  <a:tcPr marT="22861" marB="22861" anchor="ctr">
-                    <a:lnB w="12700" cap="flat" cmpd="sng" algn="ctr">
-                      <a:solidFill>
-                        <a:schemeClr val="tx1"/>
-                      </a:solidFill>
-                      <a:prstDash val="solid"/>
-                      <a:round/>
-                      <a:headEnd type="none" w="med" len="med"/>
-                      <a:tailEnd type="none" w="med" len="med"/>
-                    </a:lnB>
-                    <a:solidFill>
-                      <a:schemeClr val="tx1"/>
-                    </a:solidFill>
-                  </a:tcPr>
-                </a:tc>
-                <a:tc>
-                  <a:txBody>
-                    <a:bodyPr/>
-                    <a:lstStyle/>
-                    <a:p>
-                      <a:pPr algn="ctr"/>
-                      <a:r>
-                        <a:rPr lang="en-US" sz="2400" dirty="0"/>
-                        <a:t>v. 5-DNN</a:t>
-                      </a:r>
-                    </a:p>
-                  </a:txBody>
-                  <a:tcPr marT="22861" marB="22861" anchor="ctr">
-                    <a:lnB w="12700" cap="flat" cmpd="sng" algn="ctr">
-                      <a:solidFill>
-                        <a:schemeClr val="tx1"/>
-                      </a:solidFill>
-                      <a:prstDash val="solid"/>
-                      <a:round/>
-                      <a:headEnd type="none" w="med" len="med"/>
-                      <a:tailEnd type="none" w="med" len="med"/>
-                    </a:lnB>
-                    <a:solidFill>
-                      <a:schemeClr val="tx1"/>
-                    </a:solidFill>
-                  </a:tcPr>
-                </a:tc>
-                <a:tc>
-                  <a:txBody>
-                    <a:bodyPr/>
-                    <a:lstStyle/>
-                    <a:p>
-                      <a:pPr algn="ctr"/>
-                      <a:r>
-                        <a:rPr lang="en-US" sz="2400" dirty="0"/>
-                        <a:t>v. 10-DNN</a:t>
-                      </a:r>
-                    </a:p>
-                  </a:txBody>
-                  <a:tcPr marT="22861" marB="22861" anchor="ctr">
-                    <a:lnB w="12700" cap="flat" cmpd="sng" algn="ctr">
-                      <a:solidFill>
-                        <a:schemeClr val="tx1"/>
-                      </a:solidFill>
-                      <a:prstDash val="solid"/>
-                      <a:round/>
-                      <a:headEnd type="none" w="med" len="med"/>
-                      <a:tailEnd type="none" w="med" len="med"/>
-                    </a:lnB>
-                    <a:solidFill>
-                      <a:schemeClr val="tx1"/>
-                    </a:solidFill>
-                  </a:tcPr>
-                </a:tc>
-                <a:extLst>
-                  <a:ext uri="{0D108BD9-81ED-4DB2-BD59-A6C34878D82A}">
-                    <a16:rowId xmlns="" xmlns:a16="http://schemas.microsoft.com/office/drawing/2014/main" val="10000"/>
-                  </a:ext>
-                </a:extLst>
-              </a:tr>
-              <a:tr h="433175">
-                <a:tc>
-                  <a:txBody>
-                    <a:bodyPr/>
-                    <a:lstStyle/>
-                    <a:p>
-                      <a:pPr algn="ctr"/>
-                      <a:r>
-                        <a:rPr lang="en-US" sz="2400" i="1" dirty="0"/>
-                        <a:t>k</a:t>
-                      </a:r>
-                      <a:r>
-                        <a:rPr lang="en-US" sz="2400" i="0" dirty="0"/>
-                        <a:t>-means </a:t>
-                      </a:r>
-                      <a:r>
-                        <a:rPr lang="en-US" sz="2400" i="0" dirty="0" smtClean="0"/>
-                        <a:t>center</a:t>
-                      </a:r>
-                      <a:endParaRPr lang="en-US" sz="2400" i="1" dirty="0"/>
-                    </a:p>
-                  </a:txBody>
-                  <a:tcPr marT="22861" marB="22861" anchor="ctr">
-                    <a:lnL w="12700" cap="flat" cmpd="sng" algn="ctr">
-                      <a:solidFill>
-                        <a:schemeClr val="tx1"/>
-                      </a:solidFill>
-                      <a:prstDash val="solid"/>
-                      <a:round/>
-                      <a:headEnd type="none" w="med" len="med"/>
-                      <a:tailEnd type="none" w="med" len="med"/>
-                    </a:lnL>
-                    <a:lnR w="12700" cap="flat" cmpd="sng" algn="ctr">
-                      <a:solidFill>
-                        <a:schemeClr val="tx1"/>
-                      </a:solidFill>
-                      <a:prstDash val="solid"/>
-                      <a:round/>
-                      <a:headEnd type="none" w="med" len="med"/>
-                      <a:tailEnd type="none" w="med" len="med"/>
-                    </a:lnR>
-                    <a:lnT w="12700" cap="flat" cmpd="sng" algn="ctr">
-                      <a:solidFill>
-                        <a:schemeClr val="tx1"/>
-                      </a:solidFill>
-                      <a:prstDash val="solid"/>
-                      <a:round/>
-                      <a:headEnd type="none" w="med" len="med"/>
-                      <a:tailEnd type="none" w="med" len="med"/>
-                    </a:lnT>
-                    <a:lnB w="12700" cap="flat" cmpd="sng" algn="ctr">
-                      <a:solidFill>
-                        <a:schemeClr val="tx1"/>
-                      </a:solidFill>
-                      <a:prstDash val="solid"/>
-                      <a:round/>
-                      <a:headEnd type="none" w="med" len="med"/>
-                      <a:tailEnd type="none" w="med" len="med"/>
-                    </a:lnB>
-                    <a:solidFill>
-                      <a:schemeClr val="bg1"/>
-                    </a:solidFill>
-                  </a:tcPr>
-                </a:tc>
-                <a:tc>
-                  <a:txBody>
-                    <a:bodyPr/>
-                    <a:lstStyle/>
-                    <a:p>
-                      <a:pPr algn="ctr"/>
-                      <a:r>
-                        <a:rPr lang="en-US" sz="2400" dirty="0"/>
-                        <a:t>20%</a:t>
-                      </a:r>
-                    </a:p>
-                  </a:txBody>
-                  <a:tcPr marT="22861" marB="22861" anchor="ctr">
-                    <a:lnL w="12700" cap="flat" cmpd="sng" algn="ctr">
-                      <a:solidFill>
-                        <a:schemeClr val="tx1"/>
-                      </a:solidFill>
-                      <a:prstDash val="solid"/>
-                      <a:round/>
-                      <a:headEnd type="none" w="med" len="med"/>
-                      <a:tailEnd type="none" w="med" len="med"/>
-                    </a:lnL>
-                    <a:lnR w="12700" cap="flat" cmpd="sng" algn="ctr">
-                      <a:solidFill>
-                        <a:schemeClr val="tx1"/>
-                      </a:solidFill>
-                      <a:prstDash val="solid"/>
-                      <a:round/>
-                      <a:headEnd type="none" w="med" len="med"/>
-                      <a:tailEnd type="none" w="med" len="med"/>
-                    </a:lnR>
-                    <a:lnT w="12700" cap="flat" cmpd="sng" algn="ctr">
-                      <a:solidFill>
-                        <a:schemeClr val="tx1"/>
-                      </a:solidFill>
-                      <a:prstDash val="solid"/>
-                      <a:round/>
-                      <a:headEnd type="none" w="med" len="med"/>
-                      <a:tailEnd type="none" w="med" len="med"/>
-                    </a:lnT>
-                    <a:lnB w="12700" cap="flat" cmpd="sng" algn="ctr">
-                      <a:solidFill>
-                        <a:schemeClr val="tx1"/>
-                      </a:solidFill>
-                      <a:prstDash val="solid"/>
-                      <a:round/>
-                      <a:headEnd type="none" w="med" len="med"/>
-                      <a:tailEnd type="none" w="med" len="med"/>
-                    </a:lnB>
-                    <a:solidFill>
-                      <a:schemeClr val="bg1"/>
-                    </a:solidFill>
-                  </a:tcPr>
-                </a:tc>
-                <a:tc>
-                  <a:txBody>
-                    <a:bodyPr/>
-                    <a:lstStyle/>
-                    <a:p>
-                      <a:pPr algn="ctr"/>
-                      <a:r>
-                        <a:rPr lang="en-US" sz="2400" dirty="0"/>
-                        <a:t>39%</a:t>
-                      </a:r>
-                    </a:p>
-                  </a:txBody>
-                  <a:tcPr marT="22861" marB="22861" anchor="ctr">
-                    <a:lnL w="12700" cap="flat" cmpd="sng" algn="ctr">
-                      <a:solidFill>
-                        <a:schemeClr val="tx1"/>
-                      </a:solidFill>
-                      <a:prstDash val="solid"/>
-                      <a:round/>
-                      <a:headEnd type="none" w="med" len="med"/>
-                      <a:tailEnd type="none" w="med" len="med"/>
-                    </a:lnL>
-                    <a:lnR w="12700" cap="flat" cmpd="sng" algn="ctr">
-                      <a:solidFill>
-                        <a:schemeClr val="tx1"/>
-                      </a:solidFill>
-                      <a:prstDash val="solid"/>
-                      <a:round/>
-                      <a:headEnd type="none" w="med" len="med"/>
-                      <a:tailEnd type="none" w="med" len="med"/>
-                    </a:lnR>
-                    <a:lnT w="12700" cap="flat" cmpd="sng" algn="ctr">
-                      <a:solidFill>
-                        <a:schemeClr val="tx1"/>
-                      </a:solidFill>
-                      <a:prstDash val="solid"/>
-                      <a:round/>
-                      <a:headEnd type="none" w="med" len="med"/>
-                      <a:tailEnd type="none" w="med" len="med"/>
-                    </a:lnT>
-                    <a:lnB w="12700" cap="flat" cmpd="sng" algn="ctr">
-                      <a:solidFill>
-                        <a:schemeClr val="tx1"/>
-                      </a:solidFill>
-                      <a:prstDash val="solid"/>
-                      <a:round/>
-                      <a:headEnd type="none" w="med" len="med"/>
-                      <a:tailEnd type="none" w="med" len="med"/>
-                    </a:lnB>
-                    <a:solidFill>
-                      <a:schemeClr val="bg1"/>
-                    </a:solidFill>
-                  </a:tcPr>
-                </a:tc>
-                <a:tc>
-                  <a:txBody>
-                    <a:bodyPr/>
-                    <a:lstStyle/>
-                    <a:p>
-                      <a:pPr algn="ctr"/>
-                      <a:r>
-                        <a:rPr lang="en-US" sz="2400" dirty="0"/>
-                        <a:t>60%</a:t>
-                      </a:r>
-                    </a:p>
-                  </a:txBody>
-                  <a:tcPr marT="22861" marB="22861" anchor="ctr">
-                    <a:lnL w="12700" cap="flat" cmpd="sng" algn="ctr">
-                      <a:solidFill>
-                        <a:schemeClr val="tx1"/>
-                      </a:solidFill>
-                      <a:prstDash val="solid"/>
-                      <a:round/>
-                      <a:headEnd type="none" w="med" len="med"/>
-                      <a:tailEnd type="none" w="med" len="med"/>
-                    </a:lnL>
-                    <a:lnR w="12700" cap="flat" cmpd="sng" algn="ctr">
-                      <a:solidFill>
-                        <a:schemeClr val="tx1"/>
-                      </a:solidFill>
-                      <a:prstDash val="solid"/>
-                      <a:round/>
-                      <a:headEnd type="none" w="med" len="med"/>
-                      <a:tailEnd type="none" w="med" len="med"/>
-                    </a:lnR>
-                    <a:lnT w="12700" cap="flat" cmpd="sng" algn="ctr">
-                      <a:solidFill>
-                        <a:schemeClr val="tx1"/>
-                      </a:solidFill>
-                      <a:prstDash val="solid"/>
-                      <a:round/>
-                      <a:headEnd type="none" w="med" len="med"/>
-                      <a:tailEnd type="none" w="med" len="med"/>
-                    </a:lnT>
-                    <a:lnB w="12700" cap="flat" cmpd="sng" algn="ctr">
-                      <a:solidFill>
-                        <a:schemeClr val="tx1"/>
-                      </a:solidFill>
-                      <a:prstDash val="solid"/>
-                      <a:round/>
-                      <a:headEnd type="none" w="med" len="med"/>
-                      <a:tailEnd type="none" w="med" len="med"/>
-                    </a:lnB>
-                    <a:solidFill>
-                      <a:schemeClr val="bg1"/>
-                    </a:solidFill>
-                  </a:tcPr>
-                </a:tc>
-                <a:tc>
-                  <a:txBody>
-                    <a:bodyPr/>
-                    <a:lstStyle/>
-                    <a:p>
-                      <a:pPr algn="ctr"/>
-                      <a:r>
-                        <a:rPr lang="en-US" sz="2400" b="1" dirty="0"/>
-                        <a:t>77%</a:t>
-                      </a:r>
-                    </a:p>
-                  </a:txBody>
-                  <a:tcPr marT="22861" marB="22861" anchor="ctr">
-                    <a:lnL w="12700" cap="flat" cmpd="sng" algn="ctr">
-                      <a:solidFill>
-                        <a:schemeClr val="tx1"/>
-                      </a:solidFill>
-                      <a:prstDash val="solid"/>
-                      <a:round/>
-                      <a:headEnd type="none" w="med" len="med"/>
-                      <a:tailEnd type="none" w="med" len="med"/>
-                    </a:lnL>
-                    <a:lnR w="12700" cap="flat" cmpd="sng" algn="ctr">
-                      <a:solidFill>
-                        <a:schemeClr val="tx1"/>
-                      </a:solidFill>
-                      <a:prstDash val="solid"/>
-                      <a:round/>
-                      <a:headEnd type="none" w="med" len="med"/>
-                      <a:tailEnd type="none" w="med" len="med"/>
-                    </a:lnR>
-                    <a:lnT w="12700" cap="flat" cmpd="sng" algn="ctr">
-                      <a:solidFill>
-                        <a:schemeClr val="tx1"/>
-                      </a:solidFill>
-                      <a:prstDash val="solid"/>
-                      <a:round/>
-                      <a:headEnd type="none" w="med" len="med"/>
-                      <a:tailEnd type="none" w="med" len="med"/>
-                    </a:lnT>
-                    <a:lnB w="12700" cap="flat" cmpd="sng" algn="ctr">
-                      <a:solidFill>
-                        <a:schemeClr val="tx1"/>
-                      </a:solidFill>
-                      <a:prstDash val="solid"/>
-                      <a:round/>
-                      <a:headEnd type="none" w="med" len="med"/>
-                      <a:tailEnd type="none" w="med" len="med"/>
-                    </a:lnB>
-                    <a:solidFill>
-                      <a:schemeClr val="bg1"/>
-                    </a:solidFill>
-                  </a:tcPr>
-                </a:tc>
-                <a:tc>
-                  <a:txBody>
-                    <a:bodyPr/>
-                    <a:lstStyle/>
-                    <a:p>
-                      <a:pPr algn="ctr"/>
-                      <a:r>
-                        <a:rPr lang="en-US" sz="2400" dirty="0"/>
-                        <a:t>59%</a:t>
-                      </a:r>
-                    </a:p>
-                  </a:txBody>
-                  <a:tcPr marT="22861" marB="22861" anchor="ctr">
-                    <a:lnL w="12700" cap="flat" cmpd="sng" algn="ctr">
-                      <a:solidFill>
-                        <a:schemeClr val="tx1"/>
-                      </a:solidFill>
-                      <a:prstDash val="solid"/>
-                      <a:round/>
-                      <a:headEnd type="none" w="med" len="med"/>
-                      <a:tailEnd type="none" w="med" len="med"/>
-                    </a:lnL>
-                    <a:lnR w="12700" cap="flat" cmpd="sng" algn="ctr">
-                      <a:solidFill>
-                        <a:schemeClr val="tx1"/>
-                      </a:solidFill>
-                      <a:prstDash val="solid"/>
-                      <a:round/>
-                      <a:headEnd type="none" w="med" len="med"/>
-                      <a:tailEnd type="none" w="med" len="med"/>
-                    </a:lnR>
-                    <a:lnT w="12700" cap="flat" cmpd="sng" algn="ctr">
-                      <a:solidFill>
-                        <a:schemeClr val="tx1"/>
-                      </a:solidFill>
-                      <a:prstDash val="solid"/>
-                      <a:round/>
-                      <a:headEnd type="none" w="med" len="med"/>
-                      <a:tailEnd type="none" w="med" len="med"/>
-                    </a:lnT>
-                    <a:lnB w="12700" cap="flat" cmpd="sng" algn="ctr">
-                      <a:solidFill>
-                        <a:schemeClr val="tx1"/>
-                      </a:solidFill>
-                      <a:prstDash val="solid"/>
-                      <a:round/>
-                      <a:headEnd type="none" w="med" len="med"/>
-                      <a:tailEnd type="none" w="med" len="med"/>
-                    </a:lnB>
-                    <a:solidFill>
-                      <a:schemeClr val="bg1"/>
-                    </a:solidFill>
-                  </a:tcPr>
-                </a:tc>
-                <a:extLst>
-                  <a:ext uri="{0D108BD9-81ED-4DB2-BD59-A6C34878D82A}">
-                    <a16:rowId xmlns="" xmlns:a16="http://schemas.microsoft.com/office/drawing/2014/main" val="10001"/>
-                  </a:ext>
-                </a:extLst>
-              </a:tr>
-              <a:tr h="777242">
-                <a:tc>
-                  <a:txBody>
-                    <a:bodyPr/>
-                    <a:lstStyle/>
-                    <a:p>
-                      <a:pPr algn="ctr"/>
-                      <a:r>
-                        <a:rPr lang="en-US" sz="2400" i="1" dirty="0" smtClean="0"/>
-                        <a:t>k-</a:t>
-                      </a:r>
-                      <a:r>
-                        <a:rPr lang="en-US" sz="2400" i="0" dirty="0" smtClean="0"/>
-                        <a:t>cluster </a:t>
-                      </a:r>
-                      <a:r>
-                        <a:rPr lang="en-US" sz="2400" i="0" smtClean="0"/>
-                        <a:t>Gaussian samples</a:t>
-                      </a:r>
-                      <a:endParaRPr lang="en-US" sz="2400" i="0" dirty="0"/>
-                    </a:p>
-                  </a:txBody>
-                  <a:tcPr marT="22861" marB="22861" anchor="ctr">
-                    <a:lnL w="12700" cap="flat" cmpd="sng" algn="ctr">
-                      <a:solidFill>
-                        <a:schemeClr val="tx1"/>
-                      </a:solidFill>
-                      <a:prstDash val="solid"/>
-                      <a:round/>
-                      <a:headEnd type="none" w="med" len="med"/>
-                      <a:tailEnd type="none" w="med" len="med"/>
-                    </a:lnL>
-                    <a:lnR w="12700" cap="flat" cmpd="sng" algn="ctr">
-                      <a:solidFill>
-                        <a:schemeClr val="tx1"/>
-                      </a:solidFill>
-                      <a:prstDash val="solid"/>
-                      <a:round/>
-                      <a:headEnd type="none" w="med" len="med"/>
-                      <a:tailEnd type="none" w="med" len="med"/>
-                    </a:lnR>
-                    <a:lnT w="12700" cap="flat" cmpd="sng" algn="ctr">
-                      <a:solidFill>
-                        <a:schemeClr val="tx1"/>
-                      </a:solidFill>
-                      <a:prstDash val="solid"/>
-                      <a:round/>
-                      <a:headEnd type="none" w="med" len="med"/>
-                      <a:tailEnd type="none" w="med" len="med"/>
-                    </a:lnT>
-                    <a:lnB w="12700" cap="flat" cmpd="sng" algn="ctr">
-                      <a:solidFill>
-                        <a:schemeClr val="tx1"/>
-                      </a:solidFill>
-                      <a:prstDash val="solid"/>
-                      <a:round/>
-                      <a:headEnd type="none" w="med" len="med"/>
-                      <a:tailEnd type="none" w="med" len="med"/>
-                    </a:lnB>
-                    <a:solidFill>
-                      <a:schemeClr val="bg1"/>
-                    </a:solidFill>
-                  </a:tcPr>
-                </a:tc>
-                <a:tc>
-                  <a:txBody>
-                    <a:bodyPr/>
-                    <a:lstStyle/>
-                    <a:p>
-                      <a:pPr algn="ctr"/>
-                      <a:r>
-                        <a:rPr lang="en-US" sz="2400" dirty="0"/>
-                        <a:t>20%</a:t>
-                      </a:r>
-                    </a:p>
-                  </a:txBody>
-                  <a:tcPr marT="22861" marB="22861" anchor="ctr">
-                    <a:lnL w="12700" cap="flat" cmpd="sng" algn="ctr">
-                      <a:solidFill>
-                        <a:schemeClr val="tx1"/>
-                      </a:solidFill>
-                      <a:prstDash val="solid"/>
-                      <a:round/>
-                      <a:headEnd type="none" w="med" len="med"/>
-                      <a:tailEnd type="none" w="med" len="med"/>
-                    </a:lnL>
-                    <a:lnR w="12700" cap="flat" cmpd="sng" algn="ctr">
-                      <a:solidFill>
-                        <a:schemeClr val="tx1"/>
-                      </a:solidFill>
-                      <a:prstDash val="solid"/>
-                      <a:round/>
-                      <a:headEnd type="none" w="med" len="med"/>
-                      <a:tailEnd type="none" w="med" len="med"/>
-                    </a:lnR>
-                    <a:lnT w="12700" cap="flat" cmpd="sng" algn="ctr">
-                      <a:solidFill>
-                        <a:schemeClr val="tx1"/>
-                      </a:solidFill>
-                      <a:prstDash val="solid"/>
-                      <a:round/>
-                      <a:headEnd type="none" w="med" len="med"/>
-                      <a:tailEnd type="none" w="med" len="med"/>
-                    </a:lnT>
-                    <a:lnB w="12700" cap="flat" cmpd="sng" algn="ctr">
-                      <a:solidFill>
-                        <a:schemeClr val="tx1"/>
-                      </a:solidFill>
-                      <a:prstDash val="solid"/>
-                      <a:round/>
-                      <a:headEnd type="none" w="med" len="med"/>
-                      <a:tailEnd type="none" w="med" len="med"/>
-                    </a:lnB>
-                    <a:solidFill>
-                      <a:schemeClr val="bg1"/>
-                    </a:solidFill>
-                  </a:tcPr>
-                </a:tc>
-                <a:tc>
-                  <a:txBody>
-                    <a:bodyPr/>
-                    <a:lstStyle/>
-                    <a:p>
-                      <a:pPr algn="ctr"/>
-                      <a:r>
-                        <a:rPr lang="en-US" sz="2400" dirty="0"/>
-                        <a:t>35%</a:t>
-                      </a:r>
-                    </a:p>
-                  </a:txBody>
-                  <a:tcPr marT="22861" marB="22861" anchor="ctr">
-                    <a:lnL w="12700" cap="flat" cmpd="sng" algn="ctr">
-                      <a:solidFill>
-                        <a:schemeClr val="tx1"/>
-                      </a:solidFill>
-                      <a:prstDash val="solid"/>
-                      <a:round/>
-                      <a:headEnd type="none" w="med" len="med"/>
-                      <a:tailEnd type="none" w="med" len="med"/>
-                    </a:lnL>
-                    <a:lnR w="12700" cap="flat" cmpd="sng" algn="ctr">
-                      <a:solidFill>
-                        <a:schemeClr val="tx1"/>
-                      </a:solidFill>
-                      <a:prstDash val="solid"/>
-                      <a:round/>
-                      <a:headEnd type="none" w="med" len="med"/>
-                      <a:tailEnd type="none" w="med" len="med"/>
-                    </a:lnR>
-                    <a:lnT w="12700" cap="flat" cmpd="sng" algn="ctr">
-                      <a:solidFill>
-                        <a:schemeClr val="tx1"/>
-                      </a:solidFill>
-                      <a:prstDash val="solid"/>
-                      <a:round/>
-                      <a:headEnd type="none" w="med" len="med"/>
-                      <a:tailEnd type="none" w="med" len="med"/>
-                    </a:lnT>
-                    <a:lnB w="12700" cap="flat" cmpd="sng" algn="ctr">
-                      <a:solidFill>
-                        <a:schemeClr val="tx1"/>
-                      </a:solidFill>
-                      <a:prstDash val="solid"/>
-                      <a:round/>
-                      <a:headEnd type="none" w="med" len="med"/>
-                      <a:tailEnd type="none" w="med" len="med"/>
-                    </a:lnB>
-                    <a:solidFill>
-                      <a:schemeClr val="bg1"/>
-                    </a:solidFill>
-                  </a:tcPr>
-                </a:tc>
-                <a:tc>
-                  <a:txBody>
-                    <a:bodyPr/>
-                    <a:lstStyle/>
-                    <a:p>
-                      <a:pPr algn="ctr"/>
-                      <a:r>
-                        <a:rPr lang="en-US" sz="2400" dirty="0"/>
-                        <a:t>49%</a:t>
-                      </a:r>
-                    </a:p>
-                  </a:txBody>
-                  <a:tcPr marT="22861" marB="22861" anchor="ctr">
-                    <a:lnL w="12700" cap="flat" cmpd="sng" algn="ctr">
-                      <a:solidFill>
-                        <a:schemeClr val="tx1"/>
-                      </a:solidFill>
-                      <a:prstDash val="solid"/>
-                      <a:round/>
-                      <a:headEnd type="none" w="med" len="med"/>
-                      <a:tailEnd type="none" w="med" len="med"/>
-                    </a:lnL>
-                    <a:lnR w="12700" cap="flat" cmpd="sng" algn="ctr">
-                      <a:solidFill>
-                        <a:schemeClr val="tx1"/>
-                      </a:solidFill>
-                      <a:prstDash val="solid"/>
-                      <a:round/>
-                      <a:headEnd type="none" w="med" len="med"/>
-                      <a:tailEnd type="none" w="med" len="med"/>
-                    </a:lnR>
-                    <a:lnT w="12700" cap="flat" cmpd="sng" algn="ctr">
-                      <a:solidFill>
-                        <a:schemeClr val="tx1"/>
-                      </a:solidFill>
-                      <a:prstDash val="solid"/>
-                      <a:round/>
-                      <a:headEnd type="none" w="med" len="med"/>
-                      <a:tailEnd type="none" w="med" len="med"/>
-                    </a:lnT>
-                    <a:lnB w="12700" cap="flat" cmpd="sng" algn="ctr">
-                      <a:solidFill>
-                        <a:schemeClr val="tx1"/>
-                      </a:solidFill>
-                      <a:prstDash val="solid"/>
-                      <a:round/>
-                      <a:headEnd type="none" w="med" len="med"/>
-                      <a:tailEnd type="none" w="med" len="med"/>
-                    </a:lnB>
-                    <a:solidFill>
-                      <a:schemeClr val="bg1"/>
-                    </a:solidFill>
-                  </a:tcPr>
-                </a:tc>
-                <a:tc>
-                  <a:txBody>
-                    <a:bodyPr/>
-                    <a:lstStyle/>
-                    <a:p>
-                      <a:pPr algn="ctr"/>
-                      <a:r>
-                        <a:rPr lang="en-US" sz="2400" b="1" dirty="0"/>
-                        <a:t>67%</a:t>
-                      </a:r>
-                    </a:p>
-                  </a:txBody>
-                  <a:tcPr marT="22861" marB="22861" anchor="ctr">
-                    <a:lnL w="12700" cap="flat" cmpd="sng" algn="ctr">
-                      <a:solidFill>
-                        <a:schemeClr val="tx1"/>
-                      </a:solidFill>
-                      <a:prstDash val="solid"/>
-                      <a:round/>
-                      <a:headEnd type="none" w="med" len="med"/>
-                      <a:tailEnd type="none" w="med" len="med"/>
-                    </a:lnL>
-                    <a:lnR w="12700" cap="flat" cmpd="sng" algn="ctr">
-                      <a:solidFill>
-                        <a:schemeClr val="tx1"/>
-                      </a:solidFill>
-                      <a:prstDash val="solid"/>
-                      <a:round/>
-                      <a:headEnd type="none" w="med" len="med"/>
-                      <a:tailEnd type="none" w="med" len="med"/>
-                    </a:lnR>
-                    <a:lnT w="12700" cap="flat" cmpd="sng" algn="ctr">
-                      <a:solidFill>
-                        <a:schemeClr val="tx1"/>
-                      </a:solidFill>
-                      <a:prstDash val="solid"/>
-                      <a:round/>
-                      <a:headEnd type="none" w="med" len="med"/>
-                      <a:tailEnd type="none" w="med" len="med"/>
-                    </a:lnT>
-                    <a:lnB w="12700" cap="flat" cmpd="sng" algn="ctr">
-                      <a:solidFill>
-                        <a:schemeClr val="tx1"/>
-                      </a:solidFill>
-                      <a:prstDash val="solid"/>
-                      <a:round/>
-                      <a:headEnd type="none" w="med" len="med"/>
-                      <a:tailEnd type="none" w="med" len="med"/>
-                    </a:lnB>
-                    <a:solidFill>
-                      <a:schemeClr val="bg1"/>
-                    </a:solidFill>
-                  </a:tcPr>
-                </a:tc>
-                <a:tc>
-                  <a:txBody>
-                    <a:bodyPr/>
-                    <a:lstStyle/>
-                    <a:p>
-                      <a:pPr algn="ctr"/>
-                      <a:r>
-                        <a:rPr lang="en-US" sz="2400" dirty="0"/>
-                        <a:t>42%</a:t>
-                      </a:r>
-                    </a:p>
-                  </a:txBody>
-                  <a:tcPr marT="22861" marB="22861" anchor="ctr">
-                    <a:lnL w="12700" cap="flat" cmpd="sng" algn="ctr">
-                      <a:solidFill>
-                        <a:schemeClr val="tx1"/>
-                      </a:solidFill>
-                      <a:prstDash val="solid"/>
-                      <a:round/>
-                      <a:headEnd type="none" w="med" len="med"/>
-                      <a:tailEnd type="none" w="med" len="med"/>
-                    </a:lnL>
-                    <a:lnR w="12700" cap="flat" cmpd="sng" algn="ctr">
-                      <a:solidFill>
-                        <a:schemeClr val="tx1"/>
-                      </a:solidFill>
-                      <a:prstDash val="solid"/>
-                      <a:round/>
-                      <a:headEnd type="none" w="med" len="med"/>
-                      <a:tailEnd type="none" w="med" len="med"/>
-                    </a:lnR>
-                    <a:lnT w="12700" cap="flat" cmpd="sng" algn="ctr">
-                      <a:solidFill>
-                        <a:schemeClr val="tx1"/>
-                      </a:solidFill>
-                      <a:prstDash val="solid"/>
-                      <a:round/>
-                      <a:headEnd type="none" w="med" len="med"/>
-                      <a:tailEnd type="none" w="med" len="med"/>
-                    </a:lnT>
-                    <a:lnB w="12700" cap="flat" cmpd="sng" algn="ctr">
-                      <a:solidFill>
-                        <a:schemeClr val="tx1"/>
-                      </a:solidFill>
-                      <a:prstDash val="solid"/>
-                      <a:round/>
-                      <a:headEnd type="none" w="med" len="med"/>
-                      <a:tailEnd type="none" w="med" len="med"/>
-                    </a:lnB>
-                    <a:solidFill>
-                      <a:schemeClr val="bg1"/>
-                    </a:solidFill>
-                  </a:tcPr>
-                </a:tc>
-                <a:extLst>
-                  <a:ext uri="{0D108BD9-81ED-4DB2-BD59-A6C34878D82A}">
-                    <a16:rowId xmlns="" xmlns:a16="http://schemas.microsoft.com/office/drawing/2014/main" val="10002"/>
-                  </a:ext>
-                </a:extLst>
-              </a:tr>
-            </a:tbl>
-          </a:graphicData>
-        </a:graphic>
-      </p:graphicFrame>
-      <p:pic>
-        <p:nvPicPr>
-          <p:cNvPr id="42" name="Picture 41"/>
-          <p:cNvPicPr>
-            <a:picLocks noChangeAspect="1"/>
-          </p:cNvPicPr>
-          <p:nvPr/>
-        </p:nvPicPr>
-        <p:blipFill>
-          <a:blip r:embed="rId6">
-            <a:extLst>
-              <a:ext uri="{28A0092B-C50C-407E-A947-70E740481C1C}">
-                <a14:useLocalDpi xmlns:a14="http://schemas.microsoft.com/office/drawing/2010/main" val="0"/>
-              </a:ext>
-            </a:extLst>
-          </a:blip>
-          <a:stretch>
-            <a:fillRect/>
-          </a:stretch>
-        </p:blipFill>
-        <p:spPr>
-          <a:xfrm>
-            <a:off x="14178287" y="8368958"/>
-            <a:ext cx="5294914" cy="2838432"/>
-          </a:xfrm>
-          <a:prstGeom prst="rect">
-            <a:avLst/>
-          </a:prstGeom>
-        </p:spPr>
-      </p:pic>
       <p:grpSp>
         <p:nvGrpSpPr>
           <p:cNvPr id="30" name="Group 29"/>
@@ -7633,28 +4916,28 @@
                   <a:gridCol w="731936">
                     <a:extLst>
                       <a:ext uri="{9D8B030D-6E8A-4147-A177-3AD203B41FA5}">
-                        <a16:colId xmlns:a16="http://schemas.microsoft.com/office/drawing/2014/main" xmlns="" val="20000"/>
+                        <a16:colId xmlns="" xmlns:a16="http://schemas.microsoft.com/office/drawing/2014/main" val="20000"/>
                       </a:ext>
                     </a:extLst>
                   </a:gridCol>
                   <a:gridCol w="600609">
                     <a:extLst>
                       <a:ext uri="{9D8B030D-6E8A-4147-A177-3AD203B41FA5}">
-                        <a16:colId xmlns:a16="http://schemas.microsoft.com/office/drawing/2014/main" xmlns="" val="20001"/>
+                        <a16:colId xmlns="" xmlns:a16="http://schemas.microsoft.com/office/drawing/2014/main" val="20001"/>
                       </a:ext>
                     </a:extLst>
                   </a:gridCol>
                   <a:gridCol w="501348">
                     <a:extLst>
                       <a:ext uri="{9D8B030D-6E8A-4147-A177-3AD203B41FA5}">
-                        <a16:colId xmlns:a16="http://schemas.microsoft.com/office/drawing/2014/main" xmlns="" val="20002"/>
+                        <a16:colId xmlns="" xmlns:a16="http://schemas.microsoft.com/office/drawing/2014/main" val="20002"/>
                       </a:ext>
                     </a:extLst>
                   </a:gridCol>
                   <a:gridCol w="1222015">
                     <a:extLst>
                       <a:ext uri="{9D8B030D-6E8A-4147-A177-3AD203B41FA5}">
-                        <a16:colId xmlns:a16="http://schemas.microsoft.com/office/drawing/2014/main" xmlns="" val="20003"/>
+                        <a16:colId xmlns="" xmlns:a16="http://schemas.microsoft.com/office/drawing/2014/main" val="20003"/>
                       </a:ext>
                     </a:extLst>
                   </a:gridCol>
@@ -7744,7 +5027,7 @@
                   </a:tc>
                   <a:extLst>
                     <a:ext uri="{0D108BD9-81ED-4DB2-BD59-A6C34878D82A}">
-                      <a16:rowId xmlns:a16="http://schemas.microsoft.com/office/drawing/2014/main" xmlns="" val="10000"/>
+                      <a16:rowId xmlns="" xmlns:a16="http://schemas.microsoft.com/office/drawing/2014/main" val="10000"/>
                     </a:ext>
                   </a:extLst>
                 </a:tr>
@@ -7809,7 +5092,7 @@
                   </a:tc>
                   <a:extLst>
                     <a:ext uri="{0D108BD9-81ED-4DB2-BD59-A6C34878D82A}">
-                      <a16:rowId xmlns:a16="http://schemas.microsoft.com/office/drawing/2014/main" xmlns="" val="10001"/>
+                      <a16:rowId xmlns="" xmlns:a16="http://schemas.microsoft.com/office/drawing/2014/main" val="10001"/>
                     </a:ext>
                   </a:extLst>
                 </a:tr>
@@ -7872,7 +5155,7 @@
                   </a:tc>
                   <a:extLst>
                     <a:ext uri="{0D108BD9-81ED-4DB2-BD59-A6C34878D82A}">
-                      <a16:rowId xmlns:a16="http://schemas.microsoft.com/office/drawing/2014/main" xmlns="" val="10002"/>
+                      <a16:rowId xmlns="" xmlns:a16="http://schemas.microsoft.com/office/drawing/2014/main" val="10002"/>
                     </a:ext>
                   </a:extLst>
                 </a:tr>
@@ -7935,7 +5218,7 @@
                   </a:tc>
                   <a:extLst>
                     <a:ext uri="{0D108BD9-81ED-4DB2-BD59-A6C34878D82A}">
-                      <a16:rowId xmlns:a16="http://schemas.microsoft.com/office/drawing/2014/main" xmlns="" val="10003"/>
+                      <a16:rowId xmlns="" xmlns:a16="http://schemas.microsoft.com/office/drawing/2014/main" val="10003"/>
                     </a:ext>
                   </a:extLst>
                 </a:tr>
@@ -8564,7 +5847,7 @@
             <p:nvPr/>
           </p:nvPicPr>
           <p:blipFill>
-            <a:blip r:embed="rId7">
+            <a:blip r:embed="rId2">
               <a:extLst>
                 <a:ext uri="{28A0092B-C50C-407E-A947-70E740481C1C}">
                   <a14:useLocalDpi xmlns:a14="http://schemas.microsoft.com/office/drawing/2010/main" val="0"/>
@@ -8757,175 +6040,6 @@
       </p:grpSp>
       <p:sp>
         <p:nvSpPr>
-          <p:cNvPr id="52" name="Text Box 180"/>
-          <p:cNvSpPr txBox="1">
-            <a:spLocks noChangeArrowheads="1"/>
-          </p:cNvSpPr>
-          <p:nvPr/>
-        </p:nvSpPr>
-        <p:spPr bwMode="auto">
-          <a:xfrm>
-            <a:off x="13943468" y="11170531"/>
-            <a:ext cx="5397856" cy="344916"/>
-          </a:xfrm>
-          <a:prstGeom prst="rect">
-            <a:avLst/>
-          </a:prstGeom>
-          <a:noFill/>
-          <a:ln>
-            <a:noFill/>
-          </a:ln>
-          <a:effectLst/>
-          <a:extLst>
-            <a:ext uri="{909E8E84-426E-40DD-AFC4-6F175D3DCCD1}">
-              <a14:hiddenFill xmlns:a14="http://schemas.microsoft.com/office/drawing/2010/main">
-                <a:solidFill>
-                  <a:schemeClr val="accent1"/>
-                </a:solidFill>
-              </a14:hiddenFill>
-            </a:ext>
-            <a:ext uri="{91240B29-F687-4F45-9708-019B960494DF}">
-              <a14:hiddenLine xmlns:a14="http://schemas.microsoft.com/office/drawing/2010/main" w="9525">
-                <a:solidFill>
-                  <a:schemeClr val="tx1"/>
-                </a:solidFill>
-                <a:miter lim="800000"/>
-                <a:headEnd/>
-                <a:tailEnd/>
-              </a14:hiddenLine>
-            </a:ext>
-            <a:ext uri="{AF507438-7753-43E0-B8FC-AC1667EBCBE1}">
-              <a14:hiddenEffects xmlns:a14="http://schemas.microsoft.com/office/drawing/2010/main">
-                <a:effectLst>
-                  <a:outerShdw dist="35921" dir="2700000" algn="ctr" rotWithShape="0">
-                    <a:schemeClr val="bg2"/>
-                  </a:outerShdw>
-                </a:effectLst>
-              </a14:hiddenEffects>
-            </a:ext>
-          </a:extLst>
-        </p:spPr>
-        <p:txBody>
-          <a:bodyPr wrap="square" lIns="48971" tIns="24486" rIns="48971" bIns="24486">
-            <a:spAutoFit/>
-          </a:bodyPr>
-          <a:lstStyle>
-            <a:lvl1pPr defTabSz="4389438" eaLnBrk="0" hangingPunct="0">
-              <a:defRPr sz="2200">
-                <a:solidFill>
-                  <a:schemeClr val="tx1"/>
-                </a:solidFill>
-                <a:latin typeface="Arial" charset="0"/>
-              </a:defRPr>
-            </a:lvl1pPr>
-            <a:lvl2pPr marL="742950" indent="-285750" defTabSz="4389438" eaLnBrk="0" hangingPunct="0">
-              <a:defRPr sz="2200">
-                <a:solidFill>
-                  <a:schemeClr val="tx1"/>
-                </a:solidFill>
-                <a:latin typeface="Arial" charset="0"/>
-              </a:defRPr>
-            </a:lvl2pPr>
-            <a:lvl3pPr marL="1143000" indent="-228600" defTabSz="4389438" eaLnBrk="0" hangingPunct="0">
-              <a:defRPr sz="2200">
-                <a:solidFill>
-                  <a:schemeClr val="tx1"/>
-                </a:solidFill>
-                <a:latin typeface="Arial" charset="0"/>
-              </a:defRPr>
-            </a:lvl3pPr>
-            <a:lvl4pPr marL="1600200" indent="-228600" defTabSz="4389438" eaLnBrk="0" hangingPunct="0">
-              <a:defRPr sz="2200">
-                <a:solidFill>
-                  <a:schemeClr val="tx1"/>
-                </a:solidFill>
-                <a:latin typeface="Arial" charset="0"/>
-              </a:defRPr>
-            </a:lvl4pPr>
-            <a:lvl5pPr marL="2057400" indent="-228600" defTabSz="4389438" eaLnBrk="0" hangingPunct="0">
-              <a:defRPr sz="2200">
-                <a:solidFill>
-                  <a:schemeClr val="tx1"/>
-                </a:solidFill>
-                <a:latin typeface="Arial" charset="0"/>
-              </a:defRPr>
-            </a:lvl5pPr>
-            <a:lvl6pPr marL="2514600" indent="-228600" defTabSz="4389438" eaLnBrk="0" fontAlgn="base" hangingPunct="0">
-              <a:spcBef>
-                <a:spcPct val="0"/>
-              </a:spcBef>
-              <a:spcAft>
-                <a:spcPct val="0"/>
-              </a:spcAft>
-              <a:defRPr sz="2200">
-                <a:solidFill>
-                  <a:schemeClr val="tx1"/>
-                </a:solidFill>
-                <a:latin typeface="Arial" charset="0"/>
-              </a:defRPr>
-            </a:lvl6pPr>
-            <a:lvl7pPr marL="2971800" indent="-228600" defTabSz="4389438" eaLnBrk="0" fontAlgn="base" hangingPunct="0">
-              <a:spcBef>
-                <a:spcPct val="0"/>
-              </a:spcBef>
-              <a:spcAft>
-                <a:spcPct val="0"/>
-              </a:spcAft>
-              <a:defRPr sz="2200">
-                <a:solidFill>
-                  <a:schemeClr val="tx1"/>
-                </a:solidFill>
-                <a:latin typeface="Arial" charset="0"/>
-              </a:defRPr>
-            </a:lvl7pPr>
-            <a:lvl8pPr marL="3429000" indent="-228600" defTabSz="4389438" eaLnBrk="0" fontAlgn="base" hangingPunct="0">
-              <a:spcBef>
-                <a:spcPct val="0"/>
-              </a:spcBef>
-              <a:spcAft>
-                <a:spcPct val="0"/>
-              </a:spcAft>
-              <a:defRPr sz="2200">
-                <a:solidFill>
-                  <a:schemeClr val="tx1"/>
-                </a:solidFill>
-                <a:latin typeface="Arial" charset="0"/>
-              </a:defRPr>
-            </a:lvl8pPr>
-            <a:lvl9pPr marL="3886200" indent="-228600" defTabSz="4389438" eaLnBrk="0" fontAlgn="base" hangingPunct="0">
-              <a:spcBef>
-                <a:spcPct val="0"/>
-              </a:spcBef>
-              <a:spcAft>
-                <a:spcPct val="0"/>
-              </a:spcAft>
-              <a:defRPr sz="2200">
-                <a:solidFill>
-                  <a:schemeClr val="tx1"/>
-                </a:solidFill>
-                <a:latin typeface="Arial" charset="0"/>
-              </a:defRPr>
-            </a:lvl9pPr>
-          </a:lstStyle>
-          <a:p>
-            <a:pPr algn="ctr" eaLnBrk="1" hangingPunct="1"/>
-            <a:r>
-              <a:rPr lang="en-US" sz="1920" b="1" dirty="0">
-                <a:latin typeface="Calibri" pitchFamily="34" charset="0"/>
-              </a:rPr>
-              <a:t>Figure 2.</a:t>
-            </a:r>
-            <a:r>
-              <a:rPr lang="en-US" sz="1920" dirty="0">
-                <a:latin typeface="Calibri" pitchFamily="34" charset="0"/>
-              </a:rPr>
-              <a:t> Attacks on User Verification Classifier.</a:t>
-            </a:r>
-          </a:p>
-        </p:txBody>
-      </p:sp>
-      <p:sp>
-        <p:nvSpPr>
           <p:cNvPr id="12" name="Text Box 191"/>
           <p:cNvSpPr txBox="1">
             <a:spLocks noChangeArrowheads="1"/>
@@ -8935,7 +6049,7 @@
         <p:spPr bwMode="auto">
           <a:xfrm>
             <a:off x="21945600" y="3657602"/>
-            <a:ext cx="9875520" cy="10046647"/>
+            <a:ext cx="9875520" cy="505573"/>
           </a:xfrm>
           <a:prstGeom prst="rect">
             <a:avLst/>
@@ -9057,297 +6171,63 @@
               <a:buFont typeface="Arial" panose="020B0604020202020204" pitchFamily="34" charset="0"/>
               <a:buChar char="•"/>
             </a:pPr>
-            <a:r>
-              <a:rPr lang="en-US" sz="2000" dirty="0">
-                <a:latin typeface="Calibri" pitchFamily="34" charset="0"/>
-              </a:rPr>
-              <a:t>Intuitively, our </a:t>
-            </a:r>
-            <a:r>
-              <a:rPr lang="en-US" sz="2000" i="1" dirty="0">
-                <a:latin typeface="Calibri" pitchFamily="34" charset="0"/>
-              </a:rPr>
-              <a:t>k</a:t>
-            </a:r>
-            <a:r>
-              <a:rPr lang="en-US" sz="2000" dirty="0">
-                <a:latin typeface="Calibri" pitchFamily="34" charset="0"/>
-              </a:rPr>
-              <a:t>-means attacks performed best with higher </a:t>
-            </a:r>
-            <a:r>
-              <a:rPr lang="en-US" sz="2000" i="1" dirty="0">
-                <a:latin typeface="Calibri" pitchFamily="34" charset="0"/>
-              </a:rPr>
-              <a:t>k </a:t>
-            </a:r>
-            <a:r>
-              <a:rPr lang="en-US" sz="2000" dirty="0">
-                <a:latin typeface="Calibri" pitchFamily="34" charset="0"/>
-              </a:rPr>
-              <a:t>(until 32-64 range with cluster method), reaching </a:t>
-            </a:r>
-            <a:r>
-              <a:rPr lang="en-US" sz="2000" b="1" dirty="0">
-                <a:latin typeface="Calibri" pitchFamily="34" charset="0"/>
-              </a:rPr>
-              <a:t>77% success rate </a:t>
-            </a:r>
-            <a:r>
-              <a:rPr lang="en-US" sz="2000" dirty="0">
-                <a:latin typeface="Calibri" pitchFamily="34" charset="0"/>
-              </a:rPr>
-              <a:t>(undetected spoof) against a 5-layer deep neural net. Also intuitively, using our multivariate Gaussian distribution model to introduce humanistic perturbations and augment the number of generated adversarial examples, we achieve a lower maximum </a:t>
-            </a:r>
-            <a:r>
-              <a:rPr lang="en-US" sz="2000" b="1" dirty="0">
-                <a:latin typeface="Calibri" pitchFamily="34" charset="0"/>
-              </a:rPr>
-              <a:t>67% success rate</a:t>
-            </a:r>
-            <a:r>
-              <a:rPr lang="en-US" sz="2000" dirty="0">
-                <a:latin typeface="Calibri" pitchFamily="34" charset="0"/>
-              </a:rPr>
-              <a:t>. </a:t>
-            </a:r>
-          </a:p>
-          <a:p>
-            <a:pPr marL="342900" indent="-342900" eaLnBrk="1" hangingPunct="1">
-              <a:buFont typeface="Arial" panose="020B0604020202020204" pitchFamily="34" charset="0"/>
-              <a:buChar char="•"/>
-            </a:pPr>
-            <a:r>
-              <a:rPr lang="en-US" sz="2000" dirty="0">
-                <a:latin typeface="Calibri" pitchFamily="34" charset="0"/>
-              </a:rPr>
-              <a:t>Secondarily, and less intuitively, based on the adversarial success rate metric of model robustness, we find that </a:t>
-            </a:r>
-            <a:r>
-              <a:rPr lang="en-US" sz="2000" b="1" dirty="0">
-                <a:latin typeface="Calibri" pitchFamily="34" charset="0"/>
-              </a:rPr>
-              <a:t>logistic regression</a:t>
-            </a:r>
-            <a:r>
-              <a:rPr lang="en-US" sz="2000" dirty="0">
-                <a:latin typeface="Calibri" pitchFamily="34" charset="0"/>
-              </a:rPr>
-              <a:t> is most resilient to our attacks (maximum success rate 20%), compared to the artificial neural net and deep neural nets.</a:t>
-            </a:r>
-          </a:p>
-          <a:p>
-            <a:pPr marL="342900" indent="-342900" eaLnBrk="1" hangingPunct="1">
-              <a:buFont typeface="Arial" panose="020B0604020202020204" pitchFamily="34" charset="0"/>
-              <a:buChar char="•"/>
-            </a:pPr>
             <a:endParaRPr lang="en-US" sz="2000" dirty="0">
               <a:latin typeface="Calibri" pitchFamily="34" charset="0"/>
             </a:endParaRPr>
           </a:p>
-          <a:p>
-            <a:pPr marL="342900" indent="-342900" eaLnBrk="1" hangingPunct="1">
-              <a:buFont typeface="Arial" panose="020B0604020202020204" pitchFamily="34" charset="0"/>
-              <a:buChar char="•"/>
-            </a:pPr>
-            <a:endParaRPr lang="en-US" sz="2000" dirty="0">
-              <a:latin typeface="Calibri" pitchFamily="34" charset="0"/>
-            </a:endParaRPr>
-          </a:p>
-          <a:p>
-            <a:pPr marL="342900" indent="-342900" eaLnBrk="1" hangingPunct="1">
-              <a:buFont typeface="Arial" panose="020B0604020202020204" pitchFamily="34" charset="0"/>
-              <a:buChar char="•"/>
-            </a:pPr>
-            <a:endParaRPr lang="en-US" sz="2000" dirty="0">
-              <a:latin typeface="Calibri" pitchFamily="34" charset="0"/>
-            </a:endParaRPr>
-          </a:p>
-          <a:p>
-            <a:pPr marL="342900" indent="-342900" eaLnBrk="1" hangingPunct="1">
-              <a:buFont typeface="Arial" panose="020B0604020202020204" pitchFamily="34" charset="0"/>
-              <a:buChar char="•"/>
-            </a:pPr>
-            <a:endParaRPr lang="en-US" sz="2000" dirty="0">
-              <a:latin typeface="Calibri" pitchFamily="34" charset="0"/>
-            </a:endParaRPr>
-          </a:p>
-          <a:p>
-            <a:pPr marL="342900" indent="-342900" eaLnBrk="1" hangingPunct="1">
-              <a:buFont typeface="Arial" panose="020B0604020202020204" pitchFamily="34" charset="0"/>
-              <a:buChar char="•"/>
-            </a:pPr>
-            <a:endParaRPr lang="en-US" sz="2000" dirty="0">
-              <a:latin typeface="Calibri" pitchFamily="34" charset="0"/>
-            </a:endParaRPr>
-          </a:p>
-          <a:p>
-            <a:pPr marL="342900" indent="-342900" eaLnBrk="1" hangingPunct="1">
-              <a:buFont typeface="Arial" panose="020B0604020202020204" pitchFamily="34" charset="0"/>
-              <a:buChar char="•"/>
-            </a:pPr>
-            <a:endParaRPr lang="en-US" sz="2000" dirty="0">
-              <a:latin typeface="Calibri" pitchFamily="34" charset="0"/>
-            </a:endParaRPr>
-          </a:p>
-          <a:p>
-            <a:pPr marL="342900" indent="-342900" eaLnBrk="1" hangingPunct="1">
-              <a:buFont typeface="Arial" panose="020B0604020202020204" pitchFamily="34" charset="0"/>
-              <a:buChar char="•"/>
-            </a:pPr>
-            <a:endParaRPr lang="en-US" sz="2000" dirty="0">
-              <a:latin typeface="Calibri" pitchFamily="34" charset="0"/>
-            </a:endParaRPr>
-          </a:p>
-          <a:p>
-            <a:pPr marL="342900" indent="-342900" eaLnBrk="1" hangingPunct="1">
-              <a:buFont typeface="Arial" panose="020B0604020202020204" pitchFamily="34" charset="0"/>
-              <a:buChar char="•"/>
-            </a:pPr>
-            <a:endParaRPr lang="en-US" sz="2000" dirty="0">
-              <a:latin typeface="Calibri" pitchFamily="34" charset="0"/>
-            </a:endParaRPr>
-          </a:p>
-          <a:p>
-            <a:pPr marL="342900" indent="-342900" eaLnBrk="1" hangingPunct="1">
-              <a:buFont typeface="Arial" panose="020B0604020202020204" pitchFamily="34" charset="0"/>
-              <a:buChar char="•"/>
-            </a:pPr>
-            <a:endParaRPr lang="en-US" sz="2000" dirty="0">
-              <a:latin typeface="Calibri" pitchFamily="34" charset="0"/>
-            </a:endParaRPr>
-          </a:p>
-          <a:p>
-            <a:pPr marL="342900" indent="-342900" eaLnBrk="1" hangingPunct="1">
-              <a:buFont typeface="Arial" panose="020B0604020202020204" pitchFamily="34" charset="0"/>
-              <a:buChar char="•"/>
-            </a:pPr>
-            <a:endParaRPr lang="en-US" sz="2000" dirty="0">
-              <a:latin typeface="Calibri" pitchFamily="34" charset="0"/>
-            </a:endParaRPr>
-          </a:p>
-          <a:p>
-            <a:pPr marL="342900" indent="-342900" eaLnBrk="1" hangingPunct="1">
-              <a:buFont typeface="Arial" panose="020B0604020202020204" pitchFamily="34" charset="0"/>
-              <a:buChar char="•"/>
-            </a:pPr>
-            <a:endParaRPr lang="en-US" sz="2000" dirty="0">
-              <a:latin typeface="Calibri" pitchFamily="34" charset="0"/>
-            </a:endParaRPr>
-          </a:p>
-          <a:p>
-            <a:pPr marL="342900" indent="-342900" eaLnBrk="1" hangingPunct="1">
-              <a:buFont typeface="Arial" panose="020B0604020202020204" pitchFamily="34" charset="0"/>
-              <a:buChar char="•"/>
-            </a:pPr>
-            <a:endParaRPr lang="en-US" sz="2000" dirty="0">
-              <a:latin typeface="Calibri" pitchFamily="34" charset="0"/>
-            </a:endParaRPr>
-          </a:p>
-          <a:p>
-            <a:pPr marL="342900" indent="-342900" eaLnBrk="1" hangingPunct="1">
-              <a:buFont typeface="Arial" panose="020B0604020202020204" pitchFamily="34" charset="0"/>
-              <a:buChar char="•"/>
-            </a:pPr>
-            <a:endParaRPr lang="en-US" sz="2000" dirty="0">
-              <a:latin typeface="Calibri" pitchFamily="34" charset="0"/>
-            </a:endParaRPr>
-          </a:p>
-          <a:p>
-            <a:pPr marL="342900" indent="-342900" eaLnBrk="1" hangingPunct="1">
-              <a:buFont typeface="Arial" panose="020B0604020202020204" pitchFamily="34" charset="0"/>
-              <a:buChar char="•"/>
-            </a:pPr>
-            <a:endParaRPr lang="en-US" sz="2000" dirty="0">
-              <a:latin typeface="Calibri" pitchFamily="34" charset="0"/>
-            </a:endParaRPr>
-          </a:p>
-          <a:p>
-            <a:pPr marL="342900" indent="-342900" eaLnBrk="1" hangingPunct="1">
-              <a:buFont typeface="Arial" panose="020B0604020202020204" pitchFamily="34" charset="0"/>
-              <a:buChar char="•"/>
-            </a:pPr>
-            <a:endParaRPr lang="en-US" sz="2000" dirty="0">
-              <a:latin typeface="Calibri" pitchFamily="34" charset="0"/>
-            </a:endParaRPr>
-          </a:p>
-          <a:p>
-            <a:pPr marL="342900" indent="-342900" eaLnBrk="1" hangingPunct="1">
-              <a:buFont typeface="Arial" panose="020B0604020202020204" pitchFamily="34" charset="0"/>
-              <a:buChar char="•"/>
-            </a:pPr>
-            <a:endParaRPr lang="en-US" sz="2000" dirty="0">
-              <a:latin typeface="Calibri" pitchFamily="34" charset="0"/>
-            </a:endParaRPr>
-          </a:p>
-          <a:p>
-            <a:pPr marL="342900" indent="-342900" eaLnBrk="1" hangingPunct="1">
-              <a:buFont typeface="Arial" panose="020B0604020202020204" pitchFamily="34" charset="0"/>
-              <a:buChar char="•"/>
-            </a:pPr>
-            <a:endParaRPr lang="en-US" sz="2000" dirty="0">
-              <a:latin typeface="Calibri" pitchFamily="34" charset="0"/>
-            </a:endParaRPr>
-          </a:p>
-          <a:p>
-            <a:pPr marL="342900" indent="-342900" eaLnBrk="1" hangingPunct="1">
-              <a:buFont typeface="Arial" panose="020B0604020202020204" pitchFamily="34" charset="0"/>
-              <a:buChar char="•"/>
-            </a:pPr>
-            <a:endParaRPr lang="en-US" sz="2000" dirty="0">
-              <a:latin typeface="Calibri" pitchFamily="34" charset="0"/>
-            </a:endParaRPr>
-          </a:p>
-          <a:p>
-            <a:pPr marL="342900" indent="-342900" eaLnBrk="1" hangingPunct="1">
-              <a:buFont typeface="Arial" panose="020B0604020202020204" pitchFamily="34" charset="0"/>
-              <a:buChar char="•"/>
-            </a:pPr>
-            <a:endParaRPr lang="en-US" sz="2000" dirty="0">
-              <a:latin typeface="Calibri" pitchFamily="34" charset="0"/>
-            </a:endParaRPr>
-          </a:p>
-          <a:p>
-            <a:pPr marL="342900" indent="-342900" eaLnBrk="1" hangingPunct="1">
-              <a:buFont typeface="Arial" panose="020B0604020202020204" pitchFamily="34" charset="0"/>
-              <a:buChar char="•"/>
-            </a:pPr>
-            <a:endParaRPr lang="en-US" sz="2000" dirty="0">
-              <a:latin typeface="Calibri" pitchFamily="34" charset="0"/>
-            </a:endParaRPr>
-          </a:p>
-          <a:p>
-            <a:pPr marL="342900" indent="-342900" eaLnBrk="1" hangingPunct="1">
-              <a:buFont typeface="Arial" panose="020B0604020202020204" pitchFamily="34" charset="0"/>
-              <a:buChar char="•"/>
-            </a:pPr>
-            <a:endParaRPr lang="en-US" sz="2000" dirty="0">
-              <a:latin typeface="Calibri" pitchFamily="34" charset="0"/>
-            </a:endParaRPr>
-          </a:p>
-          <a:p>
-            <a:pPr marL="342900" indent="-342900" eaLnBrk="1" hangingPunct="1">
-              <a:buFont typeface="Arial" panose="020B0604020202020204" pitchFamily="34" charset="0"/>
-              <a:buChar char="•"/>
-            </a:pPr>
-            <a:endParaRPr lang="en-US" sz="2000" dirty="0">
-              <a:latin typeface="Calibri" pitchFamily="34" charset="0"/>
-            </a:endParaRPr>
-          </a:p>
-          <a:p>
-            <a:pPr eaLnBrk="1" hangingPunct="1"/>
-            <a:endParaRPr lang="en-US" sz="2000" dirty="0">
-              <a:latin typeface="Calibri" pitchFamily="34" charset="0"/>
-            </a:endParaRPr>
-          </a:p>
-          <a:p>
-            <a:pPr eaLnBrk="1" hangingPunct="1"/>
-            <a:r>
-              <a:rPr lang="en-US" sz="2000" dirty="0">
-                <a:latin typeface="Calibri" pitchFamily="34" charset="0"/>
-              </a:rPr>
-              <a:t> </a:t>
-            </a:r>
+        </p:txBody>
+      </p:sp>
+      <p:pic>
+        <p:nvPicPr>
+          <p:cNvPr id="3" name="Picture 2"/>
+          <p:cNvPicPr>
+            <a:picLocks noChangeAspect="1"/>
+          </p:cNvPicPr>
+          <p:nvPr/>
+        </p:nvPicPr>
+        <p:blipFill>
+          <a:blip r:embed="rId3"/>
+          <a:stretch>
+            <a:fillRect/>
+          </a:stretch>
+        </p:blipFill>
+        <p:spPr>
+          <a:xfrm>
+            <a:off x="12573000" y="13585613"/>
+            <a:ext cx="7391400" cy="745311"/>
+          </a:xfrm>
+          <a:prstGeom prst="rect">
+            <a:avLst/>
+          </a:prstGeom>
+        </p:spPr>
+      </p:pic>
+      <p:sp>
+        <p:nvSpPr>
+          <p:cNvPr id="6" name="TextBox 5"/>
+          <p:cNvSpPr txBox="1"/>
+          <p:nvPr/>
+        </p:nvSpPr>
+        <p:spPr>
+          <a:xfrm>
+            <a:off x="12496800" y="14338555"/>
+            <a:ext cx="7666266" cy="338554"/>
+          </a:xfrm>
+          <a:prstGeom prst="rect">
+            <a:avLst/>
+          </a:prstGeom>
+          <a:noFill/>
+        </p:spPr>
+        <p:txBody>
+          <a:bodyPr wrap="none" rtlCol="0">
+            <a:spAutoFit/>
+          </a:bodyPr>
+          <a:lstStyle/>
+          <a:p>
+            <a:r>
+              <a:rPr lang="en-US" sz="1600" dirty="0" smtClean="0"/>
+              <a:t>Table 1. Deep Neural Net models and their average validation accuracy of 10 training trials</a:t>
+            </a:r>
+            <a:endParaRPr lang="en-US" sz="1600" dirty="0"/>
           </a:p>
         </p:txBody>
       </p:sp>

</xml_diff>

<commit_message>
added some template results
</commit_message>
<xml_diff>
--- a/229poster.pptx
+++ b/229poster.pptx
@@ -3219,10 +3219,6 @@
               </a:rPr>
               <a:t>to classify mobile device users based on biometric typing pattern data. </a:t>
             </a:r>
-            <a:endParaRPr lang="en-US" sz="2000" dirty="0" smtClean="0">
-              <a:latin typeface="Arial" panose="020B0604020202020204" pitchFamily="34" charset="0"/>
-              <a:cs typeface="Arial" panose="020B0604020202020204" pitchFamily="34" charset="0"/>
-            </a:endParaRPr>
           </a:p>
           <a:p>
             <a:pPr marL="342900" indent="-342900" eaLnBrk="1" hangingPunct="1">
@@ -3391,7 +3387,7 @@
         <p:spPr bwMode="auto">
           <a:xfrm>
             <a:off x="11521440" y="3657601"/>
-            <a:ext cx="9875520" cy="13124413"/>
+            <a:ext cx="9875520" cy="11585530"/>
           </a:xfrm>
           <a:prstGeom prst="rect">
             <a:avLst/>
@@ -3713,36 +3709,6 @@
               <a:latin typeface="Arial" panose="020B0604020202020204" pitchFamily="34" charset="0"/>
               <a:cs typeface="Arial" panose="020B0604020202020204" pitchFamily="34" charset="0"/>
             </a:endParaRPr>
-          </a:p>
-          <a:p>
-            <a:r>
-              <a:rPr lang="en-US" sz="2000" dirty="0">
-                <a:latin typeface="Arial" panose="020B0604020202020204" pitchFamily="34" charset="0"/>
-                <a:cs typeface="Arial" panose="020B0604020202020204" pitchFamily="34" charset="0"/>
-              </a:rPr>
-              <a:t>From this investigation, we conclude with 10 </a:t>
-            </a:r>
-            <a:r>
-              <a:rPr lang="en-US" sz="2000" dirty="0" err="1">
-                <a:latin typeface="Arial" panose="020B0604020202020204" pitchFamily="34" charset="0"/>
-                <a:cs typeface="Arial" panose="020B0604020202020204" pitchFamily="34" charset="0"/>
-              </a:rPr>
-              <a:t>ReLU</a:t>
-            </a:r>
-            <a:r>
-              <a:rPr lang="en-US" sz="2000" dirty="0">
-                <a:latin typeface="Arial" panose="020B0604020202020204" pitchFamily="34" charset="0"/>
-                <a:cs typeface="Arial" panose="020B0604020202020204" pitchFamily="34" charset="0"/>
-              </a:rPr>
-              <a:t> activated neurons per hidden layer, the 3 hidden layer model achieves the best accuracy vs. training speed trade-off. Hence, we retrained that model for 100 epochs, and produced the following validation results: </a:t>
-            </a:r>
-            <a:r>
-              <a:rPr lang="en-US" sz="2000" b="1" dirty="0">
-                <a:latin typeface="Arial" panose="020B0604020202020204" pitchFamily="34" charset="0"/>
-                <a:cs typeface="Arial" panose="020B0604020202020204" pitchFamily="34" charset="0"/>
-              </a:rPr>
-              <a:t>79.8% accuracy, 81.7% precision, 76.8% recall, and 95.1% specificity.</a:t>
-            </a:r>
           </a:p>
         </p:txBody>
       </p:sp>
@@ -3883,7 +3849,7 @@
         <p:spPr bwMode="auto">
           <a:xfrm>
             <a:off x="21945600" y="14415471"/>
-            <a:ext cx="9875520" cy="505573"/>
+            <a:ext cx="9875520" cy="1428903"/>
           </a:xfrm>
           <a:prstGeom prst="rect">
             <a:avLst/>
@@ -4007,7 +3973,34 @@
               <a:buFont typeface="Arial" panose="020B0604020202020204" pitchFamily="34" charset="0"/>
               <a:buChar char="•"/>
             </a:pPr>
-            <a:endParaRPr lang="en-US" sz="2000" b="1" dirty="0">
+            <a:r>
+              <a:rPr lang="en-US" sz="2000" dirty="0" smtClean="0">
+                <a:latin typeface="Calibri" pitchFamily="34" charset="0"/>
+              </a:rPr>
+              <a:t>We were able to build a classifier for user verification on mobile devices with 80% accuracy.</a:t>
+            </a:r>
+          </a:p>
+          <a:p>
+            <a:pPr marL="342900" indent="-342900" eaLnBrk="1" hangingPunct="1">
+              <a:buFont typeface="Arial" panose="020B0604020202020204" pitchFamily="34" charset="0"/>
+              <a:buChar char="•"/>
+            </a:pPr>
+            <a:r>
+              <a:rPr lang="en-US" sz="2000" dirty="0" smtClean="0">
+                <a:latin typeface="Calibri" pitchFamily="34" charset="0"/>
+              </a:rPr>
+              <a:t>This has potential applications</a:t>
+            </a:r>
+            <a:endParaRPr lang="en-US" sz="2000" dirty="0" smtClean="0">
+              <a:latin typeface="Calibri" pitchFamily="34" charset="0"/>
+            </a:endParaRPr>
+          </a:p>
+          <a:p>
+            <a:pPr marL="342900" indent="-342900" eaLnBrk="1" hangingPunct="1">
+              <a:buFont typeface="Arial" panose="020B0604020202020204" pitchFamily="34" charset="0"/>
+              <a:buChar char="•"/>
+            </a:pPr>
+            <a:endParaRPr lang="en-US" sz="2000" dirty="0">
               <a:latin typeface="Calibri" pitchFamily="34" charset="0"/>
             </a:endParaRPr>
           </a:p>
@@ -4334,10 +4327,6 @@
               </a:rPr>
               <a:t>that can be integrated into native software across all mobile devices. </a:t>
             </a:r>
-            <a:endParaRPr lang="en-US" sz="2000" dirty="0">
-              <a:latin typeface="Arial" panose="020B0604020202020204" pitchFamily="34" charset="0"/>
-              <a:cs typeface="Arial" panose="020B0604020202020204" pitchFamily="34" charset="0"/>
-            </a:endParaRPr>
           </a:p>
         </p:txBody>
       </p:sp>
@@ -5078,28 +5067,28 @@
                     <a:gridCol w="827251">
                       <a:extLst>
                         <a:ext uri="{9D8B030D-6E8A-4147-A177-3AD203B41FA5}">
-                          <a16:colId xmlns:a16="http://schemas.microsoft.com/office/drawing/2014/main" xmlns="" val="20000"/>
+                          <a16:colId xmlns="" xmlns:a16="http://schemas.microsoft.com/office/drawing/2014/main" val="20000"/>
                         </a:ext>
                       </a:extLst>
                     </a:gridCol>
                     <a:gridCol w="678823">
                       <a:extLst>
                         <a:ext uri="{9D8B030D-6E8A-4147-A177-3AD203B41FA5}">
-                          <a16:colId xmlns:a16="http://schemas.microsoft.com/office/drawing/2014/main" xmlns="" val="20001"/>
+                          <a16:colId xmlns="" xmlns:a16="http://schemas.microsoft.com/office/drawing/2014/main" val="20001"/>
                         </a:ext>
                       </a:extLst>
                     </a:gridCol>
                     <a:gridCol w="566635">
                       <a:extLst>
                         <a:ext uri="{9D8B030D-6E8A-4147-A177-3AD203B41FA5}">
-                          <a16:colId xmlns:a16="http://schemas.microsoft.com/office/drawing/2014/main" xmlns="" val="20002"/>
+                          <a16:colId xmlns="" xmlns:a16="http://schemas.microsoft.com/office/drawing/2014/main" val="20002"/>
                         </a:ext>
                       </a:extLst>
                     </a:gridCol>
                     <a:gridCol w="1381150">
                       <a:extLst>
                         <a:ext uri="{9D8B030D-6E8A-4147-A177-3AD203B41FA5}">
-                          <a16:colId xmlns:a16="http://schemas.microsoft.com/office/drawing/2014/main" xmlns="" val="20003"/>
+                          <a16:colId xmlns="" xmlns:a16="http://schemas.microsoft.com/office/drawing/2014/main" val="20003"/>
                         </a:ext>
                       </a:extLst>
                     </a:gridCol>
@@ -5203,7 +5192,7 @@
                     </a:tc>
                     <a:extLst>
                       <a:ext uri="{0D108BD9-81ED-4DB2-BD59-A6C34878D82A}">
-                        <a16:rowId xmlns:a16="http://schemas.microsoft.com/office/drawing/2014/main" xmlns="" val="10000"/>
+                        <a16:rowId xmlns="" xmlns:a16="http://schemas.microsoft.com/office/drawing/2014/main" val="10000"/>
                       </a:ext>
                     </a:extLst>
                   </a:tr>
@@ -5278,7 +5267,7 @@
                     </a:tc>
                     <a:extLst>
                       <a:ext uri="{0D108BD9-81ED-4DB2-BD59-A6C34878D82A}">
-                        <a16:rowId xmlns:a16="http://schemas.microsoft.com/office/drawing/2014/main" xmlns="" val="10001"/>
+                        <a16:rowId xmlns="" xmlns:a16="http://schemas.microsoft.com/office/drawing/2014/main" val="10001"/>
                       </a:ext>
                     </a:extLst>
                   </a:tr>
@@ -5353,7 +5342,7 @@
                     </a:tc>
                     <a:extLst>
                       <a:ext uri="{0D108BD9-81ED-4DB2-BD59-A6C34878D82A}">
-                        <a16:rowId xmlns:a16="http://schemas.microsoft.com/office/drawing/2014/main" xmlns="" val="10002"/>
+                        <a16:rowId xmlns="" xmlns:a16="http://schemas.microsoft.com/office/drawing/2014/main" val="10002"/>
                       </a:ext>
                     </a:extLst>
                   </a:tr>
@@ -5428,7 +5417,7 @@
                     </a:tc>
                     <a:extLst>
                       <a:ext uri="{0D108BD9-81ED-4DB2-BD59-A6C34878D82A}">
-                        <a16:rowId xmlns:a16="http://schemas.microsoft.com/office/drawing/2014/main" xmlns="" val="10003"/>
+                        <a16:rowId xmlns="" xmlns:a16="http://schemas.microsoft.com/office/drawing/2014/main" val="10003"/>
                       </a:ext>
                     </a:extLst>
                   </a:tr>
@@ -6268,7 +6257,7 @@
         <p:spPr bwMode="auto">
           <a:xfrm>
             <a:off x="21945600" y="3657602"/>
-            <a:ext cx="9875520" cy="505573"/>
+            <a:ext cx="9875520" cy="10662200"/>
           </a:xfrm>
           <a:prstGeom prst="rect">
             <a:avLst/>
@@ -6390,7 +6379,290 @@
               <a:buFont typeface="Arial" panose="020B0604020202020204" pitchFamily="34" charset="0"/>
               <a:buChar char="•"/>
             </a:pPr>
+            <a:r>
+              <a:rPr lang="en-US" sz="2000" dirty="0">
+                <a:latin typeface="Arial" panose="020B0604020202020204" pitchFamily="34" charset="0"/>
+                <a:cs typeface="Arial" panose="020B0604020202020204" pitchFamily="34" charset="0"/>
+              </a:rPr>
+              <a:t>From this investigation, we conclude with 10 </a:t>
+            </a:r>
+            <a:r>
+              <a:rPr lang="en-US" sz="2000" dirty="0" err="1">
+                <a:latin typeface="Arial" panose="020B0604020202020204" pitchFamily="34" charset="0"/>
+                <a:cs typeface="Arial" panose="020B0604020202020204" pitchFamily="34" charset="0"/>
+              </a:rPr>
+              <a:t>ReLU</a:t>
+            </a:r>
+            <a:r>
+              <a:rPr lang="en-US" sz="2000" dirty="0">
+                <a:latin typeface="Arial" panose="020B0604020202020204" pitchFamily="34" charset="0"/>
+                <a:cs typeface="Arial" panose="020B0604020202020204" pitchFamily="34" charset="0"/>
+              </a:rPr>
+              <a:t> activated neurons per hidden layer, the 3 hidden layer model achieves the best accuracy vs. training speed trade-off. Hence, we retrained that model for 100 epochs, and produced the following validation results: </a:t>
+            </a:r>
+            <a:r>
+              <a:rPr lang="en-US" sz="2000" b="1" dirty="0">
+                <a:latin typeface="Arial" panose="020B0604020202020204" pitchFamily="34" charset="0"/>
+                <a:cs typeface="Arial" panose="020B0604020202020204" pitchFamily="34" charset="0"/>
+              </a:rPr>
+              <a:t>79.8% accuracy, 81.7% precision, 76.8% recall, and 95.1% specificity.</a:t>
+            </a:r>
+          </a:p>
+          <a:p>
+            <a:pPr marL="342900" indent="-342900" eaLnBrk="1" hangingPunct="1">
+              <a:buFont typeface="Arial" panose="020B0604020202020204" pitchFamily="34" charset="0"/>
+              <a:buChar char="•"/>
+            </a:pPr>
+            <a:endParaRPr lang="en-US" sz="2000" dirty="0" smtClean="0">
+              <a:latin typeface="Calibri" pitchFamily="34" charset="0"/>
+            </a:endParaRPr>
+          </a:p>
+          <a:p>
+            <a:pPr marL="342900" indent="-342900" eaLnBrk="1" hangingPunct="1">
+              <a:buFont typeface="Arial" panose="020B0604020202020204" pitchFamily="34" charset="0"/>
+              <a:buChar char="•"/>
+            </a:pPr>
             <a:endParaRPr lang="en-US" sz="2000" dirty="0">
+              <a:latin typeface="Calibri" pitchFamily="34" charset="0"/>
+            </a:endParaRPr>
+          </a:p>
+          <a:p>
+            <a:pPr marL="342900" indent="-342900" eaLnBrk="1" hangingPunct="1">
+              <a:buFont typeface="Arial" panose="020B0604020202020204" pitchFamily="34" charset="0"/>
+              <a:buChar char="•"/>
+            </a:pPr>
+            <a:endParaRPr lang="en-US" sz="2000" dirty="0" smtClean="0">
+              <a:latin typeface="Calibri" pitchFamily="34" charset="0"/>
+            </a:endParaRPr>
+          </a:p>
+          <a:p>
+            <a:pPr marL="342900" indent="-342900" eaLnBrk="1" hangingPunct="1">
+              <a:buFont typeface="Arial" panose="020B0604020202020204" pitchFamily="34" charset="0"/>
+              <a:buChar char="•"/>
+            </a:pPr>
+            <a:endParaRPr lang="en-US" sz="2000" dirty="0">
+              <a:latin typeface="Calibri" pitchFamily="34" charset="0"/>
+            </a:endParaRPr>
+          </a:p>
+          <a:p>
+            <a:pPr marL="342900" indent="-342900" eaLnBrk="1" hangingPunct="1">
+              <a:buFont typeface="Arial" panose="020B0604020202020204" pitchFamily="34" charset="0"/>
+              <a:buChar char="•"/>
+            </a:pPr>
+            <a:endParaRPr lang="en-US" sz="2000" dirty="0" smtClean="0">
+              <a:latin typeface="Calibri" pitchFamily="34" charset="0"/>
+            </a:endParaRPr>
+          </a:p>
+          <a:p>
+            <a:pPr marL="342900" indent="-342900" eaLnBrk="1" hangingPunct="1">
+              <a:buFont typeface="Arial" panose="020B0604020202020204" pitchFamily="34" charset="0"/>
+              <a:buChar char="•"/>
+            </a:pPr>
+            <a:endParaRPr lang="en-US" sz="2000" dirty="0">
+              <a:latin typeface="Calibri" pitchFamily="34" charset="0"/>
+            </a:endParaRPr>
+          </a:p>
+          <a:p>
+            <a:pPr marL="342900" indent="-342900" eaLnBrk="1" hangingPunct="1">
+              <a:buFont typeface="Arial" panose="020B0604020202020204" pitchFamily="34" charset="0"/>
+              <a:buChar char="•"/>
+            </a:pPr>
+            <a:endParaRPr lang="en-US" sz="2000" dirty="0" smtClean="0">
+              <a:latin typeface="Calibri" pitchFamily="34" charset="0"/>
+            </a:endParaRPr>
+          </a:p>
+          <a:p>
+            <a:pPr marL="342900" indent="-342900" eaLnBrk="1" hangingPunct="1">
+              <a:buFont typeface="Arial" panose="020B0604020202020204" pitchFamily="34" charset="0"/>
+              <a:buChar char="•"/>
+            </a:pPr>
+            <a:endParaRPr lang="en-US" sz="2000" dirty="0">
+              <a:latin typeface="Calibri" pitchFamily="34" charset="0"/>
+            </a:endParaRPr>
+          </a:p>
+          <a:p>
+            <a:pPr marL="342900" indent="-342900" eaLnBrk="1" hangingPunct="1">
+              <a:buFont typeface="Arial" panose="020B0604020202020204" pitchFamily="34" charset="0"/>
+              <a:buChar char="•"/>
+            </a:pPr>
+            <a:endParaRPr lang="en-US" sz="2000" dirty="0" smtClean="0">
+              <a:latin typeface="Calibri" pitchFamily="34" charset="0"/>
+            </a:endParaRPr>
+          </a:p>
+          <a:p>
+            <a:pPr marL="342900" indent="-342900" eaLnBrk="1" hangingPunct="1">
+              <a:buFont typeface="Arial" panose="020B0604020202020204" pitchFamily="34" charset="0"/>
+              <a:buChar char="•"/>
+            </a:pPr>
+            <a:endParaRPr lang="en-US" sz="2000" dirty="0">
+              <a:latin typeface="Calibri" pitchFamily="34" charset="0"/>
+            </a:endParaRPr>
+          </a:p>
+          <a:p>
+            <a:pPr marL="342900" indent="-342900" eaLnBrk="1" hangingPunct="1">
+              <a:buFont typeface="Arial" panose="020B0604020202020204" pitchFamily="34" charset="0"/>
+              <a:buChar char="•"/>
+            </a:pPr>
+            <a:endParaRPr lang="en-US" sz="2000" dirty="0" smtClean="0">
+              <a:latin typeface="Calibri" pitchFamily="34" charset="0"/>
+            </a:endParaRPr>
+          </a:p>
+          <a:p>
+            <a:pPr marL="342900" indent="-342900" eaLnBrk="1" hangingPunct="1">
+              <a:buFont typeface="Arial" panose="020B0604020202020204" pitchFamily="34" charset="0"/>
+              <a:buChar char="•"/>
+            </a:pPr>
+            <a:endParaRPr lang="en-US" sz="2000" dirty="0">
+              <a:latin typeface="Calibri" pitchFamily="34" charset="0"/>
+            </a:endParaRPr>
+          </a:p>
+          <a:p>
+            <a:pPr marL="342900" indent="-342900" eaLnBrk="1" hangingPunct="1">
+              <a:buFont typeface="Arial" panose="020B0604020202020204" pitchFamily="34" charset="0"/>
+              <a:buChar char="•"/>
+            </a:pPr>
+            <a:endParaRPr lang="en-US" sz="2000" dirty="0" smtClean="0">
+              <a:latin typeface="Calibri" pitchFamily="34" charset="0"/>
+            </a:endParaRPr>
+          </a:p>
+          <a:p>
+            <a:pPr marL="342900" indent="-342900" eaLnBrk="1" hangingPunct="1">
+              <a:buFont typeface="Arial" panose="020B0604020202020204" pitchFamily="34" charset="0"/>
+              <a:buChar char="•"/>
+            </a:pPr>
+            <a:endParaRPr lang="en-US" sz="2000" dirty="0">
+              <a:latin typeface="Calibri" pitchFamily="34" charset="0"/>
+            </a:endParaRPr>
+          </a:p>
+          <a:p>
+            <a:pPr marL="342900" indent="-342900" eaLnBrk="1" hangingPunct="1">
+              <a:buFont typeface="Arial" panose="020B0604020202020204" pitchFamily="34" charset="0"/>
+              <a:buChar char="•"/>
+            </a:pPr>
+            <a:endParaRPr lang="en-US" sz="2000" dirty="0" smtClean="0">
+              <a:latin typeface="Calibri" pitchFamily="34" charset="0"/>
+            </a:endParaRPr>
+          </a:p>
+          <a:p>
+            <a:pPr marL="342900" indent="-342900" eaLnBrk="1" hangingPunct="1">
+              <a:buFont typeface="Arial" panose="020B0604020202020204" pitchFamily="34" charset="0"/>
+              <a:buChar char="•"/>
+            </a:pPr>
+            <a:endParaRPr lang="en-US" sz="2000" dirty="0">
+              <a:latin typeface="Calibri" pitchFamily="34" charset="0"/>
+            </a:endParaRPr>
+          </a:p>
+          <a:p>
+            <a:pPr marL="342900" indent="-342900" eaLnBrk="1" hangingPunct="1">
+              <a:buFont typeface="Arial" panose="020B0604020202020204" pitchFamily="34" charset="0"/>
+              <a:buChar char="•"/>
+            </a:pPr>
+            <a:endParaRPr lang="en-US" sz="2000" dirty="0" smtClean="0">
+              <a:latin typeface="Calibri" pitchFamily="34" charset="0"/>
+            </a:endParaRPr>
+          </a:p>
+          <a:p>
+            <a:pPr marL="342900" indent="-342900" eaLnBrk="1" hangingPunct="1">
+              <a:buFont typeface="Arial" panose="020B0604020202020204" pitchFamily="34" charset="0"/>
+              <a:buChar char="•"/>
+            </a:pPr>
+            <a:endParaRPr lang="en-US" sz="2000" dirty="0">
+              <a:latin typeface="Calibri" pitchFamily="34" charset="0"/>
+            </a:endParaRPr>
+          </a:p>
+          <a:p>
+            <a:pPr marL="342900" indent="-342900" eaLnBrk="1" hangingPunct="1">
+              <a:buFont typeface="Arial" panose="020B0604020202020204" pitchFamily="34" charset="0"/>
+              <a:buChar char="•"/>
+            </a:pPr>
+            <a:endParaRPr lang="en-US" sz="2000" dirty="0" smtClean="0">
+              <a:latin typeface="Calibri" pitchFamily="34" charset="0"/>
+            </a:endParaRPr>
+          </a:p>
+          <a:p>
+            <a:pPr marL="342900" indent="-342900" eaLnBrk="1" hangingPunct="1">
+              <a:buFont typeface="Arial" panose="020B0604020202020204" pitchFamily="34" charset="0"/>
+              <a:buChar char="•"/>
+            </a:pPr>
+            <a:endParaRPr lang="en-US" sz="2000" dirty="0">
+              <a:latin typeface="Calibri" pitchFamily="34" charset="0"/>
+            </a:endParaRPr>
+          </a:p>
+          <a:p>
+            <a:pPr marL="342900" indent="-342900" eaLnBrk="1" hangingPunct="1">
+              <a:buFont typeface="Arial" panose="020B0604020202020204" pitchFamily="34" charset="0"/>
+              <a:buChar char="•"/>
+            </a:pPr>
+            <a:endParaRPr lang="en-US" sz="2000" dirty="0" smtClean="0">
+              <a:latin typeface="Calibri" pitchFamily="34" charset="0"/>
+            </a:endParaRPr>
+          </a:p>
+          <a:p>
+            <a:pPr marL="342900" indent="-342900" eaLnBrk="1" hangingPunct="1">
+              <a:buFont typeface="Arial" panose="020B0604020202020204" pitchFamily="34" charset="0"/>
+              <a:buChar char="•"/>
+            </a:pPr>
+            <a:endParaRPr lang="en-US" sz="2000" dirty="0">
+              <a:latin typeface="Calibri" pitchFamily="34" charset="0"/>
+            </a:endParaRPr>
+          </a:p>
+          <a:p>
+            <a:pPr marL="342900" indent="-342900" eaLnBrk="1" hangingPunct="1">
+              <a:buFont typeface="Arial" panose="020B0604020202020204" pitchFamily="34" charset="0"/>
+              <a:buChar char="•"/>
+            </a:pPr>
+            <a:endParaRPr lang="en-US" sz="2000" dirty="0" smtClean="0">
+              <a:latin typeface="Calibri" pitchFamily="34" charset="0"/>
+            </a:endParaRPr>
+          </a:p>
+          <a:p>
+            <a:pPr marL="342900" indent="-342900" eaLnBrk="1" hangingPunct="1">
+              <a:buFont typeface="Arial" panose="020B0604020202020204" pitchFamily="34" charset="0"/>
+              <a:buChar char="•"/>
+            </a:pPr>
+            <a:endParaRPr lang="en-US" sz="2000" dirty="0">
+              <a:latin typeface="Calibri" pitchFamily="34" charset="0"/>
+            </a:endParaRPr>
+          </a:p>
+          <a:p>
+            <a:pPr marL="342900" indent="-342900" eaLnBrk="1" hangingPunct="1">
+              <a:buFont typeface="Arial" panose="020B0604020202020204" pitchFamily="34" charset="0"/>
+              <a:buChar char="•"/>
+            </a:pPr>
+            <a:endParaRPr lang="en-US" sz="2000" dirty="0" smtClean="0">
+              <a:latin typeface="Calibri" pitchFamily="34" charset="0"/>
+            </a:endParaRPr>
+          </a:p>
+          <a:p>
+            <a:pPr marL="342900" indent="-342900" eaLnBrk="1" hangingPunct="1">
+              <a:buFont typeface="Arial" panose="020B0604020202020204" pitchFamily="34" charset="0"/>
+              <a:buChar char="•"/>
+            </a:pPr>
+            <a:endParaRPr lang="en-US" sz="2000" dirty="0">
+              <a:latin typeface="Calibri" pitchFamily="34" charset="0"/>
+            </a:endParaRPr>
+          </a:p>
+          <a:p>
+            <a:pPr marL="342900" indent="-342900" eaLnBrk="1" hangingPunct="1">
+              <a:buFont typeface="Arial" panose="020B0604020202020204" pitchFamily="34" charset="0"/>
+              <a:buChar char="•"/>
+            </a:pPr>
+            <a:endParaRPr lang="en-US" sz="2000" dirty="0" smtClean="0">
+              <a:latin typeface="Calibri" pitchFamily="34" charset="0"/>
+            </a:endParaRPr>
+          </a:p>
+          <a:p>
+            <a:pPr marL="342900" indent="-342900" eaLnBrk="1" hangingPunct="1">
+              <a:buFont typeface="Arial" panose="020B0604020202020204" pitchFamily="34" charset="0"/>
+              <a:buChar char="•"/>
+            </a:pPr>
+            <a:endParaRPr lang="en-US" sz="2000" dirty="0">
+              <a:latin typeface="Calibri" pitchFamily="34" charset="0"/>
+            </a:endParaRPr>
+          </a:p>
+          <a:p>
+            <a:pPr eaLnBrk="1" hangingPunct="1"/>
+            <a:endParaRPr lang="en-US" sz="2000" dirty="0" smtClean="0">
               <a:latin typeface="Calibri" pitchFamily="34" charset="0"/>
             </a:endParaRPr>
           </a:p>
@@ -6784,6 +7056,66 @@
           </a:graphicData>
         </a:graphic>
       </p:graphicFrame>
+      <p:pic>
+        <p:nvPicPr>
+          <p:cNvPr id="3" name="Picture 2"/>
+          <p:cNvPicPr>
+            <a:picLocks noChangeAspect="1"/>
+          </p:cNvPicPr>
+          <p:nvPr/>
+        </p:nvPicPr>
+        <p:blipFill>
+          <a:blip r:embed="rId3">
+            <a:extLst>
+              <a:ext uri="{28A0092B-C50C-407E-A947-70E740481C1C}">
+                <a14:useLocalDpi xmlns:a14="http://schemas.microsoft.com/office/drawing/2010/main" val="0"/>
+              </a:ext>
+            </a:extLst>
+          </a:blip>
+          <a:stretch>
+            <a:fillRect/>
+          </a:stretch>
+        </p:blipFill>
+        <p:spPr>
+          <a:xfrm>
+            <a:off x="21960840" y="5410200"/>
+            <a:ext cx="4937760" cy="3703320"/>
+          </a:xfrm>
+          <a:prstGeom prst="rect">
+            <a:avLst/>
+          </a:prstGeom>
+        </p:spPr>
+      </p:pic>
+      <p:pic>
+        <p:nvPicPr>
+          <p:cNvPr id="9" name="Picture 8"/>
+          <p:cNvPicPr>
+            <a:picLocks noChangeAspect="1"/>
+          </p:cNvPicPr>
+          <p:nvPr/>
+        </p:nvPicPr>
+        <p:blipFill>
+          <a:blip r:embed="rId4">
+            <a:extLst>
+              <a:ext uri="{28A0092B-C50C-407E-A947-70E740481C1C}">
+                <a14:useLocalDpi xmlns:a14="http://schemas.microsoft.com/office/drawing/2010/main" val="0"/>
+              </a:ext>
+            </a:extLst>
+          </a:blip>
+          <a:stretch>
+            <a:fillRect/>
+          </a:stretch>
+        </p:blipFill>
+        <p:spPr>
+          <a:xfrm>
+            <a:off x="26873836" y="5410200"/>
+            <a:ext cx="4937760" cy="3703320"/>
+          </a:xfrm>
+          <a:prstGeom prst="rect">
+            <a:avLst/>
+          </a:prstGeom>
+        </p:spPr>
+      </p:pic>
     </p:spTree>
     <p:extLst>
       <p:ext uri="{BB962C8B-B14F-4D97-AF65-F5344CB8AC3E}">

</xml_diff>